<commit_message>
Finalisation veille et spécifications technique
</commit_message>
<xml_diff>
--- a/Veille technique - Qwenta.pptx
+++ b/Veille technique - Qwenta.pptx
@@ -258,7 +258,7 @@
           <a:p>
             <a:fld id="{6A8EF467-8487-4230-8827-197FCF02D652}" type="datetimeFigureOut">
               <a:rPr lang="en-US" smtClean="0"/>
-              <a:t>3/21/2023</a:t>
+              <a:t>3/29/2023</a:t>
             </a:fld>
             <a:endParaRPr lang="en-US"/>
           </a:p>
@@ -428,7 +428,7 @@
           <a:p>
             <a:fld id="{6A8EF467-8487-4230-8827-197FCF02D652}" type="datetimeFigureOut">
               <a:rPr lang="en-US" smtClean="0"/>
-              <a:t>3/21/2023</a:t>
+              <a:t>3/29/2023</a:t>
             </a:fld>
             <a:endParaRPr lang="en-US"/>
           </a:p>
@@ -608,7 +608,7 @@
           <a:p>
             <a:fld id="{6A8EF467-8487-4230-8827-197FCF02D652}" type="datetimeFigureOut">
               <a:rPr lang="en-US" smtClean="0"/>
-              <a:t>3/21/2023</a:t>
+              <a:t>3/29/2023</a:t>
             </a:fld>
             <a:endParaRPr lang="en-US"/>
           </a:p>
@@ -778,7 +778,7 @@
           <a:p>
             <a:fld id="{6A8EF467-8487-4230-8827-197FCF02D652}" type="datetimeFigureOut">
               <a:rPr lang="en-US" smtClean="0"/>
-              <a:t>3/21/2023</a:t>
+              <a:t>3/29/2023</a:t>
             </a:fld>
             <a:endParaRPr lang="en-US"/>
           </a:p>
@@ -1024,7 +1024,7 @@
           <a:p>
             <a:fld id="{6A8EF467-8487-4230-8827-197FCF02D652}" type="datetimeFigureOut">
               <a:rPr lang="en-US" smtClean="0"/>
-              <a:t>3/21/2023</a:t>
+              <a:t>3/29/2023</a:t>
             </a:fld>
             <a:endParaRPr lang="en-US"/>
           </a:p>
@@ -1256,7 +1256,7 @@
           <a:p>
             <a:fld id="{6A8EF467-8487-4230-8827-197FCF02D652}" type="datetimeFigureOut">
               <a:rPr lang="en-US" smtClean="0"/>
-              <a:t>3/21/2023</a:t>
+              <a:t>3/29/2023</a:t>
             </a:fld>
             <a:endParaRPr lang="en-US"/>
           </a:p>
@@ -1623,7 +1623,7 @@
           <a:p>
             <a:fld id="{6A8EF467-8487-4230-8827-197FCF02D652}" type="datetimeFigureOut">
               <a:rPr lang="en-US" smtClean="0"/>
-              <a:t>3/21/2023</a:t>
+              <a:t>3/29/2023</a:t>
             </a:fld>
             <a:endParaRPr lang="en-US"/>
           </a:p>
@@ -1741,7 +1741,7 @@
           <a:p>
             <a:fld id="{6A8EF467-8487-4230-8827-197FCF02D652}" type="datetimeFigureOut">
               <a:rPr lang="en-US" smtClean="0"/>
-              <a:t>3/21/2023</a:t>
+              <a:t>3/29/2023</a:t>
             </a:fld>
             <a:endParaRPr lang="en-US"/>
           </a:p>
@@ -1836,7 +1836,7 @@
           <a:p>
             <a:fld id="{6A8EF467-8487-4230-8827-197FCF02D652}" type="datetimeFigureOut">
               <a:rPr lang="en-US" smtClean="0"/>
-              <a:t>3/21/2023</a:t>
+              <a:t>3/29/2023</a:t>
             </a:fld>
             <a:endParaRPr lang="en-US"/>
           </a:p>
@@ -2113,7 +2113,7 @@
           <a:p>
             <a:fld id="{6A8EF467-8487-4230-8827-197FCF02D652}" type="datetimeFigureOut">
               <a:rPr lang="en-US" smtClean="0"/>
-              <a:t>3/21/2023</a:t>
+              <a:t>3/29/2023</a:t>
             </a:fld>
             <a:endParaRPr lang="en-US"/>
           </a:p>
@@ -2370,7 +2370,7 @@
           <a:p>
             <a:fld id="{6A8EF467-8487-4230-8827-197FCF02D652}" type="datetimeFigureOut">
               <a:rPr lang="en-US" smtClean="0"/>
-              <a:t>3/21/2023</a:t>
+              <a:t>3/29/2023</a:t>
             </a:fld>
             <a:endParaRPr lang="en-US"/>
           </a:p>
@@ -2583,7 +2583,7 @@
           <a:p>
             <a:fld id="{6A8EF467-8487-4230-8827-197FCF02D652}" type="datetimeFigureOut">
               <a:rPr lang="en-US" smtClean="0"/>
-              <a:t>3/21/2023</a:t>
+              <a:t>3/29/2023</a:t>
             </a:fld>
             <a:endParaRPr lang="en-US"/>
           </a:p>
@@ -3218,8 +3218,8 @@
         </p:nvSpPr>
         <p:spPr>
           <a:xfrm>
-            <a:off x="4178429" y="2262433"/>
-            <a:ext cx="3101419" cy="377072"/>
+            <a:off x="3728298" y="2298098"/>
+            <a:ext cx="4286841" cy="461665"/>
           </a:xfrm>
           <a:prstGeom prst="rect">
             <a:avLst/>
@@ -3234,8 +3234,14 @@
           <a:p>
             <a:pPr algn="ctr"/>
             <a:r>
-              <a:rPr lang="fr-FR" dirty="0"/>
-              <a:t>Les critères</a:t>
+              <a:rPr lang="fr-FR" sz="2400" b="1" dirty="0">
+                <a:solidFill>
+                  <a:schemeClr val="tx2">
+                    <a:lumMod val="50000"/>
+                  </a:schemeClr>
+                </a:solidFill>
+              </a:rPr>
+              <a:t>Les trois critères principaux</a:t>
             </a:r>
           </a:p>
         </p:txBody>
@@ -3254,7 +3260,7 @@
         </p:nvSpPr>
         <p:spPr>
           <a:xfrm>
-            <a:off x="7279847" y="4111050"/>
+            <a:off x="7788895" y="4095812"/>
             <a:ext cx="2318208" cy="369332"/>
           </a:xfrm>
           <a:prstGeom prst="rect">
@@ -3368,7 +3374,7 @@
         </p:nvSpPr>
         <p:spPr>
           <a:xfrm>
-            <a:off x="4570034" y="4111050"/>
+            <a:off x="4712613" y="4095812"/>
             <a:ext cx="2318208" cy="369332"/>
           </a:xfrm>
           <a:prstGeom prst="rect">
@@ -3404,7 +3410,7 @@
         </p:nvSpPr>
         <p:spPr>
           <a:xfrm>
-            <a:off x="2077432" y="4111050"/>
+            <a:off x="1558958" y="3945224"/>
             <a:ext cx="2318208" cy="369332"/>
           </a:xfrm>
           <a:prstGeom prst="rect">
@@ -3428,10 +3434,10 @@
       </p:sp>
       <p:sp>
         <p:nvSpPr>
-          <p:cNvPr id="11" name="Flèche : bas 10">
-            <a:extLst>
-              <a:ext uri="{FF2B5EF4-FFF2-40B4-BE49-F238E27FC236}">
-                <a16:creationId xmlns:a16="http://schemas.microsoft.com/office/drawing/2014/main" id="{6E5D3BF0-63FE-11E8-7A13-EBCF6531751F}"/>
+          <p:cNvPr id="7" name="Flèche : bas 6">
+            <a:extLst>
+              <a:ext uri="{FF2B5EF4-FFF2-40B4-BE49-F238E27FC236}">
+                <a16:creationId xmlns:a16="http://schemas.microsoft.com/office/drawing/2014/main" id="{7ED34CE2-FBA0-859D-9938-153F7FFEA1CE}"/>
               </a:ext>
             </a:extLst>
           </p:cNvPr>
@@ -3439,26 +3445,38 @@
           <p:nvPr/>
         </p:nvSpPr>
         <p:spPr>
-          <a:xfrm>
-            <a:off x="5580668" y="2922157"/>
-            <a:ext cx="291051" cy="864195"/>
+          <a:xfrm rot="2406966">
+            <a:off x="3568065" y="2936509"/>
+            <a:ext cx="339365" cy="829559"/>
           </a:xfrm>
           <a:prstGeom prst="downArrow">
             <a:avLst/>
           </a:prstGeom>
+          <a:solidFill>
+            <a:schemeClr val="accent6">
+              <a:lumMod val="75000"/>
+            </a:schemeClr>
+          </a:solidFill>
+          <a:ln>
+            <a:solidFill>
+              <a:srgbClr val="00823B"/>
+            </a:solidFill>
+          </a:ln>
         </p:spPr>
         <p:style>
           <a:lnRef idx="2">
-            <a:schemeClr val="dk1"/>
+            <a:schemeClr val="accent1">
+              <a:shade val="50000"/>
+            </a:schemeClr>
           </a:lnRef>
           <a:fillRef idx="1">
-            <a:schemeClr val="lt1"/>
+            <a:schemeClr val="accent1"/>
           </a:fillRef>
           <a:effectRef idx="0">
-            <a:schemeClr val="dk1"/>
+            <a:schemeClr val="accent1"/>
           </a:effectRef>
           <a:fontRef idx="minor">
-            <a:schemeClr val="dk1"/>
+            <a:schemeClr val="lt1"/>
           </a:fontRef>
         </p:style>
         <p:txBody>
@@ -3466,20 +3484,16 @@
           <a:lstStyle/>
           <a:p>
             <a:pPr algn="ctr"/>
-            <a:endParaRPr lang="fr-FR">
-              <a:solidFill>
-                <a:schemeClr val="tx1"/>
-              </a:solidFill>
-            </a:endParaRPr>
-          </a:p>
-        </p:txBody>
-      </p:sp>
-      <p:sp>
-        <p:nvSpPr>
-          <p:cNvPr id="14" name="Flèche : bas 13">
-            <a:extLst>
-              <a:ext uri="{FF2B5EF4-FFF2-40B4-BE49-F238E27FC236}">
-                <a16:creationId xmlns:a16="http://schemas.microsoft.com/office/drawing/2014/main" id="{4A03C50B-7917-420B-D5FB-6FDA9DC5BBB9}"/>
+            <a:endParaRPr lang="fr-FR" dirty="0"/>
+          </a:p>
+        </p:txBody>
+      </p:sp>
+      <p:sp>
+        <p:nvSpPr>
+          <p:cNvPr id="8" name="Flèche : bas 7">
+            <a:extLst>
+              <a:ext uri="{FF2B5EF4-FFF2-40B4-BE49-F238E27FC236}">
+                <a16:creationId xmlns:a16="http://schemas.microsoft.com/office/drawing/2014/main" id="{0D635206-7D6F-3BD1-64C6-C95BA8356807}"/>
               </a:ext>
             </a:extLst>
           </p:cNvPr>
@@ -3487,26 +3501,38 @@
           <p:nvPr/>
         </p:nvSpPr>
         <p:spPr>
-          <a:xfrm rot="18795935">
-            <a:off x="6719934" y="2996903"/>
-            <a:ext cx="291051" cy="864195"/>
+          <a:xfrm rot="19029200">
+            <a:off x="7887550" y="2929474"/>
+            <a:ext cx="339365" cy="829559"/>
           </a:xfrm>
           <a:prstGeom prst="downArrow">
             <a:avLst/>
           </a:prstGeom>
+          <a:solidFill>
+            <a:schemeClr val="accent6">
+              <a:lumMod val="75000"/>
+            </a:schemeClr>
+          </a:solidFill>
+          <a:ln>
+            <a:solidFill>
+              <a:srgbClr val="00823B"/>
+            </a:solidFill>
+          </a:ln>
         </p:spPr>
         <p:style>
           <a:lnRef idx="2">
-            <a:schemeClr val="dk1"/>
+            <a:schemeClr val="accent1">
+              <a:shade val="50000"/>
+            </a:schemeClr>
           </a:lnRef>
           <a:fillRef idx="1">
-            <a:schemeClr val="lt1"/>
+            <a:schemeClr val="accent1"/>
           </a:fillRef>
           <a:effectRef idx="0">
-            <a:schemeClr val="dk1"/>
+            <a:schemeClr val="accent1"/>
           </a:effectRef>
           <a:fontRef idx="minor">
-            <a:schemeClr val="dk1"/>
+            <a:schemeClr val="lt1"/>
           </a:fontRef>
         </p:style>
         <p:txBody>
@@ -3514,20 +3540,16 @@
           <a:lstStyle/>
           <a:p>
             <a:pPr algn="ctr"/>
-            <a:endParaRPr lang="fr-FR">
-              <a:solidFill>
-                <a:schemeClr val="tx1"/>
-              </a:solidFill>
-            </a:endParaRPr>
-          </a:p>
-        </p:txBody>
-      </p:sp>
-      <p:sp>
-        <p:nvSpPr>
-          <p:cNvPr id="15" name="Flèche : bas 14">
-            <a:extLst>
-              <a:ext uri="{FF2B5EF4-FFF2-40B4-BE49-F238E27FC236}">
-                <a16:creationId xmlns:a16="http://schemas.microsoft.com/office/drawing/2014/main" id="{C63838AD-3BE4-3240-74AE-645E359450BD}"/>
+            <a:endParaRPr lang="fr-FR" dirty="0"/>
+          </a:p>
+        </p:txBody>
+      </p:sp>
+      <p:sp>
+        <p:nvSpPr>
+          <p:cNvPr id="12" name="Flèche : bas 11">
+            <a:extLst>
+              <a:ext uri="{FF2B5EF4-FFF2-40B4-BE49-F238E27FC236}">
+                <a16:creationId xmlns:a16="http://schemas.microsoft.com/office/drawing/2014/main" id="{D245D41D-0EC4-A253-8F49-0D3101C99148}"/>
               </a:ext>
             </a:extLst>
           </p:cNvPr>
@@ -3535,26 +3557,38 @@
           <p:nvPr/>
         </p:nvSpPr>
         <p:spPr>
-          <a:xfrm rot="3061871">
-            <a:off x="4424508" y="2964203"/>
-            <a:ext cx="291051" cy="864195"/>
+          <a:xfrm>
+            <a:off x="5702035" y="3014220"/>
+            <a:ext cx="339365" cy="829559"/>
           </a:xfrm>
           <a:prstGeom prst="downArrow">
             <a:avLst/>
           </a:prstGeom>
+          <a:solidFill>
+            <a:schemeClr val="accent6">
+              <a:lumMod val="75000"/>
+            </a:schemeClr>
+          </a:solidFill>
+          <a:ln>
+            <a:solidFill>
+              <a:srgbClr val="00823B"/>
+            </a:solidFill>
+          </a:ln>
         </p:spPr>
         <p:style>
           <a:lnRef idx="2">
-            <a:schemeClr val="dk1"/>
+            <a:schemeClr val="accent1">
+              <a:shade val="50000"/>
+            </a:schemeClr>
           </a:lnRef>
           <a:fillRef idx="1">
-            <a:schemeClr val="lt1"/>
+            <a:schemeClr val="accent1"/>
           </a:fillRef>
           <a:effectRef idx="0">
-            <a:schemeClr val="dk1"/>
+            <a:schemeClr val="accent1"/>
           </a:effectRef>
           <a:fontRef idx="minor">
-            <a:schemeClr val="dk1"/>
+            <a:schemeClr val="lt1"/>
           </a:fontRef>
         </p:style>
         <p:txBody>
@@ -3562,11 +3596,7 @@
           <a:lstStyle/>
           <a:p>
             <a:pPr algn="ctr"/>
-            <a:endParaRPr lang="fr-FR">
-              <a:solidFill>
-                <a:schemeClr val="tx1"/>
-              </a:solidFill>
-            </a:endParaRPr>
+            <a:endParaRPr lang="fr-FR" dirty="0"/>
           </a:p>
         </p:txBody>
       </p:sp>
@@ -5730,7 +5760,7 @@
         </p:blipFill>
         <p:spPr bwMode="auto">
           <a:xfrm>
-            <a:off x="7852527" y="2470071"/>
+            <a:off x="8262592" y="2394657"/>
             <a:ext cx="1875935" cy="1875935"/>
           </a:xfrm>
           <a:prstGeom prst="rect">
@@ -6044,10 +6074,10 @@
       </p:sp>
       <p:pic>
         <p:nvPicPr>
-          <p:cNvPr id="11266" name="Picture 2" descr="Feedly : un outil efficace pour mettre en place sa veille">
-            <a:extLst>
-              <a:ext uri="{FF2B5EF4-FFF2-40B4-BE49-F238E27FC236}">
-                <a16:creationId xmlns:a16="http://schemas.microsoft.com/office/drawing/2014/main" id="{A2F3639C-38A2-B043-5828-39643AF6B988}"/>
+          <p:cNvPr id="1026" name="Picture 2" descr="Tutoriels Wakelet : Sauvegarder et partager des liens – L'atelier du  formateur">
+            <a:extLst>
+              <a:ext uri="{FF2B5EF4-FFF2-40B4-BE49-F238E27FC236}">
+                <a16:creationId xmlns:a16="http://schemas.microsoft.com/office/drawing/2014/main" id="{C25EF629-9410-8829-D508-CA05F9855323}"/>
               </a:ext>
             </a:extLst>
           </p:cNvPr>
@@ -6071,8 +6101,8 @@
         </p:blipFill>
         <p:spPr bwMode="auto">
           <a:xfrm>
-            <a:off x="4155650" y="2406486"/>
-            <a:ext cx="3635604" cy="2045027"/>
+            <a:off x="3901425" y="2770695"/>
+            <a:ext cx="4389149" cy="1603342"/>
           </a:xfrm>
           <a:prstGeom prst="rect">
             <a:avLst/>
@@ -6515,7 +6545,7 @@
         </p:blipFill>
         <p:spPr bwMode="auto">
           <a:xfrm>
-            <a:off x="1745529" y="2599654"/>
+            <a:off x="1322931" y="3253274"/>
             <a:ext cx="1561707" cy="1561707"/>
           </a:xfrm>
           <a:prstGeom prst="rect">
@@ -6562,7 +6592,7 @@
         </p:blipFill>
         <p:spPr bwMode="auto">
           <a:xfrm>
-            <a:off x="8637769" y="2599654"/>
+            <a:off x="5141106" y="5072646"/>
             <a:ext cx="1107294" cy="1561707"/>
           </a:xfrm>
           <a:prstGeom prst="rect">
@@ -6609,7 +6639,7 @@
         </p:blipFill>
         <p:spPr bwMode="auto">
           <a:xfrm>
-            <a:off x="4313107" y="4517841"/>
+            <a:off x="7333512" y="3675625"/>
             <a:ext cx="2761186" cy="1561707"/>
           </a:xfrm>
           <a:prstGeom prst="rect">
@@ -6674,6 +6704,144 @@
           </a:extLst>
         </p:spPr>
       </p:pic>
+      <p:sp>
+        <p:nvSpPr>
+          <p:cNvPr id="9" name="Flèche : bas 8">
+            <a:extLst>
+              <a:ext uri="{FF2B5EF4-FFF2-40B4-BE49-F238E27FC236}">
+                <a16:creationId xmlns:a16="http://schemas.microsoft.com/office/drawing/2014/main" id="{9F43E065-7868-0A50-CB3C-A1A7C6839EDA}"/>
+              </a:ext>
+            </a:extLst>
+          </p:cNvPr>
+          <p:cNvSpPr/>
+          <p:nvPr/>
+        </p:nvSpPr>
+        <p:spPr>
+          <a:xfrm rot="4278506">
+            <a:off x="3400286" y="3056640"/>
+            <a:ext cx="556181" cy="744718"/>
+          </a:xfrm>
+          <a:prstGeom prst="downArrow">
+            <a:avLst/>
+          </a:prstGeom>
+        </p:spPr>
+        <p:style>
+          <a:lnRef idx="2">
+            <a:schemeClr val="accent1">
+              <a:shade val="50000"/>
+            </a:schemeClr>
+          </a:lnRef>
+          <a:fillRef idx="1">
+            <a:schemeClr val="accent1"/>
+          </a:fillRef>
+          <a:effectRef idx="0">
+            <a:schemeClr val="accent1"/>
+          </a:effectRef>
+          <a:fontRef idx="minor">
+            <a:schemeClr val="lt1"/>
+          </a:fontRef>
+        </p:style>
+        <p:txBody>
+          <a:bodyPr rtlCol="0" anchor="ctr"/>
+          <a:lstStyle/>
+          <a:p>
+            <a:pPr algn="ctr"/>
+            <a:endParaRPr lang="fr-FR"/>
+          </a:p>
+        </p:txBody>
+      </p:sp>
+      <p:sp>
+        <p:nvSpPr>
+          <p:cNvPr id="10" name="Flèche : bas 9">
+            <a:extLst>
+              <a:ext uri="{FF2B5EF4-FFF2-40B4-BE49-F238E27FC236}">
+                <a16:creationId xmlns:a16="http://schemas.microsoft.com/office/drawing/2014/main" id="{5956AC69-8CBB-4335-84F9-80B118D97766}"/>
+              </a:ext>
+            </a:extLst>
+          </p:cNvPr>
+          <p:cNvSpPr/>
+          <p:nvPr/>
+        </p:nvSpPr>
+        <p:spPr>
+          <a:xfrm>
+            <a:off x="5350343" y="4139937"/>
+            <a:ext cx="556181" cy="744718"/>
+          </a:xfrm>
+          <a:prstGeom prst="downArrow">
+            <a:avLst/>
+          </a:prstGeom>
+        </p:spPr>
+        <p:style>
+          <a:lnRef idx="2">
+            <a:schemeClr val="accent1">
+              <a:shade val="50000"/>
+            </a:schemeClr>
+          </a:lnRef>
+          <a:fillRef idx="1">
+            <a:schemeClr val="accent1"/>
+          </a:fillRef>
+          <a:effectRef idx="0">
+            <a:schemeClr val="accent1"/>
+          </a:effectRef>
+          <a:fontRef idx="minor">
+            <a:schemeClr val="lt1"/>
+          </a:fontRef>
+        </p:style>
+        <p:txBody>
+          <a:bodyPr rtlCol="0" anchor="ctr"/>
+          <a:lstStyle/>
+          <a:p>
+            <a:pPr algn="ctr"/>
+            <a:endParaRPr lang="fr-FR"/>
+          </a:p>
+        </p:txBody>
+      </p:sp>
+      <p:sp>
+        <p:nvSpPr>
+          <p:cNvPr id="11" name="Flèche : bas 10">
+            <a:extLst>
+              <a:ext uri="{FF2B5EF4-FFF2-40B4-BE49-F238E27FC236}">
+                <a16:creationId xmlns:a16="http://schemas.microsoft.com/office/drawing/2014/main" id="{1A9BEC55-01E8-FA6E-4B52-46C8998AFD4C}"/>
+              </a:ext>
+            </a:extLst>
+          </p:cNvPr>
+          <p:cNvSpPr/>
+          <p:nvPr/>
+        </p:nvSpPr>
+        <p:spPr>
+          <a:xfrm rot="17781783">
+            <a:off x="7283459" y="3088402"/>
+            <a:ext cx="556181" cy="744718"/>
+          </a:xfrm>
+          <a:prstGeom prst="downArrow">
+            <a:avLst/>
+          </a:prstGeom>
+        </p:spPr>
+        <p:style>
+          <a:lnRef idx="2">
+            <a:schemeClr val="accent1">
+              <a:shade val="50000"/>
+            </a:schemeClr>
+          </a:lnRef>
+          <a:fillRef idx="1">
+            <a:schemeClr val="accent1"/>
+          </a:fillRef>
+          <a:effectRef idx="0">
+            <a:schemeClr val="accent1"/>
+          </a:effectRef>
+          <a:fontRef idx="minor">
+            <a:schemeClr val="lt1"/>
+          </a:fontRef>
+        </p:style>
+        <p:txBody>
+          <a:bodyPr rtlCol="0" anchor="ctr"/>
+          <a:lstStyle/>
+          <a:p>
+            <a:pPr algn="ctr"/>
+            <a:endParaRPr lang="fr-FR"/>
+          </a:p>
+        </p:txBody>
+      </p:sp>
     </p:spTree>
     <p:extLst>
       <p:ext uri="{BB962C8B-B14F-4D97-AF65-F5344CB8AC3E}">

</xml_diff>

<commit_message>
Ajout Power Point outil de gestion de projet et solution technique
</commit_message>
<xml_diff>
--- a/Veille technique - Qwenta.pptx
+++ b/Veille technique - Qwenta.pptx
@@ -13,14 +13,13 @@
     <p:sldId id="279" r:id="rId7"/>
     <p:sldId id="288" r:id="rId8"/>
     <p:sldId id="290" r:id="rId9"/>
-    <p:sldId id="289" r:id="rId10"/>
-    <p:sldId id="291" r:id="rId11"/>
-    <p:sldId id="292" r:id="rId12"/>
-    <p:sldId id="293" r:id="rId13"/>
-    <p:sldId id="294" r:id="rId14"/>
-    <p:sldId id="295" r:id="rId15"/>
-    <p:sldId id="300" r:id="rId16"/>
-    <p:sldId id="296" r:id="rId17"/>
+    <p:sldId id="291" r:id="rId10"/>
+    <p:sldId id="292" r:id="rId11"/>
+    <p:sldId id="293" r:id="rId12"/>
+    <p:sldId id="294" r:id="rId13"/>
+    <p:sldId id="295" r:id="rId14"/>
+    <p:sldId id="300" r:id="rId15"/>
+    <p:sldId id="296" r:id="rId16"/>
   </p:sldIdLst>
   <p:sldSz cx="12192000" cy="6858000"/>
   <p:notesSz cx="6858000" cy="9144000"/>
@@ -258,7 +257,7 @@
           <a:p>
             <a:fld id="{6A8EF467-8487-4230-8827-197FCF02D652}" type="datetimeFigureOut">
               <a:rPr lang="en-US" smtClean="0"/>
-              <a:t>3/29/2023</a:t>
+              <a:t>4/2/2023</a:t>
             </a:fld>
             <a:endParaRPr lang="en-US"/>
           </a:p>
@@ -428,7 +427,7 @@
           <a:p>
             <a:fld id="{6A8EF467-8487-4230-8827-197FCF02D652}" type="datetimeFigureOut">
               <a:rPr lang="en-US" smtClean="0"/>
-              <a:t>3/29/2023</a:t>
+              <a:t>4/2/2023</a:t>
             </a:fld>
             <a:endParaRPr lang="en-US"/>
           </a:p>
@@ -608,7 +607,7 @@
           <a:p>
             <a:fld id="{6A8EF467-8487-4230-8827-197FCF02D652}" type="datetimeFigureOut">
               <a:rPr lang="en-US" smtClean="0"/>
-              <a:t>3/29/2023</a:t>
+              <a:t>4/2/2023</a:t>
             </a:fld>
             <a:endParaRPr lang="en-US"/>
           </a:p>
@@ -778,7 +777,7 @@
           <a:p>
             <a:fld id="{6A8EF467-8487-4230-8827-197FCF02D652}" type="datetimeFigureOut">
               <a:rPr lang="en-US" smtClean="0"/>
-              <a:t>3/29/2023</a:t>
+              <a:t>4/2/2023</a:t>
             </a:fld>
             <a:endParaRPr lang="en-US"/>
           </a:p>
@@ -1024,7 +1023,7 @@
           <a:p>
             <a:fld id="{6A8EF467-8487-4230-8827-197FCF02D652}" type="datetimeFigureOut">
               <a:rPr lang="en-US" smtClean="0"/>
-              <a:t>3/29/2023</a:t>
+              <a:t>4/2/2023</a:t>
             </a:fld>
             <a:endParaRPr lang="en-US"/>
           </a:p>
@@ -1256,7 +1255,7 @@
           <a:p>
             <a:fld id="{6A8EF467-8487-4230-8827-197FCF02D652}" type="datetimeFigureOut">
               <a:rPr lang="en-US" smtClean="0"/>
-              <a:t>3/29/2023</a:t>
+              <a:t>4/2/2023</a:t>
             </a:fld>
             <a:endParaRPr lang="en-US"/>
           </a:p>
@@ -1623,7 +1622,7 @@
           <a:p>
             <a:fld id="{6A8EF467-8487-4230-8827-197FCF02D652}" type="datetimeFigureOut">
               <a:rPr lang="en-US" smtClean="0"/>
-              <a:t>3/29/2023</a:t>
+              <a:t>4/2/2023</a:t>
             </a:fld>
             <a:endParaRPr lang="en-US"/>
           </a:p>
@@ -1741,7 +1740,7 @@
           <a:p>
             <a:fld id="{6A8EF467-8487-4230-8827-197FCF02D652}" type="datetimeFigureOut">
               <a:rPr lang="en-US" smtClean="0"/>
-              <a:t>3/29/2023</a:t>
+              <a:t>4/2/2023</a:t>
             </a:fld>
             <a:endParaRPr lang="en-US"/>
           </a:p>
@@ -1836,7 +1835,7 @@
           <a:p>
             <a:fld id="{6A8EF467-8487-4230-8827-197FCF02D652}" type="datetimeFigureOut">
               <a:rPr lang="en-US" smtClean="0"/>
-              <a:t>3/29/2023</a:t>
+              <a:t>4/2/2023</a:t>
             </a:fld>
             <a:endParaRPr lang="en-US"/>
           </a:p>
@@ -2113,7 +2112,7 @@
           <a:p>
             <a:fld id="{6A8EF467-8487-4230-8827-197FCF02D652}" type="datetimeFigureOut">
               <a:rPr lang="en-US" smtClean="0"/>
-              <a:t>3/29/2023</a:t>
+              <a:t>4/2/2023</a:t>
             </a:fld>
             <a:endParaRPr lang="en-US"/>
           </a:p>
@@ -2370,7 +2369,7 @@
           <a:p>
             <a:fld id="{6A8EF467-8487-4230-8827-197FCF02D652}" type="datetimeFigureOut">
               <a:rPr lang="en-US" smtClean="0"/>
-              <a:t>3/29/2023</a:t>
+              <a:t>4/2/2023</a:t>
             </a:fld>
             <a:endParaRPr lang="en-US"/>
           </a:p>
@@ -2583,7 +2582,7 @@
           <a:p>
             <a:fld id="{6A8EF467-8487-4230-8827-197FCF02D652}" type="datetimeFigureOut">
               <a:rPr lang="en-US" smtClean="0"/>
-              <a:t>3/29/2023</a:t>
+              <a:t>4/2/2023</a:t>
             </a:fld>
             <a:endParaRPr lang="en-US"/>
           </a:p>
@@ -3206,84 +3205,6 @@
       </p:sp>
       <p:sp>
         <p:nvSpPr>
-          <p:cNvPr id="2" name="ZoneTexte 1">
-            <a:extLst>
-              <a:ext uri="{FF2B5EF4-FFF2-40B4-BE49-F238E27FC236}">
-                <a16:creationId xmlns:a16="http://schemas.microsoft.com/office/drawing/2014/main" id="{E109419B-CA5A-B747-6F00-11873E7DF0C1}"/>
-              </a:ext>
-            </a:extLst>
-          </p:cNvPr>
-          <p:cNvSpPr txBox="1"/>
-          <p:nvPr/>
-        </p:nvSpPr>
-        <p:spPr>
-          <a:xfrm>
-            <a:off x="3728298" y="2298098"/>
-            <a:ext cx="4286841" cy="461665"/>
-          </a:xfrm>
-          <a:prstGeom prst="rect">
-            <a:avLst/>
-          </a:prstGeom>
-          <a:noFill/>
-        </p:spPr>
-        <p:txBody>
-          <a:bodyPr wrap="square" rtlCol="0">
-            <a:spAutoFit/>
-          </a:bodyPr>
-          <a:lstStyle/>
-          <a:p>
-            <a:pPr algn="ctr"/>
-            <a:r>
-              <a:rPr lang="fr-FR" sz="2400" b="1" dirty="0">
-                <a:solidFill>
-                  <a:schemeClr val="tx2">
-                    <a:lumMod val="50000"/>
-                  </a:schemeClr>
-                </a:solidFill>
-              </a:rPr>
-              <a:t>Les trois critères principaux</a:t>
-            </a:r>
-          </a:p>
-        </p:txBody>
-      </p:sp>
-      <p:sp>
-        <p:nvSpPr>
-          <p:cNvPr id="4" name="ZoneTexte 3">
-            <a:extLst>
-              <a:ext uri="{FF2B5EF4-FFF2-40B4-BE49-F238E27FC236}">
-                <a16:creationId xmlns:a16="http://schemas.microsoft.com/office/drawing/2014/main" id="{1E14D26D-8606-31E5-80FC-85CA382BEF65}"/>
-              </a:ext>
-            </a:extLst>
-          </p:cNvPr>
-          <p:cNvSpPr txBox="1"/>
-          <p:nvPr/>
-        </p:nvSpPr>
-        <p:spPr>
-          <a:xfrm>
-            <a:off x="7788895" y="4095812"/>
-            <a:ext cx="2318208" cy="369332"/>
-          </a:xfrm>
-          <a:prstGeom prst="rect">
-            <a:avLst/>
-          </a:prstGeom>
-          <a:noFill/>
-        </p:spPr>
-        <p:txBody>
-          <a:bodyPr wrap="square" rtlCol="0">
-            <a:spAutoFit/>
-          </a:bodyPr>
-          <a:lstStyle/>
-          <a:p>
-            <a:pPr algn="ctr"/>
-            <a:r>
-              <a:rPr lang="fr-FR" dirty="0"/>
-              <a:t>Sécurité</a:t>
-            </a:r>
-          </a:p>
-        </p:txBody>
-      </p:sp>
-      <p:sp>
-        <p:nvSpPr>
           <p:cNvPr id="6" name="Bouton d'action : Aide 5">
             <a:hlinkClick r:id="rId2" highlightClick="1"/>
             <a:extLst>
@@ -3360,12 +3281,42 @@
           </a:p>
         </p:txBody>
       </p:sp>
+      <p:pic>
+        <p:nvPicPr>
+          <p:cNvPr id="8" name="Image 7">
+            <a:extLst>
+              <a:ext uri="{FF2B5EF4-FFF2-40B4-BE49-F238E27FC236}">
+                <a16:creationId xmlns:a16="http://schemas.microsoft.com/office/drawing/2014/main" id="{ABEB0F3C-6B42-433E-8270-F726118F78F3}"/>
+              </a:ext>
+            </a:extLst>
+          </p:cNvPr>
+          <p:cNvPicPr>
+            <a:picLocks noChangeAspect="1"/>
+          </p:cNvPicPr>
+          <p:nvPr/>
+        </p:nvPicPr>
+        <p:blipFill>
+          <a:blip r:embed="rId3"/>
+          <a:stretch>
+            <a:fillRect/>
+          </a:stretch>
+        </p:blipFill>
+        <p:spPr>
+          <a:xfrm>
+            <a:off x="3236536" y="2239376"/>
+            <a:ext cx="5246515" cy="3177017"/>
+          </a:xfrm>
+          <a:prstGeom prst="rect">
+            <a:avLst/>
+          </a:prstGeom>
+        </p:spPr>
+      </p:pic>
       <p:sp>
         <p:nvSpPr>
           <p:cNvPr id="9" name="ZoneTexte 8">
             <a:extLst>
               <a:ext uri="{FF2B5EF4-FFF2-40B4-BE49-F238E27FC236}">
-                <a16:creationId xmlns:a16="http://schemas.microsoft.com/office/drawing/2014/main" id="{631D6D7B-BE08-CC71-6B3D-A44471A1C7EC}"/>
+                <a16:creationId xmlns:a16="http://schemas.microsoft.com/office/drawing/2014/main" id="{302FF784-1908-002C-9AFB-014B429AB088}"/>
               </a:ext>
             </a:extLst>
           </p:cNvPr>
@@ -3374,8 +3325,8 @@
         </p:nvSpPr>
         <p:spPr>
           <a:xfrm>
-            <a:off x="4712613" y="4095812"/>
-            <a:ext cx="2318208" cy="369332"/>
+            <a:off x="4309083" y="5812681"/>
+            <a:ext cx="3101419" cy="923330"/>
           </a:xfrm>
           <a:prstGeom prst="rect">
             <a:avLst/>
@@ -3391,219 +3342,15 @@
             <a:pPr algn="ctr"/>
             <a:r>
               <a:rPr lang="fr-FR" dirty="0"/>
-              <a:t>Prix</a:t>
-            </a:r>
-          </a:p>
-        </p:txBody>
-      </p:sp>
-      <p:sp>
-        <p:nvSpPr>
-          <p:cNvPr id="10" name="ZoneTexte 9">
-            <a:extLst>
-              <a:ext uri="{FF2B5EF4-FFF2-40B4-BE49-F238E27FC236}">
-                <a16:creationId xmlns:a16="http://schemas.microsoft.com/office/drawing/2014/main" id="{1EC703BF-DCA8-BEF6-3D74-1732800A7477}"/>
-              </a:ext>
-            </a:extLst>
-          </p:cNvPr>
-          <p:cNvSpPr txBox="1"/>
-          <p:nvPr/>
-        </p:nvSpPr>
-        <p:spPr>
-          <a:xfrm>
-            <a:off x="1558958" y="3945224"/>
-            <a:ext cx="2318208" cy="369332"/>
-          </a:xfrm>
-          <a:prstGeom prst="rect">
-            <a:avLst/>
-          </a:prstGeom>
-          <a:noFill/>
-        </p:spPr>
-        <p:txBody>
-          <a:bodyPr wrap="square" rtlCol="0">
-            <a:spAutoFit/>
-          </a:bodyPr>
-          <a:lstStyle/>
-          <a:p>
-            <a:pPr algn="ctr"/>
-            <a:r>
-              <a:rPr lang="fr-FR" dirty="0"/>
-              <a:t>Type de site</a:t>
-            </a:r>
-          </a:p>
-        </p:txBody>
-      </p:sp>
-      <p:sp>
-        <p:nvSpPr>
-          <p:cNvPr id="7" name="Flèche : bas 6">
-            <a:extLst>
-              <a:ext uri="{FF2B5EF4-FFF2-40B4-BE49-F238E27FC236}">
-                <a16:creationId xmlns:a16="http://schemas.microsoft.com/office/drawing/2014/main" id="{7ED34CE2-FBA0-859D-9938-153F7FFEA1CE}"/>
-              </a:ext>
-            </a:extLst>
-          </p:cNvPr>
-          <p:cNvSpPr/>
-          <p:nvPr/>
-        </p:nvSpPr>
-        <p:spPr>
-          <a:xfrm rot="2406966">
-            <a:off x="3568065" y="2936509"/>
-            <a:ext cx="339365" cy="829559"/>
-          </a:xfrm>
-          <a:prstGeom prst="downArrow">
-            <a:avLst/>
-          </a:prstGeom>
-          <a:solidFill>
-            <a:schemeClr val="accent6">
-              <a:lumMod val="75000"/>
-            </a:schemeClr>
-          </a:solidFill>
-          <a:ln>
-            <a:solidFill>
-              <a:srgbClr val="00823B"/>
-            </a:solidFill>
-          </a:ln>
-        </p:spPr>
-        <p:style>
-          <a:lnRef idx="2">
-            <a:schemeClr val="accent1">
-              <a:shade val="50000"/>
-            </a:schemeClr>
-          </a:lnRef>
-          <a:fillRef idx="1">
-            <a:schemeClr val="accent1"/>
-          </a:fillRef>
-          <a:effectRef idx="0">
-            <a:schemeClr val="accent1"/>
-          </a:effectRef>
-          <a:fontRef idx="minor">
-            <a:schemeClr val="lt1"/>
-          </a:fontRef>
-        </p:style>
-        <p:txBody>
-          <a:bodyPr rtlCol="0" anchor="ctr"/>
-          <a:lstStyle/>
-          <a:p>
-            <a:pPr algn="ctr"/>
-            <a:endParaRPr lang="fr-FR" dirty="0"/>
-          </a:p>
-        </p:txBody>
-      </p:sp>
-      <p:sp>
-        <p:nvSpPr>
-          <p:cNvPr id="8" name="Flèche : bas 7">
-            <a:extLst>
-              <a:ext uri="{FF2B5EF4-FFF2-40B4-BE49-F238E27FC236}">
-                <a16:creationId xmlns:a16="http://schemas.microsoft.com/office/drawing/2014/main" id="{0D635206-7D6F-3BD1-64C6-C95BA8356807}"/>
-              </a:ext>
-            </a:extLst>
-          </p:cNvPr>
-          <p:cNvSpPr/>
-          <p:nvPr/>
-        </p:nvSpPr>
-        <p:spPr>
-          <a:xfrm rot="19029200">
-            <a:off x="7887550" y="2929474"/>
-            <a:ext cx="339365" cy="829559"/>
-          </a:xfrm>
-          <a:prstGeom prst="downArrow">
-            <a:avLst/>
-          </a:prstGeom>
-          <a:solidFill>
-            <a:schemeClr val="accent6">
-              <a:lumMod val="75000"/>
-            </a:schemeClr>
-          </a:solidFill>
-          <a:ln>
-            <a:solidFill>
-              <a:srgbClr val="00823B"/>
-            </a:solidFill>
-          </a:ln>
-        </p:spPr>
-        <p:style>
-          <a:lnRef idx="2">
-            <a:schemeClr val="accent1">
-              <a:shade val="50000"/>
-            </a:schemeClr>
-          </a:lnRef>
-          <a:fillRef idx="1">
-            <a:schemeClr val="accent1"/>
-          </a:fillRef>
-          <a:effectRef idx="0">
-            <a:schemeClr val="accent1"/>
-          </a:effectRef>
-          <a:fontRef idx="minor">
-            <a:schemeClr val="lt1"/>
-          </a:fontRef>
-        </p:style>
-        <p:txBody>
-          <a:bodyPr rtlCol="0" anchor="ctr"/>
-          <a:lstStyle/>
-          <a:p>
-            <a:pPr algn="ctr"/>
-            <a:endParaRPr lang="fr-FR" dirty="0"/>
-          </a:p>
-        </p:txBody>
-      </p:sp>
-      <p:sp>
-        <p:nvSpPr>
-          <p:cNvPr id="12" name="Flèche : bas 11">
-            <a:extLst>
-              <a:ext uri="{FF2B5EF4-FFF2-40B4-BE49-F238E27FC236}">
-                <a16:creationId xmlns:a16="http://schemas.microsoft.com/office/drawing/2014/main" id="{D245D41D-0EC4-A253-8F49-0D3101C99148}"/>
-              </a:ext>
-            </a:extLst>
-          </p:cNvPr>
-          <p:cNvSpPr/>
-          <p:nvPr/>
-        </p:nvSpPr>
-        <p:spPr>
-          <a:xfrm>
-            <a:off x="5702035" y="3014220"/>
-            <a:ext cx="339365" cy="829559"/>
-          </a:xfrm>
-          <a:prstGeom prst="downArrow">
-            <a:avLst/>
-          </a:prstGeom>
-          <a:solidFill>
-            <a:schemeClr val="accent6">
-              <a:lumMod val="75000"/>
-            </a:schemeClr>
-          </a:solidFill>
-          <a:ln>
-            <a:solidFill>
-              <a:srgbClr val="00823B"/>
-            </a:solidFill>
-          </a:ln>
-        </p:spPr>
-        <p:style>
-          <a:lnRef idx="2">
-            <a:schemeClr val="accent1">
-              <a:shade val="50000"/>
-            </a:schemeClr>
-          </a:lnRef>
-          <a:fillRef idx="1">
-            <a:schemeClr val="accent1"/>
-          </a:fillRef>
-          <a:effectRef idx="0">
-            <a:schemeClr val="accent1"/>
-          </a:effectRef>
-          <a:fontRef idx="minor">
-            <a:schemeClr val="lt1"/>
-          </a:fontRef>
-        </p:style>
-        <p:txBody>
-          <a:bodyPr rtlCol="0" anchor="ctr"/>
-          <a:lstStyle/>
-          <a:p>
-            <a:pPr algn="ctr"/>
-            <a:endParaRPr lang="fr-FR" dirty="0"/>
+              <a:t>Tarif différents selon les besoins, datacenter en France, sauvegardes gratuites</a:t>
+            </a:r>
           </a:p>
         </p:txBody>
       </p:sp>
     </p:spTree>
     <p:extLst>
       <p:ext uri="{BB962C8B-B14F-4D97-AF65-F5344CB8AC3E}">
-        <p14:creationId xmlns:p14="http://schemas.microsoft.com/office/powerpoint/2010/main" val="1766438128"/>
+        <p14:creationId xmlns:p14="http://schemas.microsoft.com/office/powerpoint/2010/main" val="3500293761"/>
       </p:ext>
     </p:extLst>
   </p:cSld>
@@ -3676,7 +3423,7 @@
                   <a:srgbClr val="00823B"/>
                 </a:solidFill>
               </a:rPr>
-              <a:t>VI/ Le choix de l’hébergement</a:t>
+              <a:t>VII/ Le choix du mail de l’entreprise</a:t>
             </a:r>
             <a:endParaRPr lang="en-US" sz="2400" b="1" u="sng" dirty="0">
               <a:solidFill>
@@ -3754,11 +3501,72 @@
       </p:sp>
       <p:sp>
         <p:nvSpPr>
-          <p:cNvPr id="6" name="Bouton d'action : Aide 5">
-            <a:hlinkClick r:id="rId2" highlightClick="1"/>
-            <a:extLst>
-              <a:ext uri="{FF2B5EF4-FFF2-40B4-BE49-F238E27FC236}">
-                <a16:creationId xmlns:a16="http://schemas.microsoft.com/office/drawing/2014/main" id="{6FF83680-5055-5AD3-66AD-3B2AF0382FF4}"/>
+          <p:cNvPr id="4" name="ZoneTexte 3">
+            <a:extLst>
+              <a:ext uri="{FF2B5EF4-FFF2-40B4-BE49-F238E27FC236}">
+                <a16:creationId xmlns:a16="http://schemas.microsoft.com/office/drawing/2014/main" id="{C647BF18-FB19-1BD3-1061-36C6100AE173}"/>
+              </a:ext>
+            </a:extLst>
+          </p:cNvPr>
+          <p:cNvSpPr txBox="1"/>
+          <p:nvPr/>
+        </p:nvSpPr>
+        <p:spPr>
+          <a:xfrm>
+            <a:off x="2669356" y="3242820"/>
+            <a:ext cx="6078718" cy="830997"/>
+          </a:xfrm>
+          <a:prstGeom prst="rect">
+            <a:avLst/>
+          </a:prstGeom>
+          <a:noFill/>
+          <a:effectLst>
+            <a:outerShdw blurRad="50800" dist="38100" dir="5400000" algn="t" rotWithShape="0">
+              <a:prstClr val="black">
+                <a:alpha val="40000"/>
+              </a:prstClr>
+            </a:outerShdw>
+          </a:effectLst>
+        </p:spPr>
+        <p:txBody>
+          <a:bodyPr wrap="square" rtlCol="0" anchor="ctr">
+            <a:spAutoFit/>
+          </a:bodyPr>
+          <a:lstStyle/>
+          <a:p>
+            <a:pPr algn="ctr"/>
+            <a:r>
+              <a:rPr lang="fr-FR" sz="4800" dirty="0">
+                <a:solidFill>
+                  <a:schemeClr val="tx1">
+                    <a:lumMod val="95000"/>
+                    <a:lumOff val="5000"/>
+                  </a:schemeClr>
+                </a:solidFill>
+                <a:latin typeface="Times New Roman" panose="02020603050405020304" pitchFamily="18" charset="0"/>
+                <a:cs typeface="Times New Roman" panose="02020603050405020304" pitchFamily="18" charset="0"/>
+              </a:rPr>
+              <a:t>contact@qwenta.fr</a:t>
+            </a:r>
+            <a:endParaRPr lang="en-US" sz="4800" dirty="0">
+              <a:solidFill>
+                <a:schemeClr val="tx1">
+                  <a:lumMod val="95000"/>
+                  <a:lumOff val="5000"/>
+                </a:schemeClr>
+              </a:solidFill>
+              <a:latin typeface="Times New Roman" panose="02020603050405020304" pitchFamily="18" charset="0"/>
+              <a:cs typeface="Times New Roman" panose="02020603050405020304" pitchFamily="18" charset="0"/>
+            </a:endParaRPr>
+          </a:p>
+        </p:txBody>
+      </p:sp>
+      <p:sp>
+        <p:nvSpPr>
+          <p:cNvPr id="7" name="Accolade fermante 6">
+            <a:extLst>
+              <a:ext uri="{FF2B5EF4-FFF2-40B4-BE49-F238E27FC236}">
+                <a16:creationId xmlns:a16="http://schemas.microsoft.com/office/drawing/2014/main" id="{864B0136-76ED-8DB1-8D11-A1CE91444D23}"/>
               </a:ext>
             </a:extLst>
           </p:cNvPr>
@@ -3766,106 +3574,43 @@
           <p:nvPr/>
         </p:nvSpPr>
         <p:spPr>
-          <a:xfrm>
-            <a:off x="990600" y="5693049"/>
-            <a:ext cx="876693" cy="631596"/>
-          </a:xfrm>
-          <a:prstGeom prst="actionButtonHelp">
-            <a:avLst/>
-          </a:prstGeom>
-          <a:solidFill>
-            <a:schemeClr val="tx2">
-              <a:lumMod val="60000"/>
-              <a:lumOff val="40000"/>
-            </a:schemeClr>
-          </a:solidFill>
-          <a:effectLst>
-            <a:glow rad="127000">
-              <a:schemeClr val="accent1">
-                <a:alpha val="0"/>
-              </a:schemeClr>
-            </a:glow>
-          </a:effectLst>
+          <a:xfrm rot="5400000">
+            <a:off x="3854693" y="3227784"/>
+            <a:ext cx="696966" cy="1933281"/>
+          </a:xfrm>
+          <a:prstGeom prst="rightBrace">
+            <a:avLst/>
+          </a:prstGeom>
         </p:spPr>
         <p:style>
-          <a:lnRef idx="2">
-            <a:schemeClr val="accent6">
-              <a:shade val="50000"/>
-            </a:schemeClr>
+          <a:lnRef idx="1">
+            <a:schemeClr val="dk1"/>
           </a:lnRef>
-          <a:fillRef idx="1">
-            <a:schemeClr val="accent6"/>
+          <a:fillRef idx="0">
+            <a:schemeClr val="dk1"/>
           </a:fillRef>
           <a:effectRef idx="0">
-            <a:schemeClr val="accent6"/>
+            <a:schemeClr val="dk1"/>
           </a:effectRef>
           <a:fontRef idx="minor">
-            <a:schemeClr val="lt1"/>
+            <a:schemeClr val="tx1"/>
           </a:fontRef>
         </p:style>
         <p:txBody>
-          <a:bodyPr rot="0" spcFirstLastPara="0" vertOverflow="overflow" horzOverflow="overflow" vert="horz" wrap="square" lIns="91440" tIns="45720" rIns="91440" bIns="45720" numCol="1" spcCol="0" rtlCol="0" fromWordArt="0" anchor="ctr" anchorCtr="0" forceAA="0" compatLnSpc="1">
-            <a:prstTxWarp prst="textNoShape">
-              <a:avLst/>
-            </a:prstTxWarp>
-            <a:noAutofit/>
-          </a:bodyPr>
+          <a:bodyPr rtlCol="0" anchor="ctr"/>
           <a:lstStyle/>
           <a:p>
             <a:pPr algn="ctr"/>
-            <a:endParaRPr lang="fr-FR" b="1">
-              <a:ln w="22225">
-                <a:solidFill>
-                  <a:schemeClr val="accent2"/>
-                </a:solidFill>
-                <a:prstDash val="solid"/>
-              </a:ln>
-              <a:solidFill>
-                <a:schemeClr val="accent2">
-                  <a:lumMod val="40000"/>
-                  <a:lumOff val="60000"/>
-                </a:schemeClr>
-              </a:solidFill>
-            </a:endParaRPr>
-          </a:p>
-        </p:txBody>
-      </p:sp>
-      <p:pic>
-        <p:nvPicPr>
-          <p:cNvPr id="8" name="Image 7">
-            <a:extLst>
-              <a:ext uri="{FF2B5EF4-FFF2-40B4-BE49-F238E27FC236}">
-                <a16:creationId xmlns:a16="http://schemas.microsoft.com/office/drawing/2014/main" id="{ABEB0F3C-6B42-433E-8270-F726118F78F3}"/>
-              </a:ext>
-            </a:extLst>
-          </p:cNvPr>
-          <p:cNvPicPr>
-            <a:picLocks noChangeAspect="1"/>
-          </p:cNvPicPr>
-          <p:nvPr/>
-        </p:nvPicPr>
-        <p:blipFill>
-          <a:blip r:embed="rId3"/>
-          <a:stretch>
-            <a:fillRect/>
-          </a:stretch>
-        </p:blipFill>
-        <p:spPr>
-          <a:xfrm>
-            <a:off x="3236536" y="2239376"/>
-            <a:ext cx="5246515" cy="3177017"/>
-          </a:xfrm>
-          <a:prstGeom prst="rect">
-            <a:avLst/>
-          </a:prstGeom>
-        </p:spPr>
-      </p:pic>
-      <p:sp>
-        <p:nvSpPr>
-          <p:cNvPr id="9" name="ZoneTexte 8">
-            <a:extLst>
-              <a:ext uri="{FF2B5EF4-FFF2-40B4-BE49-F238E27FC236}">
-                <a16:creationId xmlns:a16="http://schemas.microsoft.com/office/drawing/2014/main" id="{302FF784-1908-002C-9AFB-014B429AB088}"/>
+            <a:endParaRPr lang="fr-FR"/>
+          </a:p>
+        </p:txBody>
+      </p:sp>
+      <p:sp>
+        <p:nvSpPr>
+          <p:cNvPr id="8" name="ZoneTexte 7">
+            <a:extLst>
+              <a:ext uri="{FF2B5EF4-FFF2-40B4-BE49-F238E27FC236}">
+                <a16:creationId xmlns:a16="http://schemas.microsoft.com/office/drawing/2014/main" id="{32F0DACC-4D8E-B627-3B3F-D81CCA90CD03}"/>
               </a:ext>
             </a:extLst>
           </p:cNvPr>
@@ -3874,8 +3619,8 @@
         </p:nvSpPr>
         <p:spPr>
           <a:xfrm>
-            <a:off x="4309083" y="5812681"/>
-            <a:ext cx="3101419" cy="923330"/>
+            <a:off x="2816650" y="4787595"/>
+            <a:ext cx="2465110" cy="1200329"/>
           </a:xfrm>
           <a:prstGeom prst="rect">
             <a:avLst/>
@@ -3891,7 +3636,177 @@
             <a:pPr algn="ctr"/>
             <a:r>
               <a:rPr lang="fr-FR" dirty="0"/>
-              <a:t>Tarif différents selon les besoins, datacenter en France, sauvegardes gratuites</a:t>
+              <a:t>Nom simple a se rappeler lorsque l’on veut contacter l’entreprise</a:t>
+            </a:r>
+          </a:p>
+        </p:txBody>
+      </p:sp>
+      <p:sp>
+        <p:nvSpPr>
+          <p:cNvPr id="9" name="Accolade fermante 8">
+            <a:extLst>
+              <a:ext uri="{FF2B5EF4-FFF2-40B4-BE49-F238E27FC236}">
+                <a16:creationId xmlns:a16="http://schemas.microsoft.com/office/drawing/2014/main" id="{C804400E-B19D-B3E6-EDEF-FAB87557158B}"/>
+              </a:ext>
+            </a:extLst>
+          </p:cNvPr>
+          <p:cNvSpPr/>
+          <p:nvPr/>
+        </p:nvSpPr>
+        <p:spPr>
+          <a:xfrm rot="5400000">
+            <a:off x="7401274" y="3896052"/>
+            <a:ext cx="729277" cy="564436"/>
+          </a:xfrm>
+          <a:prstGeom prst="rightBrace">
+            <a:avLst>
+              <a:gd name="adj1" fmla="val 8333"/>
+              <a:gd name="adj2" fmla="val 32099"/>
+            </a:avLst>
+          </a:prstGeom>
+        </p:spPr>
+        <p:style>
+          <a:lnRef idx="1">
+            <a:schemeClr val="dk1"/>
+          </a:lnRef>
+          <a:fillRef idx="0">
+            <a:schemeClr val="dk1"/>
+          </a:fillRef>
+          <a:effectRef idx="0">
+            <a:schemeClr val="dk1"/>
+          </a:effectRef>
+          <a:fontRef idx="minor">
+            <a:schemeClr val="tx1"/>
+          </a:fontRef>
+        </p:style>
+        <p:txBody>
+          <a:bodyPr rtlCol="0" anchor="ctr"/>
+          <a:lstStyle/>
+          <a:p>
+            <a:pPr algn="ctr"/>
+            <a:endParaRPr lang="fr-FR"/>
+          </a:p>
+        </p:txBody>
+      </p:sp>
+      <p:sp>
+        <p:nvSpPr>
+          <p:cNvPr id="10" name="ZoneTexte 9">
+            <a:extLst>
+              <a:ext uri="{FF2B5EF4-FFF2-40B4-BE49-F238E27FC236}">
+                <a16:creationId xmlns:a16="http://schemas.microsoft.com/office/drawing/2014/main" id="{2E711D51-92AD-2261-BFB2-989927AD5D50}"/>
+              </a:ext>
+            </a:extLst>
+          </p:cNvPr>
+          <p:cNvSpPr txBox="1"/>
+          <p:nvPr/>
+        </p:nvSpPr>
+        <p:spPr>
+          <a:xfrm>
+            <a:off x="7279452" y="4762709"/>
+            <a:ext cx="2256148" cy="923330"/>
+          </a:xfrm>
+          <a:prstGeom prst="rect">
+            <a:avLst/>
+          </a:prstGeom>
+          <a:noFill/>
+        </p:spPr>
+        <p:txBody>
+          <a:bodyPr wrap="square" rtlCol="0">
+            <a:spAutoFit/>
+          </a:bodyPr>
+          <a:lstStyle/>
+          <a:p>
+            <a:pPr algn="ctr"/>
+            <a:r>
+              <a:rPr lang="fr-FR" noProof="1"/>
+              <a:t>Extension de domaine rappelant le</a:t>
+            </a:r>
+            <a:r>
+              <a:rPr lang="fr-FR" dirty="0"/>
+              <a:t> pays du site</a:t>
+            </a:r>
+          </a:p>
+        </p:txBody>
+      </p:sp>
+      <p:sp>
+        <p:nvSpPr>
+          <p:cNvPr id="2" name="Accolade fermante 1">
+            <a:extLst>
+              <a:ext uri="{FF2B5EF4-FFF2-40B4-BE49-F238E27FC236}">
+                <a16:creationId xmlns:a16="http://schemas.microsoft.com/office/drawing/2014/main" id="{A1027260-E4B7-BFB0-F983-9739D0AC020F}"/>
+              </a:ext>
+            </a:extLst>
+          </p:cNvPr>
+          <p:cNvSpPr/>
+          <p:nvPr/>
+        </p:nvSpPr>
+        <p:spPr>
+          <a:xfrm rot="5400000">
+            <a:off x="6260492" y="3361617"/>
+            <a:ext cx="696965" cy="1743960"/>
+          </a:xfrm>
+          <a:prstGeom prst="rightBrace">
+            <a:avLst>
+              <a:gd name="adj1" fmla="val 8333"/>
+              <a:gd name="adj2" fmla="val 60575"/>
+            </a:avLst>
+          </a:prstGeom>
+        </p:spPr>
+        <p:style>
+          <a:lnRef idx="1">
+            <a:schemeClr val="dk1"/>
+          </a:lnRef>
+          <a:fillRef idx="0">
+            <a:schemeClr val="dk1"/>
+          </a:fillRef>
+          <a:effectRef idx="0">
+            <a:schemeClr val="dk1"/>
+          </a:effectRef>
+          <a:fontRef idx="minor">
+            <a:schemeClr val="tx1"/>
+          </a:fontRef>
+        </p:style>
+        <p:txBody>
+          <a:bodyPr rtlCol="0" anchor="ctr"/>
+          <a:lstStyle/>
+          <a:p>
+            <a:pPr algn="ctr"/>
+            <a:endParaRPr lang="fr-FR"/>
+          </a:p>
+        </p:txBody>
+      </p:sp>
+      <p:sp>
+        <p:nvSpPr>
+          <p:cNvPr id="6" name="ZoneTexte 5">
+            <a:extLst>
+              <a:ext uri="{FF2B5EF4-FFF2-40B4-BE49-F238E27FC236}">
+                <a16:creationId xmlns:a16="http://schemas.microsoft.com/office/drawing/2014/main" id="{9FEC5F05-DDE7-E336-F93D-FF9D131F232C}"/>
+              </a:ext>
+            </a:extLst>
+          </p:cNvPr>
+          <p:cNvSpPr txBox="1"/>
+          <p:nvPr/>
+        </p:nvSpPr>
+        <p:spPr>
+          <a:xfrm>
+            <a:off x="5015845" y="4787595"/>
+            <a:ext cx="2465110" cy="646331"/>
+          </a:xfrm>
+          <a:prstGeom prst="rect">
+            <a:avLst/>
+          </a:prstGeom>
+          <a:noFill/>
+        </p:spPr>
+        <p:txBody>
+          <a:bodyPr wrap="square" rtlCol="0">
+            <a:spAutoFit/>
+          </a:bodyPr>
+          <a:lstStyle/>
+          <a:p>
+            <a:pPr algn="ctr"/>
+            <a:r>
+              <a:rPr lang="fr-FR" dirty="0"/>
+              <a:t>Nom de domaine du site</a:t>
             </a:r>
           </a:p>
         </p:txBody>
@@ -3899,7 +3814,7 @@
     </p:spTree>
     <p:extLst>
       <p:ext uri="{BB962C8B-B14F-4D97-AF65-F5344CB8AC3E}">
-        <p14:creationId xmlns:p14="http://schemas.microsoft.com/office/powerpoint/2010/main" val="3500293761"/>
+        <p14:creationId xmlns:p14="http://schemas.microsoft.com/office/powerpoint/2010/main" val="2817343936"/>
       </p:ext>
     </p:extLst>
   </p:cSld>
@@ -3972,7 +3887,7 @@
                   <a:srgbClr val="00823B"/>
                 </a:solidFill>
               </a:rPr>
-              <a:t>VII/ Le choix du mail de l’entreprise</a:t>
+              <a:t>VIII/ L’accessibilité</a:t>
             </a:r>
             <a:endParaRPr lang="en-US" sz="2400" b="1" u="sng" dirty="0">
               <a:solidFill>
@@ -4050,10 +3965,10 @@
       </p:sp>
       <p:sp>
         <p:nvSpPr>
-          <p:cNvPr id="4" name="ZoneTexte 3">
-            <a:extLst>
-              <a:ext uri="{FF2B5EF4-FFF2-40B4-BE49-F238E27FC236}">
-                <a16:creationId xmlns:a16="http://schemas.microsoft.com/office/drawing/2014/main" id="{C647BF18-FB19-1BD3-1061-36C6100AE173}"/>
+          <p:cNvPr id="2" name="ZoneTexte 1">
+            <a:extLst>
+              <a:ext uri="{FF2B5EF4-FFF2-40B4-BE49-F238E27FC236}">
+                <a16:creationId xmlns:a16="http://schemas.microsoft.com/office/drawing/2014/main" id="{31B58EF4-1DEB-74AB-8574-C986567365C4}"/>
               </a:ext>
             </a:extLst>
           </p:cNvPr>
@@ -4062,114 +3977,8 @@
         </p:nvSpPr>
         <p:spPr>
           <a:xfrm>
-            <a:off x="2669356" y="3242820"/>
-            <a:ext cx="6078718" cy="830997"/>
-          </a:xfrm>
-          <a:prstGeom prst="rect">
-            <a:avLst/>
-          </a:prstGeom>
-          <a:noFill/>
-          <a:effectLst>
-            <a:outerShdw blurRad="50800" dist="38100" dir="5400000" algn="t" rotWithShape="0">
-              <a:prstClr val="black">
-                <a:alpha val="40000"/>
-              </a:prstClr>
-            </a:outerShdw>
-          </a:effectLst>
-        </p:spPr>
-        <p:txBody>
-          <a:bodyPr wrap="square" rtlCol="0" anchor="ctr">
-            <a:spAutoFit/>
-          </a:bodyPr>
-          <a:lstStyle/>
-          <a:p>
-            <a:pPr algn="ctr"/>
-            <a:r>
-              <a:rPr lang="fr-FR" sz="4800" dirty="0">
-                <a:solidFill>
-                  <a:schemeClr val="tx1">
-                    <a:lumMod val="95000"/>
-                    <a:lumOff val="5000"/>
-                  </a:schemeClr>
-                </a:solidFill>
-                <a:latin typeface="Times New Roman" panose="02020603050405020304" pitchFamily="18" charset="0"/>
-                <a:cs typeface="Times New Roman" panose="02020603050405020304" pitchFamily="18" charset="0"/>
-              </a:rPr>
-              <a:t>contact@qwenta.fr</a:t>
-            </a:r>
-            <a:endParaRPr lang="en-US" sz="4800" dirty="0">
-              <a:solidFill>
-                <a:schemeClr val="tx1">
-                  <a:lumMod val="95000"/>
-                  <a:lumOff val="5000"/>
-                </a:schemeClr>
-              </a:solidFill>
-              <a:latin typeface="Times New Roman" panose="02020603050405020304" pitchFamily="18" charset="0"/>
-              <a:cs typeface="Times New Roman" panose="02020603050405020304" pitchFamily="18" charset="0"/>
-            </a:endParaRPr>
-          </a:p>
-        </p:txBody>
-      </p:sp>
-      <p:sp>
-        <p:nvSpPr>
-          <p:cNvPr id="7" name="Accolade fermante 6">
-            <a:extLst>
-              <a:ext uri="{FF2B5EF4-FFF2-40B4-BE49-F238E27FC236}">
-                <a16:creationId xmlns:a16="http://schemas.microsoft.com/office/drawing/2014/main" id="{864B0136-76ED-8DB1-8D11-A1CE91444D23}"/>
-              </a:ext>
-            </a:extLst>
-          </p:cNvPr>
-          <p:cNvSpPr/>
-          <p:nvPr/>
-        </p:nvSpPr>
-        <p:spPr>
-          <a:xfrm rot="5400000">
-            <a:off x="3854693" y="3227784"/>
-            <a:ext cx="696966" cy="1933281"/>
-          </a:xfrm>
-          <a:prstGeom prst="rightBrace">
-            <a:avLst/>
-          </a:prstGeom>
-        </p:spPr>
-        <p:style>
-          <a:lnRef idx="1">
-            <a:schemeClr val="dk1"/>
-          </a:lnRef>
-          <a:fillRef idx="0">
-            <a:schemeClr val="dk1"/>
-          </a:fillRef>
-          <a:effectRef idx="0">
-            <a:schemeClr val="dk1"/>
-          </a:effectRef>
-          <a:fontRef idx="minor">
-            <a:schemeClr val="tx1"/>
-          </a:fontRef>
-        </p:style>
-        <p:txBody>
-          <a:bodyPr rtlCol="0" anchor="ctr"/>
-          <a:lstStyle/>
-          <a:p>
-            <a:pPr algn="ctr"/>
-            <a:endParaRPr lang="fr-FR"/>
-          </a:p>
-        </p:txBody>
-      </p:sp>
-      <p:sp>
-        <p:nvSpPr>
-          <p:cNvPr id="8" name="ZoneTexte 7">
-            <a:extLst>
-              <a:ext uri="{FF2B5EF4-FFF2-40B4-BE49-F238E27FC236}">
-                <a16:creationId xmlns:a16="http://schemas.microsoft.com/office/drawing/2014/main" id="{32F0DACC-4D8E-B627-3B3F-D81CCA90CD03}"/>
-              </a:ext>
-            </a:extLst>
-          </p:cNvPr>
-          <p:cNvSpPr txBox="1"/>
-          <p:nvPr/>
-        </p:nvSpPr>
-        <p:spPr>
-          <a:xfrm>
-            <a:off x="2816650" y="4787595"/>
-            <a:ext cx="2465110" cy="1200329"/>
+            <a:off x="3497343" y="2427507"/>
+            <a:ext cx="4751109" cy="646331"/>
           </a:xfrm>
           <a:prstGeom prst="rect">
             <a:avLst/>
@@ -4185,17 +3994,18 @@
             <a:pPr algn="ctr"/>
             <a:r>
               <a:rPr lang="fr-FR" dirty="0"/>
-              <a:t>Nom simple a se rappeler lorsque l’on veut contacter l’entreprise</a:t>
-            </a:r>
-          </a:p>
-        </p:txBody>
-      </p:sp>
-      <p:sp>
-        <p:nvSpPr>
-          <p:cNvPr id="9" name="Accolade fermante 8">
-            <a:extLst>
-              <a:ext uri="{FF2B5EF4-FFF2-40B4-BE49-F238E27FC236}">
-                <a16:creationId xmlns:a16="http://schemas.microsoft.com/office/drawing/2014/main" id="{C804400E-B19D-B3E6-EDEF-FAB87557158B}"/>
+              <a:t>Le site doit être accessible au dernières version des navigateurs les plus utilisés</a:t>
+            </a:r>
+          </a:p>
+        </p:txBody>
+      </p:sp>
+      <p:sp>
+        <p:nvSpPr>
+          <p:cNvPr id="4" name="Bouton d'action : Aide 3">
+            <a:hlinkClick r:id="rId2" highlightClick="1"/>
+            <a:extLst>
+              <a:ext uri="{FF2B5EF4-FFF2-40B4-BE49-F238E27FC236}">
+                <a16:creationId xmlns:a16="http://schemas.microsoft.com/office/drawing/2014/main" id="{40442D20-88E4-26A8-B6C5-F896E589F369}"/>
               </a:ext>
             </a:extLst>
           </p:cNvPr>
@@ -4203,46 +4013,213 @@
           <p:nvPr/>
         </p:nvSpPr>
         <p:spPr>
-          <a:xfrm rot="5400000">
-            <a:off x="7401274" y="3896052"/>
-            <a:ext cx="729277" cy="564436"/>
-          </a:xfrm>
-          <a:prstGeom prst="rightBrace">
-            <a:avLst>
-              <a:gd name="adj1" fmla="val 8333"/>
-              <a:gd name="adj2" fmla="val 32099"/>
-            </a:avLst>
-          </a:prstGeom>
+          <a:xfrm>
+            <a:off x="990600" y="5693049"/>
+            <a:ext cx="876693" cy="631596"/>
+          </a:xfrm>
+          <a:prstGeom prst="actionButtonHelp">
+            <a:avLst/>
+          </a:prstGeom>
+          <a:solidFill>
+            <a:schemeClr val="tx2">
+              <a:lumMod val="60000"/>
+              <a:lumOff val="40000"/>
+            </a:schemeClr>
+          </a:solidFill>
+          <a:effectLst>
+            <a:glow rad="127000">
+              <a:schemeClr val="accent1">
+                <a:alpha val="0"/>
+              </a:schemeClr>
+            </a:glow>
+          </a:effectLst>
         </p:spPr>
         <p:style>
-          <a:lnRef idx="1">
-            <a:schemeClr val="dk1"/>
+          <a:lnRef idx="2">
+            <a:schemeClr val="accent6">
+              <a:shade val="50000"/>
+            </a:schemeClr>
           </a:lnRef>
-          <a:fillRef idx="0">
-            <a:schemeClr val="dk1"/>
+          <a:fillRef idx="1">
+            <a:schemeClr val="accent6"/>
           </a:fillRef>
           <a:effectRef idx="0">
-            <a:schemeClr val="dk1"/>
+            <a:schemeClr val="accent6"/>
           </a:effectRef>
           <a:fontRef idx="minor">
-            <a:schemeClr val="tx1"/>
+            <a:schemeClr val="lt1"/>
           </a:fontRef>
         </p:style>
         <p:txBody>
-          <a:bodyPr rtlCol="0" anchor="ctr"/>
+          <a:bodyPr rot="0" spcFirstLastPara="0" vertOverflow="overflow" horzOverflow="overflow" vert="horz" wrap="square" lIns="91440" tIns="45720" rIns="91440" bIns="45720" numCol="1" spcCol="0" rtlCol="0" fromWordArt="0" anchor="ctr" anchorCtr="0" forceAA="0" compatLnSpc="1">
+            <a:prstTxWarp prst="textNoShape">
+              <a:avLst/>
+            </a:prstTxWarp>
+            <a:noAutofit/>
+          </a:bodyPr>
           <a:lstStyle/>
           <a:p>
             <a:pPr algn="ctr"/>
+            <a:endParaRPr lang="fr-FR" b="1">
+              <a:ln w="22225">
+                <a:solidFill>
+                  <a:schemeClr val="accent2"/>
+                </a:solidFill>
+                <a:prstDash val="solid"/>
+              </a:ln>
+              <a:solidFill>
+                <a:schemeClr val="accent2">
+                  <a:lumMod val="40000"/>
+                  <a:lumOff val="60000"/>
+                </a:schemeClr>
+              </a:solidFill>
+            </a:endParaRPr>
+          </a:p>
+        </p:txBody>
+      </p:sp>
+      <p:sp>
+        <p:nvSpPr>
+          <p:cNvPr id="6" name="AutoShape 2" descr="Google Chrome — Wikipédia">
+            <a:extLst>
+              <a:ext uri="{FF2B5EF4-FFF2-40B4-BE49-F238E27FC236}">
+                <a16:creationId xmlns:a16="http://schemas.microsoft.com/office/drawing/2014/main" id="{483AA521-FC1F-D626-45AD-565F9954F4DB}"/>
+              </a:ext>
+            </a:extLst>
+          </p:cNvPr>
+          <p:cNvSpPr>
+            <a:spLocks noChangeAspect="1" noChangeArrowheads="1"/>
+          </p:cNvSpPr>
+          <p:nvPr/>
+        </p:nvSpPr>
+        <p:spPr bwMode="auto">
+          <a:xfrm>
+            <a:off x="5943600" y="2963944"/>
+            <a:ext cx="617456" cy="617456"/>
+          </a:xfrm>
+          <a:prstGeom prst="rect">
+            <a:avLst/>
+          </a:prstGeom>
+          <a:noFill/>
+          <a:extLst>
+            <a:ext uri="{909E8E84-426E-40DD-AFC4-6F175D3DCCD1}">
+              <a14:hiddenFill xmlns:a14="http://schemas.microsoft.com/office/drawing/2010/main">
+                <a:solidFill>
+                  <a:srgbClr val="FFFFFF"/>
+                </a:solidFill>
+              </a14:hiddenFill>
+            </a:ext>
+          </a:extLst>
+        </p:spPr>
+        <p:txBody>
+          <a:bodyPr vert="horz" wrap="square" lIns="91440" tIns="45720" rIns="91440" bIns="45720" numCol="1" anchor="t" anchorCtr="0" compatLnSpc="1">
+            <a:prstTxWarp prst="textNoShape">
+              <a:avLst/>
+            </a:prstTxWarp>
+          </a:bodyPr>
+          <a:lstStyle/>
+          <a:p>
             <a:endParaRPr lang="fr-FR"/>
           </a:p>
         </p:txBody>
       </p:sp>
       <p:sp>
         <p:nvSpPr>
-          <p:cNvPr id="10" name="ZoneTexte 9">
-            <a:extLst>
-              <a:ext uri="{FF2B5EF4-FFF2-40B4-BE49-F238E27FC236}">
-                <a16:creationId xmlns:a16="http://schemas.microsoft.com/office/drawing/2014/main" id="{2E711D51-92AD-2261-BFB2-989927AD5D50}"/>
+          <p:cNvPr id="7" name="AutoShape 4" descr="Google Chrome — Wikipédia">
+            <a:extLst>
+              <a:ext uri="{FF2B5EF4-FFF2-40B4-BE49-F238E27FC236}">
+                <a16:creationId xmlns:a16="http://schemas.microsoft.com/office/drawing/2014/main" id="{A14203AD-CD9C-156A-823A-9C0CEBCAD55E}"/>
+              </a:ext>
+            </a:extLst>
+          </p:cNvPr>
+          <p:cNvSpPr>
+            <a:spLocks noChangeAspect="1" noChangeArrowheads="1"/>
+          </p:cNvSpPr>
+          <p:nvPr/>
+        </p:nvSpPr>
+        <p:spPr bwMode="auto">
+          <a:xfrm>
+            <a:off x="5434553" y="3965437"/>
+            <a:ext cx="304800" cy="304800"/>
+          </a:xfrm>
+          <a:prstGeom prst="rect">
+            <a:avLst/>
+          </a:prstGeom>
+          <a:noFill/>
+          <a:extLst>
+            <a:ext uri="{909E8E84-426E-40DD-AFC4-6F175D3DCCD1}">
+              <a14:hiddenFill xmlns:a14="http://schemas.microsoft.com/office/drawing/2010/main">
+                <a:solidFill>
+                  <a:srgbClr val="FFFFFF"/>
+                </a:solidFill>
+              </a14:hiddenFill>
+            </a:ext>
+          </a:extLst>
+        </p:spPr>
+        <p:txBody>
+          <a:bodyPr vert="horz" wrap="square" lIns="91440" tIns="45720" rIns="91440" bIns="45720" numCol="1" anchor="t" anchorCtr="0" compatLnSpc="1">
+            <a:prstTxWarp prst="textNoShape">
+              <a:avLst/>
+            </a:prstTxWarp>
+          </a:bodyPr>
+          <a:lstStyle/>
+          <a:p>
+            <a:endParaRPr lang="fr-FR"/>
+          </a:p>
+        </p:txBody>
+      </p:sp>
+      <p:pic>
+        <p:nvPicPr>
+          <p:cNvPr id="5126" name="Picture 6" descr="Chrome Logo et symbole, sens, histoire, PNG, marque">
+            <a:extLst>
+              <a:ext uri="{FF2B5EF4-FFF2-40B4-BE49-F238E27FC236}">
+                <a16:creationId xmlns:a16="http://schemas.microsoft.com/office/drawing/2014/main" id="{8700DB2E-E529-B6CF-0BCF-6392AF3CCE2F}"/>
+              </a:ext>
+            </a:extLst>
+          </p:cNvPr>
+          <p:cNvPicPr>
+            <a:picLocks noChangeAspect="1" noChangeArrowheads="1"/>
+          </p:cNvPicPr>
+          <p:nvPr/>
+        </p:nvPicPr>
+        <p:blipFill>
+          <a:blip r:embed="rId3">
+            <a:extLst>
+              <a:ext uri="{28A0092B-C50C-407E-A947-70E740481C1C}">
+                <a14:useLocalDpi xmlns:a14="http://schemas.microsoft.com/office/drawing/2010/main" val="0"/>
+              </a:ext>
+            </a:extLst>
+          </a:blip>
+          <a:srcRect/>
+          <a:stretch>
+            <a:fillRect/>
+          </a:stretch>
+        </p:blipFill>
+        <p:spPr bwMode="auto">
+          <a:xfrm>
+            <a:off x="2183948" y="3527876"/>
+            <a:ext cx="2626789" cy="1484722"/>
+          </a:xfrm>
+          <a:prstGeom prst="rect">
+            <a:avLst/>
+          </a:prstGeom>
+          <a:noFill/>
+          <a:extLst>
+            <a:ext uri="{909E8E84-426E-40DD-AFC4-6F175D3DCCD1}">
+              <a14:hiddenFill xmlns:a14="http://schemas.microsoft.com/office/drawing/2010/main">
+                <a:solidFill>
+                  <a:srgbClr val="FFFFFF"/>
+                </a:solidFill>
+              </a14:hiddenFill>
+            </a:ext>
+          </a:extLst>
+        </p:spPr>
+      </p:pic>
+      <p:sp>
+        <p:nvSpPr>
+          <p:cNvPr id="8" name="ZoneTexte 7">
+            <a:extLst>
+              <a:ext uri="{FF2B5EF4-FFF2-40B4-BE49-F238E27FC236}">
+                <a16:creationId xmlns:a16="http://schemas.microsoft.com/office/drawing/2014/main" id="{4C7A2982-DB13-7275-3E40-984F467D6123}"/>
               </a:ext>
             </a:extLst>
           </p:cNvPr>
@@ -4251,8 +4228,8 @@
         </p:nvSpPr>
         <p:spPr>
           <a:xfrm>
-            <a:off x="7279452" y="4762709"/>
-            <a:ext cx="2256148" cy="923330"/>
+            <a:off x="2658356" y="5151748"/>
+            <a:ext cx="1677971" cy="923330"/>
           </a:xfrm>
           <a:prstGeom prst="rect">
             <a:avLst/>
@@ -4267,69 +4244,74 @@
           <a:p>
             <a:pPr algn="ctr"/>
             <a:r>
-              <a:rPr lang="fr-FR" noProof="1"/>
-              <a:t>Extension de domaine rappelant le</a:t>
-            </a:r>
-            <a:r>
               <a:rPr lang="fr-FR" dirty="0"/>
-              <a:t> pays du site</a:t>
-            </a:r>
-          </a:p>
-        </p:txBody>
-      </p:sp>
-      <p:sp>
-        <p:nvSpPr>
-          <p:cNvPr id="2" name="Accolade fermante 1">
-            <a:extLst>
-              <a:ext uri="{FF2B5EF4-FFF2-40B4-BE49-F238E27FC236}">
-                <a16:creationId xmlns:a16="http://schemas.microsoft.com/office/drawing/2014/main" id="{A1027260-E4B7-BFB0-F983-9739D0AC020F}"/>
-              </a:ext>
-            </a:extLst>
-          </p:cNvPr>
-          <p:cNvSpPr/>
-          <p:nvPr/>
-        </p:nvSpPr>
-        <p:spPr>
-          <a:xfrm rot="5400000">
-            <a:off x="6260492" y="3361617"/>
-            <a:ext cx="696965" cy="1743960"/>
-          </a:xfrm>
-          <a:prstGeom prst="rightBrace">
-            <a:avLst>
-              <a:gd name="adj1" fmla="val 8333"/>
-              <a:gd name="adj2" fmla="val 60575"/>
-            </a:avLst>
-          </a:prstGeom>
-        </p:spPr>
-        <p:style>
-          <a:lnRef idx="1">
-            <a:schemeClr val="dk1"/>
-          </a:lnRef>
-          <a:fillRef idx="0">
-            <a:schemeClr val="dk1"/>
-          </a:fillRef>
-          <a:effectRef idx="0">
-            <a:schemeClr val="dk1"/>
-          </a:effectRef>
-          <a:fontRef idx="minor">
-            <a:schemeClr val="tx1"/>
-          </a:fontRef>
-        </p:style>
-        <p:txBody>
-          <a:bodyPr rtlCol="0" anchor="ctr"/>
-          <a:lstStyle/>
-          <a:p>
-            <a:pPr algn="ctr"/>
-            <a:endParaRPr lang="fr-FR"/>
-          </a:p>
-        </p:txBody>
-      </p:sp>
-      <p:sp>
-        <p:nvSpPr>
-          <p:cNvPr id="6" name="ZoneTexte 5">
-            <a:extLst>
-              <a:ext uri="{FF2B5EF4-FFF2-40B4-BE49-F238E27FC236}">
-                <a16:creationId xmlns:a16="http://schemas.microsoft.com/office/drawing/2014/main" id="{9FEC5F05-DDE7-E336-F93D-FF9D131F232C}"/>
+              <a:t>Google chrome </a:t>
+            </a:r>
+            <a:r>
+              <a:rPr lang="fr-FR" sz="1800" dirty="0">
+                <a:effectLst/>
+                <a:ea typeface="Montserrat" panose="00000500000000000000" pitchFamily="2" charset="0"/>
+                <a:cs typeface="Montserrat" panose="00000500000000000000" pitchFamily="2" charset="0"/>
+              </a:rPr>
+              <a:t>Version 111.0.5563.65</a:t>
+            </a:r>
+            <a:endParaRPr lang="fr-FR" dirty="0"/>
+          </a:p>
+        </p:txBody>
+      </p:sp>
+      <p:pic>
+        <p:nvPicPr>
+          <p:cNvPr id="5128" name="Picture 8">
+            <a:extLst>
+              <a:ext uri="{FF2B5EF4-FFF2-40B4-BE49-F238E27FC236}">
+                <a16:creationId xmlns:a16="http://schemas.microsoft.com/office/drawing/2014/main" id="{237803E6-3E39-9EF1-42C5-BFE2C72A2B6E}"/>
+              </a:ext>
+            </a:extLst>
+          </p:cNvPr>
+          <p:cNvPicPr>
+            <a:picLocks noChangeAspect="1" noChangeArrowheads="1"/>
+          </p:cNvPicPr>
+          <p:nvPr/>
+        </p:nvPicPr>
+        <p:blipFill>
+          <a:blip r:embed="rId4">
+            <a:extLst>
+              <a:ext uri="{28A0092B-C50C-407E-A947-70E740481C1C}">
+                <a14:useLocalDpi xmlns:a14="http://schemas.microsoft.com/office/drawing/2010/main" val="0"/>
+              </a:ext>
+            </a:extLst>
+          </a:blip>
+          <a:srcRect/>
+          <a:stretch>
+            <a:fillRect/>
+          </a:stretch>
+        </p:blipFill>
+        <p:spPr bwMode="auto">
+          <a:xfrm>
+            <a:off x="5215092" y="3636156"/>
+            <a:ext cx="1315610" cy="1394708"/>
+          </a:xfrm>
+          <a:prstGeom prst="rect">
+            <a:avLst/>
+          </a:prstGeom>
+          <a:noFill/>
+          <a:extLst>
+            <a:ext uri="{909E8E84-426E-40DD-AFC4-6F175D3DCCD1}">
+              <a14:hiddenFill xmlns:a14="http://schemas.microsoft.com/office/drawing/2010/main">
+                <a:solidFill>
+                  <a:srgbClr val="FFFFFF"/>
+                </a:solidFill>
+              </a14:hiddenFill>
+            </a:ext>
+          </a:extLst>
+        </p:spPr>
+      </p:pic>
+      <p:sp>
+        <p:nvSpPr>
+          <p:cNvPr id="9" name="ZoneTexte 8">
+            <a:extLst>
+              <a:ext uri="{FF2B5EF4-FFF2-40B4-BE49-F238E27FC236}">
+                <a16:creationId xmlns:a16="http://schemas.microsoft.com/office/drawing/2014/main" id="{6D2C57F1-52AF-3926-3C53-AC2B6D1D9BC7}"/>
               </a:ext>
             </a:extLst>
           </p:cNvPr>
@@ -4338,8 +4320,8 @@
         </p:nvSpPr>
         <p:spPr>
           <a:xfrm>
-            <a:off x="5015845" y="4787595"/>
-            <a:ext cx="2465110" cy="646331"/>
+            <a:off x="5033911" y="5151748"/>
+            <a:ext cx="1677971" cy="923330"/>
           </a:xfrm>
           <a:prstGeom prst="rect">
             <a:avLst/>
@@ -4355,15 +4337,139 @@
             <a:pPr algn="ctr"/>
             <a:r>
               <a:rPr lang="fr-FR" dirty="0"/>
-              <a:t>Nom de domaine du site</a:t>
-            </a:r>
-          </a:p>
-        </p:txBody>
-      </p:sp>
+              <a:t>Firefox</a:t>
+            </a:r>
+          </a:p>
+          <a:p>
+            <a:pPr algn="ctr"/>
+            <a:r>
+              <a:rPr lang="fr-FR" sz="1800" dirty="0">
+                <a:effectLst/>
+                <a:ea typeface="Montserrat" panose="00000500000000000000" pitchFamily="2" charset="0"/>
+                <a:cs typeface="Montserrat" panose="00000500000000000000" pitchFamily="2" charset="0"/>
+              </a:rPr>
+              <a:t>Version </a:t>
+            </a:r>
+          </a:p>
+          <a:p>
+            <a:pPr algn="ctr"/>
+            <a:r>
+              <a:rPr lang="fr-FR" sz="1800" dirty="0">
+                <a:effectLst/>
+                <a:ea typeface="Montserrat" panose="00000500000000000000" pitchFamily="2" charset="0"/>
+                <a:cs typeface="Montserrat" panose="00000500000000000000" pitchFamily="2" charset="0"/>
+              </a:rPr>
+              <a:t>110.0.1</a:t>
+            </a:r>
+            <a:endParaRPr lang="fr-FR" dirty="0"/>
+          </a:p>
+        </p:txBody>
+      </p:sp>
+      <p:sp>
+        <p:nvSpPr>
+          <p:cNvPr id="10" name="ZoneTexte 9">
+            <a:extLst>
+              <a:ext uri="{FF2B5EF4-FFF2-40B4-BE49-F238E27FC236}">
+                <a16:creationId xmlns:a16="http://schemas.microsoft.com/office/drawing/2014/main" id="{F566CCC5-BE23-DA0B-B75D-D8A054390EAA}"/>
+              </a:ext>
+            </a:extLst>
+          </p:cNvPr>
+          <p:cNvSpPr txBox="1"/>
+          <p:nvPr/>
+        </p:nvSpPr>
+        <p:spPr>
+          <a:xfrm>
+            <a:off x="7933256" y="5137608"/>
+            <a:ext cx="1677971" cy="646331"/>
+          </a:xfrm>
+          <a:prstGeom prst="rect">
+            <a:avLst/>
+          </a:prstGeom>
+          <a:noFill/>
+        </p:spPr>
+        <p:txBody>
+          <a:bodyPr wrap="square" rtlCol="0">
+            <a:spAutoFit/>
+          </a:bodyPr>
+          <a:lstStyle/>
+          <a:p>
+            <a:pPr algn="ctr"/>
+            <a:r>
+              <a:rPr lang="fr-FR" dirty="0"/>
+              <a:t>Safari</a:t>
+            </a:r>
+          </a:p>
+          <a:p>
+            <a:pPr algn="ctr"/>
+            <a:r>
+              <a:rPr lang="fr-FR" sz="1800" dirty="0">
+                <a:effectLst/>
+                <a:ea typeface="Montserrat" panose="00000500000000000000" pitchFamily="2" charset="0"/>
+                <a:cs typeface="Montserrat" panose="00000500000000000000" pitchFamily="2" charset="0"/>
+              </a:rPr>
+              <a:t>Version </a:t>
+            </a:r>
+            <a:r>
+              <a:rPr lang="en-US" b="0" i="0" dirty="0">
+                <a:effectLst/>
+              </a:rPr>
+              <a:t>5.1.7</a:t>
+            </a:r>
+            <a:endParaRPr lang="fr-FR" dirty="0"/>
+          </a:p>
+        </p:txBody>
+      </p:sp>
+      <p:pic>
+        <p:nvPicPr>
+          <p:cNvPr id="1026" name="Picture 2">
+            <a:extLst>
+              <a:ext uri="{FF2B5EF4-FFF2-40B4-BE49-F238E27FC236}">
+                <a16:creationId xmlns:a16="http://schemas.microsoft.com/office/drawing/2014/main" id="{D6E9D57E-7E18-E6EE-E702-C5897953BE2F}"/>
+              </a:ext>
+            </a:extLst>
+          </p:cNvPr>
+          <p:cNvPicPr>
+            <a:picLocks noChangeAspect="1" noChangeArrowheads="1"/>
+          </p:cNvPicPr>
+          <p:nvPr/>
+        </p:nvPicPr>
+        <p:blipFill>
+          <a:blip r:embed="rId5">
+            <a:extLst>
+              <a:ext uri="{28A0092B-C50C-407E-A947-70E740481C1C}">
+                <a14:useLocalDpi xmlns:a14="http://schemas.microsoft.com/office/drawing/2010/main" val="0"/>
+              </a:ext>
+            </a:extLst>
+          </a:blip>
+          <a:srcRect/>
+          <a:stretch>
+            <a:fillRect/>
+          </a:stretch>
+        </p:blipFill>
+        <p:spPr bwMode="auto">
+          <a:xfrm>
+            <a:off x="7933256" y="3527876"/>
+            <a:ext cx="1506835" cy="1500237"/>
+          </a:xfrm>
+          <a:prstGeom prst="rect">
+            <a:avLst/>
+          </a:prstGeom>
+          <a:noFill/>
+          <a:extLst>
+            <a:ext uri="{909E8E84-426E-40DD-AFC4-6F175D3DCCD1}">
+              <a14:hiddenFill xmlns:a14="http://schemas.microsoft.com/office/drawing/2010/main">
+                <a:solidFill>
+                  <a:srgbClr val="FFFFFF"/>
+                </a:solidFill>
+              </a14:hiddenFill>
+            </a:ext>
+          </a:extLst>
+        </p:spPr>
+      </p:pic>
     </p:spTree>
     <p:extLst>
       <p:ext uri="{BB962C8B-B14F-4D97-AF65-F5344CB8AC3E}">
-        <p14:creationId xmlns:p14="http://schemas.microsoft.com/office/powerpoint/2010/main" val="2817343936"/>
+        <p14:creationId xmlns:p14="http://schemas.microsoft.com/office/powerpoint/2010/main" val="3248586407"/>
       </p:ext>
     </p:extLst>
   </p:cSld>
@@ -4436,7 +4542,7 @@
                   <a:srgbClr val="00823B"/>
                 </a:solidFill>
               </a:rPr>
-              <a:t>VIII/ L’accessibilité</a:t>
+              <a:t>IX/ Les mesures de sécurités</a:t>
             </a:r>
             <a:endParaRPr lang="en-US" sz="2400" b="1" u="sng" dirty="0">
               <a:solidFill>
@@ -4514,42 +4620,6 @@
       </p:sp>
       <p:sp>
         <p:nvSpPr>
-          <p:cNvPr id="2" name="ZoneTexte 1">
-            <a:extLst>
-              <a:ext uri="{FF2B5EF4-FFF2-40B4-BE49-F238E27FC236}">
-                <a16:creationId xmlns:a16="http://schemas.microsoft.com/office/drawing/2014/main" id="{31B58EF4-1DEB-74AB-8574-C986567365C4}"/>
-              </a:ext>
-            </a:extLst>
-          </p:cNvPr>
-          <p:cNvSpPr txBox="1"/>
-          <p:nvPr/>
-        </p:nvSpPr>
-        <p:spPr>
-          <a:xfrm>
-            <a:off x="3497343" y="2427507"/>
-            <a:ext cx="4751109" cy="646331"/>
-          </a:xfrm>
-          <a:prstGeom prst="rect">
-            <a:avLst/>
-          </a:prstGeom>
-          <a:noFill/>
-        </p:spPr>
-        <p:txBody>
-          <a:bodyPr wrap="square" rtlCol="0">
-            <a:spAutoFit/>
-          </a:bodyPr>
-          <a:lstStyle/>
-          <a:p>
-            <a:pPr algn="ctr"/>
-            <a:r>
-              <a:rPr lang="fr-FR" dirty="0"/>
-              <a:t>Le site doit être accessible au dernières version des navigateurs les plus utilisés</a:t>
-            </a:r>
-          </a:p>
-        </p:txBody>
-      </p:sp>
-      <p:sp>
-        <p:nvSpPr>
           <p:cNvPr id="4" name="Bouton d'action : Aide 3">
             <a:hlinkClick r:id="rId2" highlightClick="1"/>
             <a:extLst>
@@ -4626,24 +4696,37 @@
           </a:p>
         </p:txBody>
       </p:sp>
-      <p:sp>
-        <p:nvSpPr>
-          <p:cNvPr id="6" name="AutoShape 2" descr="Google Chrome — Wikipédia">
-            <a:extLst>
-              <a:ext uri="{FF2B5EF4-FFF2-40B4-BE49-F238E27FC236}">
-                <a16:creationId xmlns:a16="http://schemas.microsoft.com/office/drawing/2014/main" id="{483AA521-FC1F-D626-45AD-565F9954F4DB}"/>
-              </a:ext>
-            </a:extLst>
-          </p:cNvPr>
-          <p:cNvSpPr>
-            <a:spLocks noChangeAspect="1" noChangeArrowheads="1"/>
-          </p:cNvSpPr>
-          <p:nvPr/>
-        </p:nvSpPr>
+      <p:pic>
+        <p:nvPicPr>
+          <p:cNvPr id="10242" name="Picture 2">
+            <a:extLst>
+              <a:ext uri="{FF2B5EF4-FFF2-40B4-BE49-F238E27FC236}">
+                <a16:creationId xmlns:a16="http://schemas.microsoft.com/office/drawing/2014/main" id="{9BD47286-EBF4-401F-DEF0-E0FE2C2827FB}"/>
+              </a:ext>
+            </a:extLst>
+          </p:cNvPr>
+          <p:cNvPicPr>
+            <a:picLocks noChangeAspect="1" noChangeArrowheads="1"/>
+          </p:cNvPicPr>
+          <p:nvPr/>
+        </p:nvPicPr>
+        <p:blipFill>
+          <a:blip r:embed="rId3">
+            <a:extLst>
+              <a:ext uri="{28A0092B-C50C-407E-A947-70E740481C1C}">
+                <a14:useLocalDpi xmlns:a14="http://schemas.microsoft.com/office/drawing/2010/main" val="0"/>
+              </a:ext>
+            </a:extLst>
+          </a:blip>
+          <a:srcRect/>
+          <a:stretch>
+            <a:fillRect/>
+          </a:stretch>
+        </p:blipFill>
         <p:spPr bwMode="auto">
           <a:xfrm>
-            <a:off x="5943600" y="2963944"/>
-            <a:ext cx="617456" cy="617456"/>
+            <a:off x="990600" y="2623106"/>
+            <a:ext cx="2824393" cy="1611787"/>
           </a:xfrm>
           <a:prstGeom prst="rect">
             <a:avLst/>
@@ -4659,36 +4742,184 @@
             </a:ext>
           </a:extLst>
         </p:spPr>
-        <p:txBody>
-          <a:bodyPr vert="horz" wrap="square" lIns="91440" tIns="45720" rIns="91440" bIns="45720" numCol="1" anchor="t" anchorCtr="0" compatLnSpc="1">
-            <a:prstTxWarp prst="textNoShape">
-              <a:avLst/>
-            </a:prstTxWarp>
+      </p:pic>
+      <p:sp>
+        <p:nvSpPr>
+          <p:cNvPr id="11" name="ZoneTexte 10">
+            <a:extLst>
+              <a:ext uri="{FF2B5EF4-FFF2-40B4-BE49-F238E27FC236}">
+                <a16:creationId xmlns:a16="http://schemas.microsoft.com/office/drawing/2014/main" id="{EA2E35B7-3ACC-EF66-2F09-468C242E02BA}"/>
+              </a:ext>
+            </a:extLst>
+          </p:cNvPr>
+          <p:cNvSpPr txBox="1"/>
+          <p:nvPr/>
+        </p:nvSpPr>
+        <p:spPr>
+          <a:xfrm>
+            <a:off x="990600" y="4550715"/>
+            <a:ext cx="2824393" cy="923330"/>
+          </a:xfrm>
+          <a:prstGeom prst="rect">
+            <a:avLst/>
+          </a:prstGeom>
+          <a:noFill/>
+        </p:spPr>
+        <p:txBody>
+          <a:bodyPr wrap="square" rtlCol="0">
+            <a:spAutoFit/>
           </a:bodyPr>
           <a:lstStyle/>
           <a:p>
-            <a:endParaRPr lang="fr-FR"/>
-          </a:p>
-        </p:txBody>
-      </p:sp>
-      <p:sp>
-        <p:nvSpPr>
-          <p:cNvPr id="7" name="AutoShape 4" descr="Google Chrome — Wikipédia">
-            <a:extLst>
-              <a:ext uri="{FF2B5EF4-FFF2-40B4-BE49-F238E27FC236}">
-                <a16:creationId xmlns:a16="http://schemas.microsoft.com/office/drawing/2014/main" id="{A14203AD-CD9C-156A-823A-9C0CEBCAD55E}"/>
-              </a:ext>
-            </a:extLst>
-          </p:cNvPr>
-          <p:cNvSpPr>
-            <a:spLocks noChangeAspect="1" noChangeArrowheads="1"/>
-          </p:cNvSpPr>
-          <p:nvPr/>
-        </p:nvSpPr>
+            <a:pPr algn="ctr"/>
+            <a:r>
+              <a:rPr lang="fr-FR" dirty="0"/>
+              <a:t>Utiliser ‘https’ afin de chiffrer le trafic des données</a:t>
+            </a:r>
+          </a:p>
+        </p:txBody>
+      </p:sp>
+      <p:sp>
+        <p:nvSpPr>
+          <p:cNvPr id="2" name="ZoneTexte 1">
+            <a:extLst>
+              <a:ext uri="{FF2B5EF4-FFF2-40B4-BE49-F238E27FC236}">
+                <a16:creationId xmlns:a16="http://schemas.microsoft.com/office/drawing/2014/main" id="{234B2271-D5BF-87CD-ACF0-41A7CC7661F5}"/>
+              </a:ext>
+            </a:extLst>
+          </p:cNvPr>
+          <p:cNvSpPr txBox="1"/>
+          <p:nvPr/>
+        </p:nvSpPr>
+        <p:spPr>
+          <a:xfrm>
+            <a:off x="8239027" y="4456447"/>
+            <a:ext cx="3089358" cy="923330"/>
+          </a:xfrm>
+          <a:prstGeom prst="rect">
+            <a:avLst/>
+          </a:prstGeom>
+          <a:noFill/>
+        </p:spPr>
+        <p:txBody>
+          <a:bodyPr wrap="square" rtlCol="0">
+            <a:spAutoFit/>
+          </a:bodyPr>
+          <a:lstStyle/>
+          <a:p>
+            <a:pPr algn="ctr"/>
+            <a:endParaRPr lang="fr-FR" dirty="0"/>
+          </a:p>
+          <a:p>
+            <a:pPr algn="ctr"/>
+            <a:r>
+              <a:rPr lang="fr-FR" dirty="0"/>
+              <a:t>Mises à jour régulières des librairies(de tout les langages)</a:t>
+            </a:r>
+          </a:p>
+        </p:txBody>
+      </p:sp>
+      <p:pic>
+        <p:nvPicPr>
+          <p:cNvPr id="7" name="Image 6">
+            <a:extLst>
+              <a:ext uri="{FF2B5EF4-FFF2-40B4-BE49-F238E27FC236}">
+                <a16:creationId xmlns:a16="http://schemas.microsoft.com/office/drawing/2014/main" id="{D9EE0127-42E0-C0B2-36FF-91669E65103A}"/>
+              </a:ext>
+            </a:extLst>
+          </p:cNvPr>
+          <p:cNvPicPr>
+            <a:picLocks noChangeAspect="1"/>
+          </p:cNvPicPr>
+          <p:nvPr/>
+        </p:nvPicPr>
+        <p:blipFill>
+          <a:blip r:embed="rId4"/>
+          <a:stretch>
+            <a:fillRect/>
+          </a:stretch>
+        </p:blipFill>
+        <p:spPr>
+          <a:xfrm>
+            <a:off x="4824552" y="2951112"/>
+            <a:ext cx="1939965" cy="955773"/>
+          </a:xfrm>
+          <a:prstGeom prst="rect">
+            <a:avLst/>
+          </a:prstGeom>
+        </p:spPr>
+      </p:pic>
+      <p:sp>
+        <p:nvSpPr>
+          <p:cNvPr id="9" name="ZoneTexte 8">
+            <a:extLst>
+              <a:ext uri="{FF2B5EF4-FFF2-40B4-BE49-F238E27FC236}">
+                <a16:creationId xmlns:a16="http://schemas.microsoft.com/office/drawing/2014/main" id="{3FC247AF-2FC8-ADD6-D0C1-4924DC09017E}"/>
+              </a:ext>
+            </a:extLst>
+          </p:cNvPr>
+          <p:cNvSpPr txBox="1"/>
+          <p:nvPr/>
+        </p:nvSpPr>
+        <p:spPr>
+          <a:xfrm>
+            <a:off x="4586392" y="4550715"/>
+            <a:ext cx="2719381" cy="1200329"/>
+          </a:xfrm>
+          <a:prstGeom prst="rect">
+            <a:avLst/>
+          </a:prstGeom>
+          <a:noFill/>
+        </p:spPr>
+        <p:txBody>
+          <a:bodyPr wrap="square" rtlCol="0">
+            <a:spAutoFit/>
+          </a:bodyPr>
+          <a:lstStyle/>
+          <a:p>
+            <a:pPr algn="ctr"/>
+            <a:r>
+              <a:rPr lang="fr-FR" dirty="0"/>
+              <a:t>Chiffrer le mail et le mot de passe lors de l’inscription</a:t>
+            </a:r>
+          </a:p>
+          <a:p>
+            <a:pPr algn="ctr"/>
+            <a:endParaRPr lang="fr-FR" dirty="0"/>
+          </a:p>
+        </p:txBody>
+      </p:sp>
+      <p:pic>
+        <p:nvPicPr>
+          <p:cNvPr id="5122" name="Picture 2" descr="Mises à jour de sécurité informatique : pourquoi faut-il absolument les  faire ?">
+            <a:extLst>
+              <a:ext uri="{FF2B5EF4-FFF2-40B4-BE49-F238E27FC236}">
+                <a16:creationId xmlns:a16="http://schemas.microsoft.com/office/drawing/2014/main" id="{E95F8086-3FB0-F22F-3B91-5836CC4A358E}"/>
+              </a:ext>
+            </a:extLst>
+          </p:cNvPr>
+          <p:cNvPicPr>
+            <a:picLocks noChangeAspect="1" noChangeArrowheads="1"/>
+          </p:cNvPicPr>
+          <p:nvPr/>
+        </p:nvPicPr>
+        <p:blipFill>
+          <a:blip r:embed="rId5">
+            <a:extLst>
+              <a:ext uri="{28A0092B-C50C-407E-A947-70E740481C1C}">
+                <a14:useLocalDpi xmlns:a14="http://schemas.microsoft.com/office/drawing/2010/main" val="0"/>
+              </a:ext>
+            </a:extLst>
+          </a:blip>
+          <a:srcRect/>
+          <a:stretch>
+            <a:fillRect/>
+          </a:stretch>
+        </p:blipFill>
         <p:spPr bwMode="auto">
           <a:xfrm>
-            <a:off x="5434553" y="3965437"/>
-            <a:ext cx="304800" cy="304800"/>
+            <a:off x="8321234" y="2623106"/>
+            <a:ext cx="3007151" cy="1691522"/>
           </a:xfrm>
           <a:prstGeom prst="rect">
             <a:avLst/>
@@ -4704,321 +4935,11 @@
             </a:ext>
           </a:extLst>
         </p:spPr>
-        <p:txBody>
-          <a:bodyPr vert="horz" wrap="square" lIns="91440" tIns="45720" rIns="91440" bIns="45720" numCol="1" anchor="t" anchorCtr="0" compatLnSpc="1">
-            <a:prstTxWarp prst="textNoShape">
-              <a:avLst/>
-            </a:prstTxWarp>
-          </a:bodyPr>
-          <a:lstStyle/>
-          <a:p>
-            <a:endParaRPr lang="fr-FR"/>
-          </a:p>
-        </p:txBody>
-      </p:sp>
-      <p:pic>
-        <p:nvPicPr>
-          <p:cNvPr id="5126" name="Picture 6" descr="Chrome Logo et symbole, sens, histoire, PNG, marque">
-            <a:extLst>
-              <a:ext uri="{FF2B5EF4-FFF2-40B4-BE49-F238E27FC236}">
-                <a16:creationId xmlns:a16="http://schemas.microsoft.com/office/drawing/2014/main" id="{8700DB2E-E529-B6CF-0BCF-6392AF3CCE2F}"/>
-              </a:ext>
-            </a:extLst>
-          </p:cNvPr>
-          <p:cNvPicPr>
-            <a:picLocks noChangeAspect="1" noChangeArrowheads="1"/>
-          </p:cNvPicPr>
-          <p:nvPr/>
-        </p:nvPicPr>
-        <p:blipFill>
-          <a:blip r:embed="rId3">
-            <a:extLst>
-              <a:ext uri="{28A0092B-C50C-407E-A947-70E740481C1C}">
-                <a14:useLocalDpi xmlns:a14="http://schemas.microsoft.com/office/drawing/2010/main" val="0"/>
-              </a:ext>
-            </a:extLst>
-          </a:blip>
-          <a:srcRect/>
-          <a:stretch>
-            <a:fillRect/>
-          </a:stretch>
-        </p:blipFill>
-        <p:spPr bwMode="auto">
-          <a:xfrm>
-            <a:off x="2183948" y="3527876"/>
-            <a:ext cx="2626789" cy="1484722"/>
-          </a:xfrm>
-          <a:prstGeom prst="rect">
-            <a:avLst/>
-          </a:prstGeom>
-          <a:noFill/>
-          <a:extLst>
-            <a:ext uri="{909E8E84-426E-40DD-AFC4-6F175D3DCCD1}">
-              <a14:hiddenFill xmlns:a14="http://schemas.microsoft.com/office/drawing/2010/main">
-                <a:solidFill>
-                  <a:srgbClr val="FFFFFF"/>
-                </a:solidFill>
-              </a14:hiddenFill>
-            </a:ext>
-          </a:extLst>
-        </p:spPr>
       </p:pic>
-      <p:sp>
-        <p:nvSpPr>
-          <p:cNvPr id="8" name="ZoneTexte 7">
-            <a:extLst>
-              <a:ext uri="{FF2B5EF4-FFF2-40B4-BE49-F238E27FC236}">
-                <a16:creationId xmlns:a16="http://schemas.microsoft.com/office/drawing/2014/main" id="{4C7A2982-DB13-7275-3E40-984F467D6123}"/>
-              </a:ext>
-            </a:extLst>
-          </p:cNvPr>
-          <p:cNvSpPr txBox="1"/>
-          <p:nvPr/>
-        </p:nvSpPr>
-        <p:spPr>
-          <a:xfrm>
-            <a:off x="2658356" y="5151748"/>
-            <a:ext cx="1677971" cy="923330"/>
-          </a:xfrm>
-          <a:prstGeom prst="rect">
-            <a:avLst/>
-          </a:prstGeom>
-          <a:noFill/>
-        </p:spPr>
-        <p:txBody>
-          <a:bodyPr wrap="square" rtlCol="0">
-            <a:spAutoFit/>
-          </a:bodyPr>
-          <a:lstStyle/>
-          <a:p>
-            <a:pPr algn="ctr"/>
-            <a:r>
-              <a:rPr lang="fr-FR" dirty="0"/>
-              <a:t>Google chrome </a:t>
-            </a:r>
-            <a:r>
-              <a:rPr lang="fr-FR" sz="1800" dirty="0">
-                <a:effectLst/>
-                <a:ea typeface="Montserrat" panose="00000500000000000000" pitchFamily="2" charset="0"/>
-                <a:cs typeface="Montserrat" panose="00000500000000000000" pitchFamily="2" charset="0"/>
-              </a:rPr>
-              <a:t>Version 111.0.5563.65</a:t>
-            </a:r>
-            <a:endParaRPr lang="fr-FR" dirty="0"/>
-          </a:p>
-        </p:txBody>
-      </p:sp>
-      <p:pic>
-        <p:nvPicPr>
-          <p:cNvPr id="5128" name="Picture 8">
-            <a:extLst>
-              <a:ext uri="{FF2B5EF4-FFF2-40B4-BE49-F238E27FC236}">
-                <a16:creationId xmlns:a16="http://schemas.microsoft.com/office/drawing/2014/main" id="{237803E6-3E39-9EF1-42C5-BFE2C72A2B6E}"/>
-              </a:ext>
-            </a:extLst>
-          </p:cNvPr>
-          <p:cNvPicPr>
-            <a:picLocks noChangeAspect="1" noChangeArrowheads="1"/>
-          </p:cNvPicPr>
-          <p:nvPr/>
-        </p:nvPicPr>
-        <p:blipFill>
-          <a:blip r:embed="rId4">
-            <a:extLst>
-              <a:ext uri="{28A0092B-C50C-407E-A947-70E740481C1C}">
-                <a14:useLocalDpi xmlns:a14="http://schemas.microsoft.com/office/drawing/2010/main" val="0"/>
-              </a:ext>
-            </a:extLst>
-          </a:blip>
-          <a:srcRect/>
-          <a:stretch>
-            <a:fillRect/>
-          </a:stretch>
-        </p:blipFill>
-        <p:spPr bwMode="auto">
-          <a:xfrm>
-            <a:off x="5215092" y="3636156"/>
-            <a:ext cx="1315610" cy="1394708"/>
-          </a:xfrm>
-          <a:prstGeom prst="rect">
-            <a:avLst/>
-          </a:prstGeom>
-          <a:noFill/>
-          <a:extLst>
-            <a:ext uri="{909E8E84-426E-40DD-AFC4-6F175D3DCCD1}">
-              <a14:hiddenFill xmlns:a14="http://schemas.microsoft.com/office/drawing/2010/main">
-                <a:solidFill>
-                  <a:srgbClr val="FFFFFF"/>
-                </a:solidFill>
-              </a14:hiddenFill>
-            </a:ext>
-          </a:extLst>
-        </p:spPr>
-      </p:pic>
-      <p:sp>
-        <p:nvSpPr>
-          <p:cNvPr id="9" name="ZoneTexte 8">
-            <a:extLst>
-              <a:ext uri="{FF2B5EF4-FFF2-40B4-BE49-F238E27FC236}">
-                <a16:creationId xmlns:a16="http://schemas.microsoft.com/office/drawing/2014/main" id="{6D2C57F1-52AF-3926-3C53-AC2B6D1D9BC7}"/>
-              </a:ext>
-            </a:extLst>
-          </p:cNvPr>
-          <p:cNvSpPr txBox="1"/>
-          <p:nvPr/>
-        </p:nvSpPr>
-        <p:spPr>
-          <a:xfrm>
-            <a:off x="5033911" y="5151748"/>
-            <a:ext cx="1677971" cy="923330"/>
-          </a:xfrm>
-          <a:prstGeom prst="rect">
-            <a:avLst/>
-          </a:prstGeom>
-          <a:noFill/>
-        </p:spPr>
-        <p:txBody>
-          <a:bodyPr wrap="square" rtlCol="0">
-            <a:spAutoFit/>
-          </a:bodyPr>
-          <a:lstStyle/>
-          <a:p>
-            <a:pPr algn="ctr"/>
-            <a:r>
-              <a:rPr lang="fr-FR" dirty="0"/>
-              <a:t>Firefox</a:t>
-            </a:r>
-          </a:p>
-          <a:p>
-            <a:pPr algn="ctr"/>
-            <a:r>
-              <a:rPr lang="fr-FR" sz="1800" dirty="0">
-                <a:effectLst/>
-                <a:ea typeface="Montserrat" panose="00000500000000000000" pitchFamily="2" charset="0"/>
-                <a:cs typeface="Montserrat" panose="00000500000000000000" pitchFamily="2" charset="0"/>
-              </a:rPr>
-              <a:t>Version </a:t>
-            </a:r>
-          </a:p>
-          <a:p>
-            <a:pPr algn="ctr"/>
-            <a:r>
-              <a:rPr lang="fr-FR" sz="1800" dirty="0">
-                <a:effectLst/>
-                <a:ea typeface="Montserrat" panose="00000500000000000000" pitchFamily="2" charset="0"/>
-                <a:cs typeface="Montserrat" panose="00000500000000000000" pitchFamily="2" charset="0"/>
-              </a:rPr>
-              <a:t>110.0.1</a:t>
-            </a:r>
-            <a:endParaRPr lang="fr-FR" dirty="0"/>
-          </a:p>
-        </p:txBody>
-      </p:sp>
-      <p:pic>
-        <p:nvPicPr>
-          <p:cNvPr id="5130" name="Picture 10" descr="Voici le logo du nouveau Microsoft Edge">
-            <a:extLst>
-              <a:ext uri="{FF2B5EF4-FFF2-40B4-BE49-F238E27FC236}">
-                <a16:creationId xmlns:a16="http://schemas.microsoft.com/office/drawing/2014/main" id="{80B7D299-3781-6816-67D4-EC6D26DE3CC7}"/>
-              </a:ext>
-            </a:extLst>
-          </p:cNvPr>
-          <p:cNvPicPr>
-            <a:picLocks noChangeAspect="1" noChangeArrowheads="1"/>
-          </p:cNvPicPr>
-          <p:nvPr/>
-        </p:nvPicPr>
-        <p:blipFill>
-          <a:blip r:embed="rId5">
-            <a:extLst>
-              <a:ext uri="{28A0092B-C50C-407E-A947-70E740481C1C}">
-                <a14:useLocalDpi xmlns:a14="http://schemas.microsoft.com/office/drawing/2010/main" val="0"/>
-              </a:ext>
-            </a:extLst>
-          </a:blip>
-          <a:srcRect/>
-          <a:stretch>
-            <a:fillRect/>
-          </a:stretch>
-        </p:blipFill>
-        <p:spPr bwMode="auto">
-          <a:xfrm>
-            <a:off x="7381265" y="3487812"/>
-            <a:ext cx="2781954" cy="1564849"/>
-          </a:xfrm>
-          <a:prstGeom prst="rect">
-            <a:avLst/>
-          </a:prstGeom>
-          <a:noFill/>
-          <a:extLst>
-            <a:ext uri="{909E8E84-426E-40DD-AFC4-6F175D3DCCD1}">
-              <a14:hiddenFill xmlns:a14="http://schemas.microsoft.com/office/drawing/2010/main">
-                <a:solidFill>
-                  <a:srgbClr val="FFFFFF"/>
-                </a:solidFill>
-              </a14:hiddenFill>
-            </a:ext>
-          </a:extLst>
-        </p:spPr>
-      </p:pic>
-      <p:sp>
-        <p:nvSpPr>
-          <p:cNvPr id="10" name="ZoneTexte 9">
-            <a:extLst>
-              <a:ext uri="{FF2B5EF4-FFF2-40B4-BE49-F238E27FC236}">
-                <a16:creationId xmlns:a16="http://schemas.microsoft.com/office/drawing/2014/main" id="{F566CCC5-BE23-DA0B-B75D-D8A054390EAA}"/>
-              </a:ext>
-            </a:extLst>
-          </p:cNvPr>
-          <p:cNvSpPr txBox="1"/>
-          <p:nvPr/>
-        </p:nvSpPr>
-        <p:spPr>
-          <a:xfrm>
-            <a:off x="7933256" y="5137608"/>
-            <a:ext cx="1677971" cy="923330"/>
-          </a:xfrm>
-          <a:prstGeom prst="rect">
-            <a:avLst/>
-          </a:prstGeom>
-          <a:noFill/>
-        </p:spPr>
-        <p:txBody>
-          <a:bodyPr wrap="square" rtlCol="0">
-            <a:spAutoFit/>
-          </a:bodyPr>
-          <a:lstStyle/>
-          <a:p>
-            <a:pPr algn="ctr"/>
-            <a:r>
-              <a:rPr lang="fr-FR" dirty="0"/>
-              <a:t>Microsoft Edge</a:t>
-            </a:r>
-          </a:p>
-          <a:p>
-            <a:pPr algn="ctr"/>
-            <a:r>
-              <a:rPr lang="fr-FR" sz="1800" dirty="0">
-                <a:effectLst/>
-                <a:ea typeface="Montserrat" panose="00000500000000000000" pitchFamily="2" charset="0"/>
-                <a:cs typeface="Montserrat" panose="00000500000000000000" pitchFamily="2" charset="0"/>
-              </a:rPr>
-              <a:t>Version </a:t>
-            </a:r>
-            <a:r>
-              <a:rPr lang="en-US" b="0" i="0" dirty="0">
-                <a:effectLst/>
-              </a:rPr>
-              <a:t>111.0.1661.41</a:t>
-            </a:r>
-            <a:endParaRPr lang="fr-FR" dirty="0"/>
-          </a:p>
-        </p:txBody>
-      </p:sp>
     </p:spTree>
     <p:extLst>
       <p:ext uri="{BB962C8B-B14F-4D97-AF65-F5344CB8AC3E}">
-        <p14:creationId xmlns:p14="http://schemas.microsoft.com/office/powerpoint/2010/main" val="3248586407"/>
+        <p14:creationId xmlns:p14="http://schemas.microsoft.com/office/powerpoint/2010/main" val="3602056243"/>
       </p:ext>
     </p:extLst>
   </p:cSld>
@@ -5091,7 +5012,7 @@
                   <a:srgbClr val="00823B"/>
                 </a:solidFill>
               </a:rPr>
-              <a:t>IX/ Les mesures de sécurités</a:t>
+              <a:t>X/ Les outils pour le code</a:t>
             </a:r>
             <a:endParaRPr lang="en-US" sz="2400" b="1" u="sng" dirty="0">
               <a:solidFill>
@@ -5167,90 +5088,12 @@
           </a:p>
         </p:txBody>
       </p:sp>
-      <p:sp>
-        <p:nvSpPr>
-          <p:cNvPr id="4" name="Bouton d'action : Aide 3">
-            <a:hlinkClick r:id="rId2" highlightClick="1"/>
-            <a:extLst>
-              <a:ext uri="{FF2B5EF4-FFF2-40B4-BE49-F238E27FC236}">
-                <a16:creationId xmlns:a16="http://schemas.microsoft.com/office/drawing/2014/main" id="{40442D20-88E4-26A8-B6C5-F896E589F369}"/>
-              </a:ext>
-            </a:extLst>
-          </p:cNvPr>
-          <p:cNvSpPr/>
-          <p:nvPr/>
-        </p:nvSpPr>
-        <p:spPr>
-          <a:xfrm>
-            <a:off x="990600" y="5693049"/>
-            <a:ext cx="876693" cy="631596"/>
-          </a:xfrm>
-          <a:prstGeom prst="actionButtonHelp">
-            <a:avLst/>
-          </a:prstGeom>
-          <a:solidFill>
-            <a:schemeClr val="tx2">
-              <a:lumMod val="60000"/>
-              <a:lumOff val="40000"/>
-            </a:schemeClr>
-          </a:solidFill>
-          <a:effectLst>
-            <a:glow rad="127000">
-              <a:schemeClr val="accent1">
-                <a:alpha val="0"/>
-              </a:schemeClr>
-            </a:glow>
-          </a:effectLst>
-        </p:spPr>
-        <p:style>
-          <a:lnRef idx="2">
-            <a:schemeClr val="accent6">
-              <a:shade val="50000"/>
-            </a:schemeClr>
-          </a:lnRef>
-          <a:fillRef idx="1">
-            <a:schemeClr val="accent6"/>
-          </a:fillRef>
-          <a:effectRef idx="0">
-            <a:schemeClr val="accent6"/>
-          </a:effectRef>
-          <a:fontRef idx="minor">
-            <a:schemeClr val="lt1"/>
-          </a:fontRef>
-        </p:style>
-        <p:txBody>
-          <a:bodyPr rot="0" spcFirstLastPara="0" vertOverflow="overflow" horzOverflow="overflow" vert="horz" wrap="square" lIns="91440" tIns="45720" rIns="91440" bIns="45720" numCol="1" spcCol="0" rtlCol="0" fromWordArt="0" anchor="ctr" anchorCtr="0" forceAA="0" compatLnSpc="1">
-            <a:prstTxWarp prst="textNoShape">
-              <a:avLst/>
-            </a:prstTxWarp>
-            <a:noAutofit/>
-          </a:bodyPr>
-          <a:lstStyle/>
-          <a:p>
-            <a:pPr algn="ctr"/>
-            <a:endParaRPr lang="fr-FR" b="1">
-              <a:ln w="22225">
-                <a:solidFill>
-                  <a:schemeClr val="accent2"/>
-                </a:solidFill>
-                <a:prstDash val="solid"/>
-              </a:ln>
-              <a:solidFill>
-                <a:schemeClr val="accent2">
-                  <a:lumMod val="40000"/>
-                  <a:lumOff val="60000"/>
-                </a:schemeClr>
-              </a:solidFill>
-            </a:endParaRPr>
-          </a:p>
-        </p:txBody>
-      </p:sp>
       <p:pic>
         <p:nvPicPr>
-          <p:cNvPr id="10242" name="Picture 2">
-            <a:extLst>
-              <a:ext uri="{FF2B5EF4-FFF2-40B4-BE49-F238E27FC236}">
-                <a16:creationId xmlns:a16="http://schemas.microsoft.com/office/drawing/2014/main" id="{9BD47286-EBF4-401F-DEF0-E0FE2C2827FB}"/>
+          <p:cNvPr id="4098" name="Picture 2" descr="File, type, vscode Icon in vscode">
+            <a:extLst>
+              <a:ext uri="{FF2B5EF4-FFF2-40B4-BE49-F238E27FC236}">
+                <a16:creationId xmlns:a16="http://schemas.microsoft.com/office/drawing/2014/main" id="{E9A765E3-1D01-380B-F286-78DD40AB1B26}"/>
               </a:ext>
             </a:extLst>
           </p:cNvPr>
@@ -5260,7 +5103,7 @@
           <p:nvPr/>
         </p:nvPicPr>
         <p:blipFill>
-          <a:blip r:embed="rId3">
+          <a:blip r:embed="rId2">
             <a:extLst>
               <a:ext uri="{28A0092B-C50C-407E-A947-70E740481C1C}">
                 <a14:useLocalDpi xmlns:a14="http://schemas.microsoft.com/office/drawing/2010/main" val="0"/>
@@ -5274,8 +5117,8 @@
         </p:blipFill>
         <p:spPr bwMode="auto">
           <a:xfrm>
-            <a:off x="990600" y="2623106"/>
-            <a:ext cx="2824393" cy="1611787"/>
+            <a:off x="1913642" y="2474786"/>
+            <a:ext cx="1715678" cy="1715678"/>
           </a:xfrm>
           <a:prstGeom prst="rect">
             <a:avLst/>
@@ -5292,158 +5135,12 @@
           </a:extLst>
         </p:spPr>
       </p:pic>
-      <p:sp>
-        <p:nvSpPr>
-          <p:cNvPr id="11" name="ZoneTexte 10">
-            <a:extLst>
-              <a:ext uri="{FF2B5EF4-FFF2-40B4-BE49-F238E27FC236}">
-                <a16:creationId xmlns:a16="http://schemas.microsoft.com/office/drawing/2014/main" id="{EA2E35B7-3ACC-EF66-2F09-468C242E02BA}"/>
-              </a:ext>
-            </a:extLst>
-          </p:cNvPr>
-          <p:cNvSpPr txBox="1"/>
-          <p:nvPr/>
-        </p:nvSpPr>
-        <p:spPr>
-          <a:xfrm>
-            <a:off x="990600" y="4550715"/>
-            <a:ext cx="2824393" cy="923330"/>
-          </a:xfrm>
-          <a:prstGeom prst="rect">
-            <a:avLst/>
-          </a:prstGeom>
-          <a:noFill/>
-        </p:spPr>
-        <p:txBody>
-          <a:bodyPr wrap="square" rtlCol="0">
-            <a:spAutoFit/>
-          </a:bodyPr>
-          <a:lstStyle/>
-          <a:p>
-            <a:pPr algn="ctr"/>
-            <a:r>
-              <a:rPr lang="fr-FR" dirty="0"/>
-              <a:t>Utiliser ‘https’ afin de chiffrer le trafic des données</a:t>
-            </a:r>
-          </a:p>
-        </p:txBody>
-      </p:sp>
-      <p:sp>
-        <p:nvSpPr>
-          <p:cNvPr id="2" name="ZoneTexte 1">
-            <a:extLst>
-              <a:ext uri="{FF2B5EF4-FFF2-40B4-BE49-F238E27FC236}">
-                <a16:creationId xmlns:a16="http://schemas.microsoft.com/office/drawing/2014/main" id="{234B2271-D5BF-87CD-ACF0-41A7CC7661F5}"/>
-              </a:ext>
-            </a:extLst>
-          </p:cNvPr>
-          <p:cNvSpPr txBox="1"/>
-          <p:nvPr/>
-        </p:nvSpPr>
-        <p:spPr>
-          <a:xfrm>
-            <a:off x="8239027" y="4456447"/>
-            <a:ext cx="3089358" cy="923330"/>
-          </a:xfrm>
-          <a:prstGeom prst="rect">
-            <a:avLst/>
-          </a:prstGeom>
-          <a:noFill/>
-        </p:spPr>
-        <p:txBody>
-          <a:bodyPr wrap="square" rtlCol="0">
-            <a:spAutoFit/>
-          </a:bodyPr>
-          <a:lstStyle/>
-          <a:p>
-            <a:pPr algn="ctr"/>
-            <a:endParaRPr lang="fr-FR" dirty="0"/>
-          </a:p>
-          <a:p>
-            <a:pPr algn="ctr"/>
-            <a:r>
-              <a:rPr lang="fr-FR" dirty="0"/>
-              <a:t>Mises à jour régulières des librairies(de tout les langages)</a:t>
-            </a:r>
-          </a:p>
-        </p:txBody>
-      </p:sp>
       <p:pic>
         <p:nvPicPr>
-          <p:cNvPr id="7" name="Image 6">
-            <a:extLst>
-              <a:ext uri="{FF2B5EF4-FFF2-40B4-BE49-F238E27FC236}">
-                <a16:creationId xmlns:a16="http://schemas.microsoft.com/office/drawing/2014/main" id="{D9EE0127-42E0-C0B2-36FF-91669E65103A}"/>
-              </a:ext>
-            </a:extLst>
-          </p:cNvPr>
-          <p:cNvPicPr>
-            <a:picLocks noChangeAspect="1"/>
-          </p:cNvPicPr>
-          <p:nvPr/>
-        </p:nvPicPr>
-        <p:blipFill>
-          <a:blip r:embed="rId4"/>
-          <a:stretch>
-            <a:fillRect/>
-          </a:stretch>
-        </p:blipFill>
-        <p:spPr>
-          <a:xfrm>
-            <a:off x="4824552" y="2951112"/>
-            <a:ext cx="1939965" cy="955773"/>
-          </a:xfrm>
-          <a:prstGeom prst="rect">
-            <a:avLst/>
-          </a:prstGeom>
-        </p:spPr>
-      </p:pic>
-      <p:sp>
-        <p:nvSpPr>
-          <p:cNvPr id="9" name="ZoneTexte 8">
-            <a:extLst>
-              <a:ext uri="{FF2B5EF4-FFF2-40B4-BE49-F238E27FC236}">
-                <a16:creationId xmlns:a16="http://schemas.microsoft.com/office/drawing/2014/main" id="{3FC247AF-2FC8-ADD6-D0C1-4924DC09017E}"/>
-              </a:ext>
-            </a:extLst>
-          </p:cNvPr>
-          <p:cNvSpPr txBox="1"/>
-          <p:nvPr/>
-        </p:nvSpPr>
-        <p:spPr>
-          <a:xfrm>
-            <a:off x="4586392" y="4550715"/>
-            <a:ext cx="2719381" cy="1200329"/>
-          </a:xfrm>
-          <a:prstGeom prst="rect">
-            <a:avLst/>
-          </a:prstGeom>
-          <a:noFill/>
-        </p:spPr>
-        <p:txBody>
-          <a:bodyPr wrap="square" rtlCol="0">
-            <a:spAutoFit/>
-          </a:bodyPr>
-          <a:lstStyle/>
-          <a:p>
-            <a:pPr algn="ctr"/>
-            <a:r>
-              <a:rPr lang="fr-FR" dirty="0"/>
-              <a:t>Chiffrer le mail et le mot de passe lors de l’inscription</a:t>
-            </a:r>
-          </a:p>
-          <a:p>
-            <a:pPr algn="ctr"/>
-            <a:endParaRPr lang="fr-FR" dirty="0"/>
-          </a:p>
-        </p:txBody>
-      </p:sp>
-      <p:pic>
-        <p:nvPicPr>
-          <p:cNvPr id="5122" name="Picture 2" descr="Mises à jour de sécurité informatique : pourquoi faut-il absolument les  faire ?">
-            <a:extLst>
-              <a:ext uri="{FF2B5EF4-FFF2-40B4-BE49-F238E27FC236}">
-                <a16:creationId xmlns:a16="http://schemas.microsoft.com/office/drawing/2014/main" id="{E95F8086-3FB0-F22F-3B91-5836CC4A358E}"/>
+          <p:cNvPr id="4100" name="Picture 4" descr="DBeaver PRO | One tool for all data sources">
+            <a:extLst>
+              <a:ext uri="{FF2B5EF4-FFF2-40B4-BE49-F238E27FC236}">
+                <a16:creationId xmlns:a16="http://schemas.microsoft.com/office/drawing/2014/main" id="{1B1B12D5-BE78-970A-0BA0-FF4C4A1C0C0D}"/>
               </a:ext>
             </a:extLst>
           </p:cNvPr>
@@ -5453,7 +5150,7 @@
           <p:nvPr/>
         </p:nvPicPr>
         <p:blipFill>
-          <a:blip r:embed="rId5">
+          <a:blip r:embed="rId3">
             <a:extLst>
               <a:ext uri="{28A0092B-C50C-407E-A947-70E740481C1C}">
                 <a14:useLocalDpi xmlns:a14="http://schemas.microsoft.com/office/drawing/2010/main" val="0"/>
@@ -5467,8 +5164,8 @@
         </p:blipFill>
         <p:spPr bwMode="auto">
           <a:xfrm>
-            <a:off x="8321234" y="2623106"/>
-            <a:ext cx="3007151" cy="1691522"/>
+            <a:off x="4419600" y="4346006"/>
+            <a:ext cx="3352800" cy="1304925"/>
           </a:xfrm>
           <a:prstGeom prst="rect">
             <a:avLst/>
@@ -5485,10 +5182,165 @@
           </a:extLst>
         </p:spPr>
       </p:pic>
+      <p:pic>
+        <p:nvPicPr>
+          <p:cNvPr id="4102" name="Picture 6" descr="Logo github - Icônes des médias sociaux gratuites">
+            <a:extLst>
+              <a:ext uri="{FF2B5EF4-FFF2-40B4-BE49-F238E27FC236}">
+                <a16:creationId xmlns:a16="http://schemas.microsoft.com/office/drawing/2014/main" id="{006F9937-70DD-EEF8-A2F0-76AF33E53F15}"/>
+              </a:ext>
+            </a:extLst>
+          </p:cNvPr>
+          <p:cNvPicPr>
+            <a:picLocks noChangeAspect="1" noChangeArrowheads="1"/>
+          </p:cNvPicPr>
+          <p:nvPr/>
+        </p:nvPicPr>
+        <p:blipFill>
+          <a:blip r:embed="rId4">
+            <a:extLst>
+              <a:ext uri="{28A0092B-C50C-407E-A947-70E740481C1C}">
+                <a14:useLocalDpi xmlns:a14="http://schemas.microsoft.com/office/drawing/2010/main" val="0"/>
+              </a:ext>
+            </a:extLst>
+          </a:blip>
+          <a:srcRect/>
+          <a:stretch>
+            <a:fillRect/>
+          </a:stretch>
+        </p:blipFill>
+        <p:spPr bwMode="auto">
+          <a:xfrm>
+            <a:off x="8262592" y="2394657"/>
+            <a:ext cx="1875935" cy="1875935"/>
+          </a:xfrm>
+          <a:prstGeom prst="rect">
+            <a:avLst/>
+          </a:prstGeom>
+          <a:noFill/>
+          <a:extLst>
+            <a:ext uri="{909E8E84-426E-40DD-AFC4-6F175D3DCCD1}">
+              <a14:hiddenFill xmlns:a14="http://schemas.microsoft.com/office/drawing/2010/main">
+                <a:solidFill>
+                  <a:srgbClr val="FFFFFF"/>
+                </a:solidFill>
+              </a14:hiddenFill>
+            </a:ext>
+          </a:extLst>
+        </p:spPr>
+      </p:pic>
+      <p:sp>
+        <p:nvSpPr>
+          <p:cNvPr id="6" name="ZoneTexte 5">
+            <a:extLst>
+              <a:ext uri="{FF2B5EF4-FFF2-40B4-BE49-F238E27FC236}">
+                <a16:creationId xmlns:a16="http://schemas.microsoft.com/office/drawing/2014/main" id="{E4B40CF4-A951-FB28-BD70-2302797EFB61}"/>
+              </a:ext>
+            </a:extLst>
+          </p:cNvPr>
+          <p:cNvSpPr txBox="1"/>
+          <p:nvPr/>
+        </p:nvSpPr>
+        <p:spPr>
+          <a:xfrm>
+            <a:off x="1913642" y="4346006"/>
+            <a:ext cx="1885360" cy="646331"/>
+          </a:xfrm>
+          <a:prstGeom prst="rect">
+            <a:avLst/>
+          </a:prstGeom>
+          <a:noFill/>
+        </p:spPr>
+        <p:txBody>
+          <a:bodyPr wrap="square" rtlCol="0">
+            <a:spAutoFit/>
+          </a:bodyPr>
+          <a:lstStyle/>
+          <a:p>
+            <a:pPr algn="ctr"/>
+            <a:r>
+              <a:rPr lang="fr-FR" dirty="0"/>
+              <a:t>Ecriture du code, extensions</a:t>
+            </a:r>
+          </a:p>
+        </p:txBody>
+      </p:sp>
+      <p:sp>
+        <p:nvSpPr>
+          <p:cNvPr id="7" name="ZoneTexte 6">
+            <a:extLst>
+              <a:ext uri="{FF2B5EF4-FFF2-40B4-BE49-F238E27FC236}">
+                <a16:creationId xmlns:a16="http://schemas.microsoft.com/office/drawing/2014/main" id="{83A850AA-C841-DDDD-C9A1-9F921B8C0BC1}"/>
+              </a:ext>
+            </a:extLst>
+          </p:cNvPr>
+          <p:cNvSpPr txBox="1"/>
+          <p:nvPr/>
+        </p:nvSpPr>
+        <p:spPr>
+          <a:xfrm>
+            <a:off x="4751109" y="5920033"/>
+            <a:ext cx="2799761" cy="646331"/>
+          </a:xfrm>
+          <a:prstGeom prst="rect">
+            <a:avLst/>
+          </a:prstGeom>
+          <a:noFill/>
+        </p:spPr>
+        <p:txBody>
+          <a:bodyPr wrap="square" rtlCol="0">
+            <a:spAutoFit/>
+          </a:bodyPr>
+          <a:lstStyle/>
+          <a:p>
+            <a:pPr algn="ctr"/>
+            <a:r>
+              <a:rPr lang="fr-FR" dirty="0"/>
+              <a:t>Communiquer avec la base de données</a:t>
+            </a:r>
+          </a:p>
+        </p:txBody>
+      </p:sp>
+      <p:sp>
+        <p:nvSpPr>
+          <p:cNvPr id="8" name="ZoneTexte 7">
+            <a:extLst>
+              <a:ext uri="{FF2B5EF4-FFF2-40B4-BE49-F238E27FC236}">
+                <a16:creationId xmlns:a16="http://schemas.microsoft.com/office/drawing/2014/main" id="{57289820-792B-4FCD-48F7-D507D5AAC221}"/>
+              </a:ext>
+            </a:extLst>
+          </p:cNvPr>
+          <p:cNvSpPr txBox="1"/>
+          <p:nvPr/>
+        </p:nvSpPr>
+        <p:spPr>
+          <a:xfrm>
+            <a:off x="8220173" y="4553146"/>
+            <a:ext cx="1960775" cy="646331"/>
+          </a:xfrm>
+          <a:prstGeom prst="rect">
+            <a:avLst/>
+          </a:prstGeom>
+          <a:noFill/>
+        </p:spPr>
+        <p:txBody>
+          <a:bodyPr wrap="square" rtlCol="0">
+            <a:spAutoFit/>
+          </a:bodyPr>
+          <a:lstStyle/>
+          <a:p>
+            <a:pPr algn="ctr"/>
+            <a:r>
+              <a:rPr lang="fr-FR" dirty="0"/>
+              <a:t>Sauvegarder le travail</a:t>
+            </a:r>
+          </a:p>
+        </p:txBody>
+      </p:sp>
     </p:spTree>
     <p:extLst>
       <p:ext uri="{BB962C8B-B14F-4D97-AF65-F5344CB8AC3E}">
-        <p14:creationId xmlns:p14="http://schemas.microsoft.com/office/powerpoint/2010/main" val="3602056243"/>
+        <p14:creationId xmlns:p14="http://schemas.microsoft.com/office/powerpoint/2010/main" val="2296702380"/>
       </p:ext>
     </p:extLst>
   </p:cSld>
@@ -5529,50 +5381,6 @@
       </p:grpSpPr>
       <p:sp>
         <p:nvSpPr>
-          <p:cNvPr id="5" name="ZoneTexte 4">
-            <a:extLst>
-              <a:ext uri="{FF2B5EF4-FFF2-40B4-BE49-F238E27FC236}">
-                <a16:creationId xmlns:a16="http://schemas.microsoft.com/office/drawing/2014/main" id="{CE01E8F6-9D91-F8D8-90CE-DBF5D2D1610B}"/>
-              </a:ext>
-            </a:extLst>
-          </p:cNvPr>
-          <p:cNvSpPr txBox="1"/>
-          <p:nvPr/>
-        </p:nvSpPr>
-        <p:spPr>
-          <a:xfrm>
-            <a:off x="377072" y="1564849"/>
-            <a:ext cx="5718928" cy="461665"/>
-          </a:xfrm>
-          <a:prstGeom prst="rect">
-            <a:avLst/>
-          </a:prstGeom>
-          <a:noFill/>
-        </p:spPr>
-        <p:txBody>
-          <a:bodyPr wrap="square" rtlCol="0">
-            <a:spAutoFit/>
-          </a:bodyPr>
-          <a:lstStyle/>
-          <a:p>
-            <a:r>
-              <a:rPr lang="fr-FR" sz="2400" b="1" u="sng" dirty="0">
-                <a:solidFill>
-                  <a:srgbClr val="00823B"/>
-                </a:solidFill>
-              </a:rPr>
-              <a:t>X/ Les outils pour le code</a:t>
-            </a:r>
-            <a:endParaRPr lang="en-US" sz="2400" b="1" u="sng" dirty="0">
-              <a:solidFill>
-                <a:srgbClr val="00823B"/>
-              </a:solidFill>
-            </a:endParaRPr>
-          </a:p>
-        </p:txBody>
-      </p:sp>
-      <p:sp>
-        <p:nvSpPr>
           <p:cNvPr id="3" name="Titre 1">
             <a:extLst>
               <a:ext uri="{FF2B5EF4-FFF2-40B4-BE49-F238E27FC236}">
@@ -5626,363 +5434,6 @@
                 </a:solidFill>
                 <a:latin typeface="Copperplate Gothic Bold" panose="020E0705020206020404" pitchFamily="34" charset="0"/>
               </a:rPr>
-              <a:t>LA VEILLE TECHNIQUE</a:t>
-            </a:r>
-            <a:endParaRPr lang="en-US" dirty="0">
-              <a:solidFill>
-                <a:srgbClr val="00B050"/>
-              </a:solidFill>
-              <a:latin typeface="Copperplate Gothic Bold" panose="020E0705020206020404" pitchFamily="34" charset="0"/>
-            </a:endParaRPr>
-          </a:p>
-        </p:txBody>
-      </p:sp>
-      <p:pic>
-        <p:nvPicPr>
-          <p:cNvPr id="4098" name="Picture 2" descr="File, type, vscode Icon in vscode">
-            <a:extLst>
-              <a:ext uri="{FF2B5EF4-FFF2-40B4-BE49-F238E27FC236}">
-                <a16:creationId xmlns:a16="http://schemas.microsoft.com/office/drawing/2014/main" id="{E9A765E3-1D01-380B-F286-78DD40AB1B26}"/>
-              </a:ext>
-            </a:extLst>
-          </p:cNvPr>
-          <p:cNvPicPr>
-            <a:picLocks noChangeAspect="1" noChangeArrowheads="1"/>
-          </p:cNvPicPr>
-          <p:nvPr/>
-        </p:nvPicPr>
-        <p:blipFill>
-          <a:blip r:embed="rId2">
-            <a:extLst>
-              <a:ext uri="{28A0092B-C50C-407E-A947-70E740481C1C}">
-                <a14:useLocalDpi xmlns:a14="http://schemas.microsoft.com/office/drawing/2010/main" val="0"/>
-              </a:ext>
-            </a:extLst>
-          </a:blip>
-          <a:srcRect/>
-          <a:stretch>
-            <a:fillRect/>
-          </a:stretch>
-        </p:blipFill>
-        <p:spPr bwMode="auto">
-          <a:xfrm>
-            <a:off x="1913642" y="2474786"/>
-            <a:ext cx="1715678" cy="1715678"/>
-          </a:xfrm>
-          <a:prstGeom prst="rect">
-            <a:avLst/>
-          </a:prstGeom>
-          <a:noFill/>
-          <a:extLst>
-            <a:ext uri="{909E8E84-426E-40DD-AFC4-6F175D3DCCD1}">
-              <a14:hiddenFill xmlns:a14="http://schemas.microsoft.com/office/drawing/2010/main">
-                <a:solidFill>
-                  <a:srgbClr val="FFFFFF"/>
-                </a:solidFill>
-              </a14:hiddenFill>
-            </a:ext>
-          </a:extLst>
-        </p:spPr>
-      </p:pic>
-      <p:pic>
-        <p:nvPicPr>
-          <p:cNvPr id="4100" name="Picture 4" descr="DBeaver PRO | One tool for all data sources">
-            <a:extLst>
-              <a:ext uri="{FF2B5EF4-FFF2-40B4-BE49-F238E27FC236}">
-                <a16:creationId xmlns:a16="http://schemas.microsoft.com/office/drawing/2014/main" id="{1B1B12D5-BE78-970A-0BA0-FF4C4A1C0C0D}"/>
-              </a:ext>
-            </a:extLst>
-          </p:cNvPr>
-          <p:cNvPicPr>
-            <a:picLocks noChangeAspect="1" noChangeArrowheads="1"/>
-          </p:cNvPicPr>
-          <p:nvPr/>
-        </p:nvPicPr>
-        <p:blipFill>
-          <a:blip r:embed="rId3">
-            <a:extLst>
-              <a:ext uri="{28A0092B-C50C-407E-A947-70E740481C1C}">
-                <a14:useLocalDpi xmlns:a14="http://schemas.microsoft.com/office/drawing/2010/main" val="0"/>
-              </a:ext>
-            </a:extLst>
-          </a:blip>
-          <a:srcRect/>
-          <a:stretch>
-            <a:fillRect/>
-          </a:stretch>
-        </p:blipFill>
-        <p:spPr bwMode="auto">
-          <a:xfrm>
-            <a:off x="4419600" y="4346006"/>
-            <a:ext cx="3352800" cy="1304925"/>
-          </a:xfrm>
-          <a:prstGeom prst="rect">
-            <a:avLst/>
-          </a:prstGeom>
-          <a:noFill/>
-          <a:extLst>
-            <a:ext uri="{909E8E84-426E-40DD-AFC4-6F175D3DCCD1}">
-              <a14:hiddenFill xmlns:a14="http://schemas.microsoft.com/office/drawing/2010/main">
-                <a:solidFill>
-                  <a:srgbClr val="FFFFFF"/>
-                </a:solidFill>
-              </a14:hiddenFill>
-            </a:ext>
-          </a:extLst>
-        </p:spPr>
-      </p:pic>
-      <p:pic>
-        <p:nvPicPr>
-          <p:cNvPr id="4102" name="Picture 6" descr="Logo github - Icônes des médias sociaux gratuites">
-            <a:extLst>
-              <a:ext uri="{FF2B5EF4-FFF2-40B4-BE49-F238E27FC236}">
-                <a16:creationId xmlns:a16="http://schemas.microsoft.com/office/drawing/2014/main" id="{006F9937-70DD-EEF8-A2F0-76AF33E53F15}"/>
-              </a:ext>
-            </a:extLst>
-          </p:cNvPr>
-          <p:cNvPicPr>
-            <a:picLocks noChangeAspect="1" noChangeArrowheads="1"/>
-          </p:cNvPicPr>
-          <p:nvPr/>
-        </p:nvPicPr>
-        <p:blipFill>
-          <a:blip r:embed="rId4">
-            <a:extLst>
-              <a:ext uri="{28A0092B-C50C-407E-A947-70E740481C1C}">
-                <a14:useLocalDpi xmlns:a14="http://schemas.microsoft.com/office/drawing/2010/main" val="0"/>
-              </a:ext>
-            </a:extLst>
-          </a:blip>
-          <a:srcRect/>
-          <a:stretch>
-            <a:fillRect/>
-          </a:stretch>
-        </p:blipFill>
-        <p:spPr bwMode="auto">
-          <a:xfrm>
-            <a:off x="8262592" y="2394657"/>
-            <a:ext cx="1875935" cy="1875935"/>
-          </a:xfrm>
-          <a:prstGeom prst="rect">
-            <a:avLst/>
-          </a:prstGeom>
-          <a:noFill/>
-          <a:extLst>
-            <a:ext uri="{909E8E84-426E-40DD-AFC4-6F175D3DCCD1}">
-              <a14:hiddenFill xmlns:a14="http://schemas.microsoft.com/office/drawing/2010/main">
-                <a:solidFill>
-                  <a:srgbClr val="FFFFFF"/>
-                </a:solidFill>
-              </a14:hiddenFill>
-            </a:ext>
-          </a:extLst>
-        </p:spPr>
-      </p:pic>
-      <p:sp>
-        <p:nvSpPr>
-          <p:cNvPr id="6" name="ZoneTexte 5">
-            <a:extLst>
-              <a:ext uri="{FF2B5EF4-FFF2-40B4-BE49-F238E27FC236}">
-                <a16:creationId xmlns:a16="http://schemas.microsoft.com/office/drawing/2014/main" id="{E4B40CF4-A951-FB28-BD70-2302797EFB61}"/>
-              </a:ext>
-            </a:extLst>
-          </p:cNvPr>
-          <p:cNvSpPr txBox="1"/>
-          <p:nvPr/>
-        </p:nvSpPr>
-        <p:spPr>
-          <a:xfrm>
-            <a:off x="1913642" y="4346006"/>
-            <a:ext cx="1885360" cy="646331"/>
-          </a:xfrm>
-          <a:prstGeom prst="rect">
-            <a:avLst/>
-          </a:prstGeom>
-          <a:noFill/>
-        </p:spPr>
-        <p:txBody>
-          <a:bodyPr wrap="square" rtlCol="0">
-            <a:spAutoFit/>
-          </a:bodyPr>
-          <a:lstStyle/>
-          <a:p>
-            <a:pPr algn="ctr"/>
-            <a:r>
-              <a:rPr lang="fr-FR" dirty="0"/>
-              <a:t>Ecriture du code, extensions</a:t>
-            </a:r>
-          </a:p>
-        </p:txBody>
-      </p:sp>
-      <p:sp>
-        <p:nvSpPr>
-          <p:cNvPr id="7" name="ZoneTexte 6">
-            <a:extLst>
-              <a:ext uri="{FF2B5EF4-FFF2-40B4-BE49-F238E27FC236}">
-                <a16:creationId xmlns:a16="http://schemas.microsoft.com/office/drawing/2014/main" id="{83A850AA-C841-DDDD-C9A1-9F921B8C0BC1}"/>
-              </a:ext>
-            </a:extLst>
-          </p:cNvPr>
-          <p:cNvSpPr txBox="1"/>
-          <p:nvPr/>
-        </p:nvSpPr>
-        <p:spPr>
-          <a:xfrm>
-            <a:off x="4751109" y="5920033"/>
-            <a:ext cx="2799761" cy="646331"/>
-          </a:xfrm>
-          <a:prstGeom prst="rect">
-            <a:avLst/>
-          </a:prstGeom>
-          <a:noFill/>
-        </p:spPr>
-        <p:txBody>
-          <a:bodyPr wrap="square" rtlCol="0">
-            <a:spAutoFit/>
-          </a:bodyPr>
-          <a:lstStyle/>
-          <a:p>
-            <a:pPr algn="ctr"/>
-            <a:r>
-              <a:rPr lang="fr-FR" dirty="0"/>
-              <a:t>Communiquer avec la base de données</a:t>
-            </a:r>
-          </a:p>
-        </p:txBody>
-      </p:sp>
-      <p:sp>
-        <p:nvSpPr>
-          <p:cNvPr id="8" name="ZoneTexte 7">
-            <a:extLst>
-              <a:ext uri="{FF2B5EF4-FFF2-40B4-BE49-F238E27FC236}">
-                <a16:creationId xmlns:a16="http://schemas.microsoft.com/office/drawing/2014/main" id="{57289820-792B-4FCD-48F7-D507D5AAC221}"/>
-              </a:ext>
-            </a:extLst>
-          </p:cNvPr>
-          <p:cNvSpPr txBox="1"/>
-          <p:nvPr/>
-        </p:nvSpPr>
-        <p:spPr>
-          <a:xfrm>
-            <a:off x="8220173" y="4553146"/>
-            <a:ext cx="1960775" cy="646331"/>
-          </a:xfrm>
-          <a:prstGeom prst="rect">
-            <a:avLst/>
-          </a:prstGeom>
-          <a:noFill/>
-        </p:spPr>
-        <p:txBody>
-          <a:bodyPr wrap="square" rtlCol="0">
-            <a:spAutoFit/>
-          </a:bodyPr>
-          <a:lstStyle/>
-          <a:p>
-            <a:pPr algn="ctr"/>
-            <a:r>
-              <a:rPr lang="fr-FR" dirty="0"/>
-              <a:t>Sauvegarder le travail</a:t>
-            </a:r>
-          </a:p>
-        </p:txBody>
-      </p:sp>
-    </p:spTree>
-    <p:extLst>
-      <p:ext uri="{BB962C8B-B14F-4D97-AF65-F5344CB8AC3E}">
-        <p14:creationId xmlns:p14="http://schemas.microsoft.com/office/powerpoint/2010/main" val="2296702380"/>
-      </p:ext>
-    </p:extLst>
-  </p:cSld>
-  <p:clrMapOvr>
-    <a:masterClrMapping/>
-  </p:clrMapOvr>
-  <mc:AlternateContent xmlns:mc="http://schemas.openxmlformats.org/markup-compatibility/2006" xmlns:p14="http://schemas.microsoft.com/office/powerpoint/2010/main">
-    <mc:Choice Requires="p14">
-      <p:transition spd="med" p14:dur="700">
-        <p:fade/>
-      </p:transition>
-    </mc:Choice>
-    <mc:Fallback xmlns="">
-      <p:transition spd="med">
-        <p:fade/>
-      </p:transition>
-    </mc:Fallback>
-  </mc:AlternateContent>
-</p:sld>
-</file>
-
-<file path=ppt/slides/slide16.xml><?xml version="1.0" encoding="utf-8"?>
-<p:sld xmlns:a="http://schemas.openxmlformats.org/drawingml/2006/main" xmlns:r="http://schemas.openxmlformats.org/officeDocument/2006/relationships" xmlns:p="http://schemas.openxmlformats.org/presentationml/2006/main">
-  <p:cSld>
-    <p:spTree>
-      <p:nvGrpSpPr>
-        <p:cNvPr id="1" name=""/>
-        <p:cNvGrpSpPr/>
-        <p:nvPr/>
-      </p:nvGrpSpPr>
-      <p:grpSpPr>
-        <a:xfrm>
-          <a:off x="0" y="0"/>
-          <a:ext cx="0" cy="0"/>
-          <a:chOff x="0" y="0"/>
-          <a:chExt cx="0" cy="0"/>
-        </a:xfrm>
-      </p:grpSpPr>
-      <p:sp>
-        <p:nvSpPr>
-          <p:cNvPr id="3" name="Titre 1">
-            <a:extLst>
-              <a:ext uri="{FF2B5EF4-FFF2-40B4-BE49-F238E27FC236}">
-                <a16:creationId xmlns:a16="http://schemas.microsoft.com/office/drawing/2014/main" id="{2AC5C2BD-0806-F801-7340-60BFF602A936}"/>
-              </a:ext>
-            </a:extLst>
-          </p:cNvPr>
-          <p:cNvSpPr txBox="1">
-            <a:spLocks/>
-          </p:cNvSpPr>
-          <p:nvPr/>
-        </p:nvSpPr>
-        <p:spPr>
-          <a:xfrm>
-            <a:off x="990600" y="517525"/>
-            <a:ext cx="10515600" cy="1325563"/>
-          </a:xfrm>
-          <a:prstGeom prst="rect">
-            <a:avLst/>
-          </a:prstGeom>
-        </p:spPr>
-        <p:txBody>
-          <a:bodyPr vert="horz" lIns="91440" tIns="45720" rIns="91440" bIns="45720" rtlCol="0" anchor="ctr">
-            <a:normAutofit/>
-          </a:bodyPr>
-          <a:lstStyle>
-            <a:lvl1pPr algn="l" defTabSz="914400" rtl="0" eaLnBrk="1" latinLnBrk="0" hangingPunct="1">
-              <a:lnSpc>
-                <a:spcPct val="90000"/>
-              </a:lnSpc>
-              <a:spcBef>
-                <a:spcPct val="0"/>
-              </a:spcBef>
-              <a:buNone/>
-              <a:defRPr sz="4400" kern="1200">
-                <a:solidFill>
-                  <a:schemeClr val="tx1"/>
-                </a:solidFill>
-                <a:latin typeface="+mj-lt"/>
-                <a:ea typeface="+mj-ea"/>
-                <a:cs typeface="+mj-cs"/>
-              </a:defRPr>
-            </a:lvl1pPr>
-          </a:lstStyle>
-          <a:p>
-            <a:pPr algn="ctr"/>
-            <a:r>
-              <a:rPr lang="fr-FR" dirty="0">
-                <a:solidFill>
-                  <a:srgbClr val="00B050"/>
-                </a:solidFill>
-                <a:latin typeface="Copperplate Gothic Bold" panose="020E0705020206020404" pitchFamily="34" charset="0"/>
-              </a:rPr>
               <a:t>L’OUTIL DE VEILLE</a:t>
             </a:r>
             <a:endParaRPr lang="en-US" dirty="0">
@@ -6055,7 +5506,7 @@
           <a:lstStyle/>
           <a:p>
             <a:pPr algn="ctr"/>
-            <a:endParaRPr lang="fr-FR" b="1">
+            <a:endParaRPr lang="fr-FR" b="1" dirty="0">
               <a:ln w="22225">
                 <a:solidFill>
                   <a:schemeClr val="accent2"/>
@@ -8441,6 +7892,232 @@
           </a:p>
         </p:txBody>
       </p:sp>
+      <p:sp>
+        <p:nvSpPr>
+          <p:cNvPr id="2" name="ZoneTexte 1">
+            <a:extLst>
+              <a:ext uri="{FF2B5EF4-FFF2-40B4-BE49-F238E27FC236}">
+                <a16:creationId xmlns:a16="http://schemas.microsoft.com/office/drawing/2014/main" id="{1D684B58-D8B9-373A-0E33-2241F1BFB5E6}"/>
+              </a:ext>
+            </a:extLst>
+          </p:cNvPr>
+          <p:cNvSpPr txBox="1"/>
+          <p:nvPr/>
+        </p:nvSpPr>
+        <p:spPr>
+          <a:xfrm>
+            <a:off x="2669356" y="3242820"/>
+            <a:ext cx="5967167" cy="830997"/>
+          </a:xfrm>
+          <a:prstGeom prst="rect">
+            <a:avLst/>
+          </a:prstGeom>
+          <a:noFill/>
+          <a:effectLst>
+            <a:outerShdw blurRad="50800" dist="38100" dir="5400000" algn="t" rotWithShape="0">
+              <a:prstClr val="black">
+                <a:alpha val="40000"/>
+              </a:prstClr>
+            </a:outerShdw>
+          </a:effectLst>
+        </p:spPr>
+        <p:txBody>
+          <a:bodyPr wrap="square" rtlCol="0" anchor="ctr">
+            <a:spAutoFit/>
+          </a:bodyPr>
+          <a:lstStyle/>
+          <a:p>
+            <a:pPr algn="ctr"/>
+            <a:r>
+              <a:rPr lang="fr-FR" sz="4800" dirty="0">
+                <a:solidFill>
+                  <a:schemeClr val="tx1">
+                    <a:lumMod val="95000"/>
+                    <a:lumOff val="5000"/>
+                  </a:schemeClr>
+                </a:solidFill>
+                <a:latin typeface="Times New Roman" panose="02020603050405020304" pitchFamily="18" charset="0"/>
+                <a:cs typeface="Times New Roman" panose="02020603050405020304" pitchFamily="18" charset="0"/>
+              </a:rPr>
+              <a:t>QWENTA.FR</a:t>
+            </a:r>
+            <a:endParaRPr lang="en-US" sz="4800" dirty="0">
+              <a:solidFill>
+                <a:schemeClr val="tx1">
+                  <a:lumMod val="95000"/>
+                  <a:lumOff val="5000"/>
+                </a:schemeClr>
+              </a:solidFill>
+              <a:latin typeface="Times New Roman" panose="02020603050405020304" pitchFamily="18" charset="0"/>
+              <a:cs typeface="Times New Roman" panose="02020603050405020304" pitchFamily="18" charset="0"/>
+            </a:endParaRPr>
+          </a:p>
+        </p:txBody>
+      </p:sp>
+      <p:sp>
+        <p:nvSpPr>
+          <p:cNvPr id="4" name="Accolade fermante 3">
+            <a:extLst>
+              <a:ext uri="{FF2B5EF4-FFF2-40B4-BE49-F238E27FC236}">
+                <a16:creationId xmlns:a16="http://schemas.microsoft.com/office/drawing/2014/main" id="{7F96E47B-1331-6196-8782-6730158E0F77}"/>
+              </a:ext>
+            </a:extLst>
+          </p:cNvPr>
+          <p:cNvSpPr/>
+          <p:nvPr/>
+        </p:nvSpPr>
+        <p:spPr>
+          <a:xfrm rot="5400000">
+            <a:off x="4914030" y="3072527"/>
+            <a:ext cx="696964" cy="2465109"/>
+          </a:xfrm>
+          <a:prstGeom prst="rightBrace">
+            <a:avLst/>
+          </a:prstGeom>
+        </p:spPr>
+        <p:style>
+          <a:lnRef idx="1">
+            <a:schemeClr val="dk1"/>
+          </a:lnRef>
+          <a:fillRef idx="0">
+            <a:schemeClr val="dk1"/>
+          </a:fillRef>
+          <a:effectRef idx="0">
+            <a:schemeClr val="dk1"/>
+          </a:effectRef>
+          <a:fontRef idx="minor">
+            <a:schemeClr val="tx1"/>
+          </a:fontRef>
+        </p:style>
+        <p:txBody>
+          <a:bodyPr rtlCol="0" anchor="ctr"/>
+          <a:lstStyle/>
+          <a:p>
+            <a:pPr algn="ctr"/>
+            <a:endParaRPr lang="fr-FR"/>
+          </a:p>
+        </p:txBody>
+      </p:sp>
+      <p:sp>
+        <p:nvSpPr>
+          <p:cNvPr id="7" name="ZoneTexte 6">
+            <a:extLst>
+              <a:ext uri="{FF2B5EF4-FFF2-40B4-BE49-F238E27FC236}">
+                <a16:creationId xmlns:a16="http://schemas.microsoft.com/office/drawing/2014/main" id="{9ABE42C5-6903-64AC-9256-F378CA1CC3D2}"/>
+              </a:ext>
+            </a:extLst>
+          </p:cNvPr>
+          <p:cNvSpPr txBox="1"/>
+          <p:nvPr/>
+        </p:nvSpPr>
+        <p:spPr>
+          <a:xfrm>
+            <a:off x="4029957" y="4827218"/>
+            <a:ext cx="2465110" cy="646331"/>
+          </a:xfrm>
+          <a:prstGeom prst="rect">
+            <a:avLst/>
+          </a:prstGeom>
+          <a:noFill/>
+        </p:spPr>
+        <p:txBody>
+          <a:bodyPr wrap="square" rtlCol="0">
+            <a:spAutoFit/>
+          </a:bodyPr>
+          <a:lstStyle/>
+          <a:p>
+            <a:pPr algn="ctr"/>
+            <a:r>
+              <a:rPr lang="fr-FR" dirty="0"/>
+              <a:t>Nom clair, concis et unique</a:t>
+            </a:r>
+          </a:p>
+        </p:txBody>
+      </p:sp>
+      <p:sp>
+        <p:nvSpPr>
+          <p:cNvPr id="8" name="Accolade fermante 7">
+            <a:extLst>
+              <a:ext uri="{FF2B5EF4-FFF2-40B4-BE49-F238E27FC236}">
+                <a16:creationId xmlns:a16="http://schemas.microsoft.com/office/drawing/2014/main" id="{0F8EE5CF-5E28-9350-77D5-BB8CE5FA1900}"/>
+              </a:ext>
+            </a:extLst>
+          </p:cNvPr>
+          <p:cNvSpPr/>
+          <p:nvPr/>
+        </p:nvSpPr>
+        <p:spPr>
+          <a:xfrm rot="5400000">
+            <a:off x="6636777" y="3843168"/>
+            <a:ext cx="696965" cy="923829"/>
+          </a:xfrm>
+          <a:prstGeom prst="rightBrace">
+            <a:avLst/>
+          </a:prstGeom>
+        </p:spPr>
+        <p:style>
+          <a:lnRef idx="1">
+            <a:schemeClr val="dk1"/>
+          </a:lnRef>
+          <a:fillRef idx="0">
+            <a:schemeClr val="dk1"/>
+          </a:fillRef>
+          <a:effectRef idx="0">
+            <a:schemeClr val="dk1"/>
+          </a:effectRef>
+          <a:fontRef idx="minor">
+            <a:schemeClr val="tx1"/>
+          </a:fontRef>
+        </p:style>
+        <p:txBody>
+          <a:bodyPr rtlCol="0" anchor="ctr"/>
+          <a:lstStyle/>
+          <a:p>
+            <a:pPr algn="ctr"/>
+            <a:endParaRPr lang="fr-FR"/>
+          </a:p>
+        </p:txBody>
+      </p:sp>
+      <p:sp>
+        <p:nvSpPr>
+          <p:cNvPr id="9" name="ZoneTexte 8">
+            <a:extLst>
+              <a:ext uri="{FF2B5EF4-FFF2-40B4-BE49-F238E27FC236}">
+                <a16:creationId xmlns:a16="http://schemas.microsoft.com/office/drawing/2014/main" id="{81B45FB8-88A0-962B-1620-15C1B0645E83}"/>
+              </a:ext>
+            </a:extLst>
+          </p:cNvPr>
+          <p:cNvSpPr txBox="1"/>
+          <p:nvPr/>
+        </p:nvSpPr>
+        <p:spPr>
+          <a:xfrm>
+            <a:off x="6096000" y="4827218"/>
+            <a:ext cx="2256148" cy="923330"/>
+          </a:xfrm>
+          <a:prstGeom prst="rect">
+            <a:avLst/>
+          </a:prstGeom>
+          <a:noFill/>
+        </p:spPr>
+        <p:txBody>
+          <a:bodyPr wrap="square" rtlCol="0">
+            <a:spAutoFit/>
+          </a:bodyPr>
+          <a:lstStyle/>
+          <a:p>
+            <a:pPr algn="ctr"/>
+            <a:r>
+              <a:rPr lang="fr-FR" noProof="1"/>
+              <a:t>Top-Level</a:t>
+            </a:r>
+            <a:r>
+              <a:rPr lang="fr-FR" dirty="0"/>
+              <a:t> Domain avec géolocalisation du pays du site</a:t>
+            </a:r>
+          </a:p>
+        </p:txBody>
+      </p:sp>
     </p:spTree>
     <p:extLst>
       <p:ext uri="{BB962C8B-B14F-4D97-AF65-F5344CB8AC3E}">
@@ -8463,6 +8140,268 @@
       </p:transition>
     </mc:Fallback>
   </mc:AlternateContent>
+  <p:timing>
+    <p:tnLst>
+      <p:par>
+        <p:cTn id="1" dur="indefinite" restart="never" nodeType="tmRoot">
+          <p:childTnLst>
+            <p:seq concurrent="1" nextAc="seek">
+              <p:cTn id="2" dur="indefinite" nodeType="mainSeq">
+                <p:childTnLst>
+                  <p:par>
+                    <p:cTn id="3" fill="hold">
+                      <p:stCondLst>
+                        <p:cond delay="indefinite"/>
+                      </p:stCondLst>
+                      <p:childTnLst>
+                        <p:par>
+                          <p:cTn id="4" fill="hold">
+                            <p:stCondLst>
+                              <p:cond delay="0"/>
+                            </p:stCondLst>
+                            <p:childTnLst>
+                              <p:par>
+                                <p:cTn id="5" presetID="1" presetClass="exit" presetSubtype="0" fill="hold" nodeType="clickEffect">
+                                  <p:stCondLst>
+                                    <p:cond delay="0"/>
+                                  </p:stCondLst>
+                                  <p:childTnLst>
+                                    <p:set>
+                                      <p:cBhvr>
+                                        <p:cTn id="6" dur="1" fill="hold">
+                                          <p:stCondLst>
+                                            <p:cond delay="0"/>
+                                          </p:stCondLst>
+                                        </p:cTn>
+                                        <p:tgtEl>
+                                          <p:spTgt spid="6"/>
+                                        </p:tgtEl>
+                                        <p:attrNameLst>
+                                          <p:attrName>style.visibility</p:attrName>
+                                        </p:attrNameLst>
+                                      </p:cBhvr>
+                                      <p:to>
+                                        <p:strVal val="hidden"/>
+                                      </p:to>
+                                    </p:set>
+                                  </p:childTnLst>
+                                </p:cTn>
+                              </p:par>
+                              <p:par>
+                                <p:cTn id="7" presetID="1" presetClass="exit" presetSubtype="0" fill="hold" nodeType="withEffect">
+                                  <p:stCondLst>
+                                    <p:cond delay="0"/>
+                                  </p:stCondLst>
+                                  <p:childTnLst>
+                                    <p:set>
+                                      <p:cBhvr>
+                                        <p:cTn id="8" dur="1" fill="hold">
+                                          <p:stCondLst>
+                                            <p:cond delay="0"/>
+                                          </p:stCondLst>
+                                        </p:cTn>
+                                        <p:tgtEl>
+                                          <p:spTgt spid="12"/>
+                                        </p:tgtEl>
+                                        <p:attrNameLst>
+                                          <p:attrName>style.visibility</p:attrName>
+                                        </p:attrNameLst>
+                                      </p:cBhvr>
+                                      <p:to>
+                                        <p:strVal val="hidden"/>
+                                      </p:to>
+                                    </p:set>
+                                  </p:childTnLst>
+                                </p:cTn>
+                              </p:par>
+                            </p:childTnLst>
+                          </p:cTn>
+                        </p:par>
+                      </p:childTnLst>
+                    </p:cTn>
+                  </p:par>
+                  <p:par>
+                    <p:cTn id="9" fill="hold">
+                      <p:stCondLst>
+                        <p:cond delay="indefinite"/>
+                      </p:stCondLst>
+                      <p:childTnLst>
+                        <p:par>
+                          <p:cTn id="10" fill="hold">
+                            <p:stCondLst>
+                              <p:cond delay="0"/>
+                            </p:stCondLst>
+                            <p:childTnLst>
+                              <p:par>
+                                <p:cTn id="11" presetID="1" presetClass="entr" presetSubtype="0" fill="hold" grpId="0" nodeType="clickEffect">
+                                  <p:stCondLst>
+                                    <p:cond delay="0"/>
+                                  </p:stCondLst>
+                                  <p:childTnLst>
+                                    <p:set>
+                                      <p:cBhvr>
+                                        <p:cTn id="12" dur="1" fill="hold">
+                                          <p:stCondLst>
+                                            <p:cond delay="0"/>
+                                          </p:stCondLst>
+                                        </p:cTn>
+                                        <p:tgtEl>
+                                          <p:spTgt spid="2"/>
+                                        </p:tgtEl>
+                                        <p:attrNameLst>
+                                          <p:attrName>style.visibility</p:attrName>
+                                        </p:attrNameLst>
+                                      </p:cBhvr>
+                                      <p:to>
+                                        <p:strVal val="visible"/>
+                                      </p:to>
+                                    </p:set>
+                                  </p:childTnLst>
+                                </p:cTn>
+                              </p:par>
+                              <p:par>
+                                <p:cTn id="13" presetID="1" presetClass="entr" presetSubtype="0" fill="hold" grpId="0" nodeType="withEffect">
+                                  <p:stCondLst>
+                                    <p:cond delay="0"/>
+                                  </p:stCondLst>
+                                  <p:childTnLst>
+                                    <p:set>
+                                      <p:cBhvr>
+                                        <p:cTn id="14" dur="1" fill="hold">
+                                          <p:stCondLst>
+                                            <p:cond delay="0"/>
+                                          </p:stCondLst>
+                                        </p:cTn>
+                                        <p:tgtEl>
+                                          <p:spTgt spid="8"/>
+                                        </p:tgtEl>
+                                        <p:attrNameLst>
+                                          <p:attrName>style.visibility</p:attrName>
+                                        </p:attrNameLst>
+                                      </p:cBhvr>
+                                      <p:to>
+                                        <p:strVal val="visible"/>
+                                      </p:to>
+                                    </p:set>
+                                  </p:childTnLst>
+                                </p:cTn>
+                              </p:par>
+                              <p:par>
+                                <p:cTn id="15" presetID="1" presetClass="entr" presetSubtype="0" fill="hold" grpId="0" nodeType="withEffect">
+                                  <p:stCondLst>
+                                    <p:cond delay="0"/>
+                                  </p:stCondLst>
+                                  <p:childTnLst>
+                                    <p:set>
+                                      <p:cBhvr>
+                                        <p:cTn id="16" dur="1" fill="hold">
+                                          <p:stCondLst>
+                                            <p:cond delay="0"/>
+                                          </p:stCondLst>
+                                        </p:cTn>
+                                        <p:tgtEl>
+                                          <p:spTgt spid="4"/>
+                                        </p:tgtEl>
+                                        <p:attrNameLst>
+                                          <p:attrName>style.visibility</p:attrName>
+                                        </p:attrNameLst>
+                                      </p:cBhvr>
+                                      <p:to>
+                                        <p:strVal val="visible"/>
+                                      </p:to>
+                                    </p:set>
+                                  </p:childTnLst>
+                                </p:cTn>
+                              </p:par>
+                              <p:par>
+                                <p:cTn id="17" presetID="1" presetClass="entr" presetSubtype="0" fill="hold" grpId="0" nodeType="withEffect">
+                                  <p:stCondLst>
+                                    <p:cond delay="0"/>
+                                  </p:stCondLst>
+                                  <p:childTnLst>
+                                    <p:set>
+                                      <p:cBhvr>
+                                        <p:cTn id="18" dur="1" fill="hold">
+                                          <p:stCondLst>
+                                            <p:cond delay="0"/>
+                                          </p:stCondLst>
+                                        </p:cTn>
+                                        <p:tgtEl>
+                                          <p:spTgt spid="7"/>
+                                        </p:tgtEl>
+                                        <p:attrNameLst>
+                                          <p:attrName>style.visibility</p:attrName>
+                                        </p:attrNameLst>
+                                      </p:cBhvr>
+                                      <p:to>
+                                        <p:strVal val="visible"/>
+                                      </p:to>
+                                    </p:set>
+                                  </p:childTnLst>
+                                </p:cTn>
+                              </p:par>
+                              <p:par>
+                                <p:cTn id="19" presetID="1" presetClass="entr" presetSubtype="0" fill="hold" grpId="0" nodeType="withEffect">
+                                  <p:stCondLst>
+                                    <p:cond delay="0"/>
+                                  </p:stCondLst>
+                                  <p:childTnLst>
+                                    <p:set>
+                                      <p:cBhvr>
+                                        <p:cTn id="20" dur="1" fill="hold">
+                                          <p:stCondLst>
+                                            <p:cond delay="0"/>
+                                          </p:stCondLst>
+                                        </p:cTn>
+                                        <p:tgtEl>
+                                          <p:spTgt spid="9"/>
+                                        </p:tgtEl>
+                                        <p:attrNameLst>
+                                          <p:attrName>style.visibility</p:attrName>
+                                        </p:attrNameLst>
+                                      </p:cBhvr>
+                                      <p:to>
+                                        <p:strVal val="visible"/>
+                                      </p:to>
+                                    </p:set>
+                                  </p:childTnLst>
+                                </p:cTn>
+                              </p:par>
+                            </p:childTnLst>
+                          </p:cTn>
+                        </p:par>
+                      </p:childTnLst>
+                    </p:cTn>
+                  </p:par>
+                </p:childTnLst>
+              </p:cTn>
+              <p:prevCondLst>
+                <p:cond evt="onPrev" delay="0">
+                  <p:tgtEl>
+                    <p:sldTgt/>
+                  </p:tgtEl>
+                </p:cond>
+              </p:prevCondLst>
+              <p:nextCondLst>
+                <p:cond evt="onNext" delay="0">
+                  <p:tgtEl>
+                    <p:sldTgt/>
+                  </p:tgtEl>
+                </p:cond>
+              </p:nextCondLst>
+            </p:seq>
+          </p:childTnLst>
+        </p:cTn>
+      </p:par>
+    </p:tnLst>
+    <p:bldLst>
+      <p:bldP spid="2" grpId="0"/>
+      <p:bldP spid="4" grpId="0" animBg="1"/>
+      <p:bldP spid="7" grpId="0"/>
+      <p:bldP spid="8" grpId="0" animBg="1"/>
+      <p:bldP spid="9" grpId="0"/>
+    </p:bldLst>
+  </p:timing>
 </p:sld>
 </file>
 
@@ -8517,7 +8456,7 @@
                   <a:srgbClr val="00823B"/>
                 </a:solidFill>
               </a:rPr>
-              <a:t>V/ Le choix du nom de domaine</a:t>
+              <a:t>VI/ Le choix de l’hébergement</a:t>
             </a:r>
             <a:endParaRPr lang="en-US" sz="2400" b="1" u="sng" dirty="0">
               <a:solidFill>
@@ -8595,116 +8534,88 @@
       </p:sp>
       <p:sp>
         <p:nvSpPr>
-          <p:cNvPr id="4" name="ZoneTexte 3">
-            <a:extLst>
-              <a:ext uri="{FF2B5EF4-FFF2-40B4-BE49-F238E27FC236}">
-                <a16:creationId xmlns:a16="http://schemas.microsoft.com/office/drawing/2014/main" id="{C647BF18-FB19-1BD3-1061-36C6100AE173}"/>
-              </a:ext>
-            </a:extLst>
-          </p:cNvPr>
-          <p:cNvSpPr txBox="1"/>
-          <p:nvPr/>
-        </p:nvSpPr>
-        <p:spPr>
-          <a:xfrm>
-            <a:off x="2669356" y="3242820"/>
-            <a:ext cx="5967167" cy="830997"/>
-          </a:xfrm>
-          <a:prstGeom prst="rect">
-            <a:avLst/>
-          </a:prstGeom>
-          <a:noFill/>
+          <p:cNvPr id="6" name="Bouton d'action : Aide 5">
+            <a:hlinkClick r:id="rId2" highlightClick="1"/>
+            <a:extLst>
+              <a:ext uri="{FF2B5EF4-FFF2-40B4-BE49-F238E27FC236}">
+                <a16:creationId xmlns:a16="http://schemas.microsoft.com/office/drawing/2014/main" id="{6FF83680-5055-5AD3-66AD-3B2AF0382FF4}"/>
+              </a:ext>
+            </a:extLst>
+          </p:cNvPr>
+          <p:cNvSpPr/>
+          <p:nvPr/>
+        </p:nvSpPr>
+        <p:spPr>
+          <a:xfrm>
+            <a:off x="990600" y="5693049"/>
+            <a:ext cx="876693" cy="631596"/>
+          </a:xfrm>
+          <a:prstGeom prst="actionButtonHelp">
+            <a:avLst/>
+          </a:prstGeom>
+          <a:solidFill>
+            <a:schemeClr val="tx2">
+              <a:lumMod val="60000"/>
+              <a:lumOff val="40000"/>
+            </a:schemeClr>
+          </a:solidFill>
           <a:effectLst>
-            <a:outerShdw blurRad="50800" dist="38100" dir="5400000" algn="t" rotWithShape="0">
-              <a:prstClr val="black">
-                <a:alpha val="40000"/>
-              </a:prstClr>
-            </a:outerShdw>
+            <a:glow rad="127000">
+              <a:schemeClr val="accent1">
+                <a:alpha val="0"/>
+              </a:schemeClr>
+            </a:glow>
           </a:effectLst>
         </p:spPr>
-        <p:txBody>
-          <a:bodyPr wrap="square" rtlCol="0" anchor="ctr">
-            <a:spAutoFit/>
+        <p:style>
+          <a:lnRef idx="2">
+            <a:schemeClr val="accent6">
+              <a:shade val="50000"/>
+            </a:schemeClr>
+          </a:lnRef>
+          <a:fillRef idx="1">
+            <a:schemeClr val="accent6"/>
+          </a:fillRef>
+          <a:effectRef idx="0">
+            <a:schemeClr val="accent6"/>
+          </a:effectRef>
+          <a:fontRef idx="minor">
+            <a:schemeClr val="lt1"/>
+          </a:fontRef>
+        </p:style>
+        <p:txBody>
+          <a:bodyPr rot="0" spcFirstLastPara="0" vertOverflow="overflow" horzOverflow="overflow" vert="horz" wrap="square" lIns="91440" tIns="45720" rIns="91440" bIns="45720" numCol="1" spcCol="0" rtlCol="0" fromWordArt="0" anchor="ctr" anchorCtr="0" forceAA="0" compatLnSpc="1">
+            <a:prstTxWarp prst="textNoShape">
+              <a:avLst/>
+            </a:prstTxWarp>
+            <a:noAutofit/>
           </a:bodyPr>
           <a:lstStyle/>
           <a:p>
             <a:pPr algn="ctr"/>
-            <a:r>
-              <a:rPr lang="fr-FR" sz="4800" dirty="0">
+            <a:endParaRPr lang="fr-FR" b="1">
+              <a:ln w="22225">
                 <a:solidFill>
-                  <a:schemeClr val="tx1">
-                    <a:lumMod val="95000"/>
-                    <a:lumOff val="5000"/>
-                  </a:schemeClr>
+                  <a:schemeClr val="accent2"/>
                 </a:solidFill>
-                <a:latin typeface="Times New Roman" panose="02020603050405020304" pitchFamily="18" charset="0"/>
-                <a:cs typeface="Times New Roman" panose="02020603050405020304" pitchFamily="18" charset="0"/>
-              </a:rPr>
-              <a:t>QWENTA.FR</a:t>
-            </a:r>
-            <a:endParaRPr lang="en-US" sz="4800" dirty="0">
+                <a:prstDash val="solid"/>
+              </a:ln>
               <a:solidFill>
-                <a:schemeClr val="tx1">
-                  <a:lumMod val="95000"/>
-                  <a:lumOff val="5000"/>
+                <a:schemeClr val="accent2">
+                  <a:lumMod val="40000"/>
+                  <a:lumOff val="60000"/>
                 </a:schemeClr>
               </a:solidFill>
-              <a:latin typeface="Times New Roman" panose="02020603050405020304" pitchFamily="18" charset="0"/>
-              <a:cs typeface="Times New Roman" panose="02020603050405020304" pitchFamily="18" charset="0"/>
             </a:endParaRPr>
           </a:p>
         </p:txBody>
       </p:sp>
       <p:sp>
         <p:nvSpPr>
-          <p:cNvPr id="7" name="Accolade fermante 6">
-            <a:extLst>
-              <a:ext uri="{FF2B5EF4-FFF2-40B4-BE49-F238E27FC236}">
-                <a16:creationId xmlns:a16="http://schemas.microsoft.com/office/drawing/2014/main" id="{864B0136-76ED-8DB1-8D11-A1CE91444D23}"/>
-              </a:ext>
-            </a:extLst>
-          </p:cNvPr>
-          <p:cNvSpPr/>
-          <p:nvPr/>
-        </p:nvSpPr>
-        <p:spPr>
-          <a:xfrm rot="5400000">
-            <a:off x="4914030" y="3072527"/>
-            <a:ext cx="696964" cy="2465109"/>
-          </a:xfrm>
-          <a:prstGeom prst="rightBrace">
-            <a:avLst/>
-          </a:prstGeom>
-        </p:spPr>
-        <p:style>
-          <a:lnRef idx="1">
-            <a:schemeClr val="dk1"/>
-          </a:lnRef>
-          <a:fillRef idx="0">
-            <a:schemeClr val="dk1"/>
-          </a:fillRef>
-          <a:effectRef idx="0">
-            <a:schemeClr val="dk1"/>
-          </a:effectRef>
-          <a:fontRef idx="minor">
-            <a:schemeClr val="tx1"/>
-          </a:fontRef>
-        </p:style>
-        <p:txBody>
-          <a:bodyPr rtlCol="0" anchor="ctr"/>
-          <a:lstStyle/>
-          <a:p>
-            <a:pPr algn="ctr"/>
-            <a:endParaRPr lang="fr-FR"/>
-          </a:p>
-        </p:txBody>
-      </p:sp>
-      <p:sp>
-        <p:nvSpPr>
-          <p:cNvPr id="8" name="ZoneTexte 7">
-            <a:extLst>
-              <a:ext uri="{FF2B5EF4-FFF2-40B4-BE49-F238E27FC236}">
-                <a16:creationId xmlns:a16="http://schemas.microsoft.com/office/drawing/2014/main" id="{32F0DACC-4D8E-B627-3B3F-D81CCA90CD03}"/>
+          <p:cNvPr id="11" name="ZoneTexte 10">
+            <a:extLst>
+              <a:ext uri="{FF2B5EF4-FFF2-40B4-BE49-F238E27FC236}">
+                <a16:creationId xmlns:a16="http://schemas.microsoft.com/office/drawing/2014/main" id="{EEECD8A4-FB17-770E-6215-DAA80CFE8A60}"/>
               </a:ext>
             </a:extLst>
           </p:cNvPr>
@@ -8713,8 +8624,8 @@
         </p:nvSpPr>
         <p:spPr>
           <a:xfrm>
-            <a:off x="4029957" y="4827218"/>
-            <a:ext cx="2465110" cy="646331"/>
+            <a:off x="3728298" y="2298098"/>
+            <a:ext cx="4286841" cy="461665"/>
           </a:xfrm>
           <a:prstGeom prst="rect">
             <a:avLst/>
@@ -8729,62 +8640,24 @@
           <a:p>
             <a:pPr algn="ctr"/>
             <a:r>
-              <a:rPr lang="fr-FR" dirty="0"/>
-              <a:t>Nom clair, concis et unique</a:t>
-            </a:r>
-          </a:p>
-        </p:txBody>
-      </p:sp>
-      <p:sp>
-        <p:nvSpPr>
-          <p:cNvPr id="9" name="Accolade fermante 8">
-            <a:extLst>
-              <a:ext uri="{FF2B5EF4-FFF2-40B4-BE49-F238E27FC236}">
-                <a16:creationId xmlns:a16="http://schemas.microsoft.com/office/drawing/2014/main" id="{C804400E-B19D-B3E6-EDEF-FAB87557158B}"/>
-              </a:ext>
-            </a:extLst>
-          </p:cNvPr>
-          <p:cNvSpPr/>
-          <p:nvPr/>
-        </p:nvSpPr>
-        <p:spPr>
-          <a:xfrm rot="5400000">
-            <a:off x="6636777" y="3843168"/>
-            <a:ext cx="696965" cy="923829"/>
-          </a:xfrm>
-          <a:prstGeom prst="rightBrace">
-            <a:avLst/>
-          </a:prstGeom>
-        </p:spPr>
-        <p:style>
-          <a:lnRef idx="1">
-            <a:schemeClr val="dk1"/>
-          </a:lnRef>
-          <a:fillRef idx="0">
-            <a:schemeClr val="dk1"/>
-          </a:fillRef>
-          <a:effectRef idx="0">
-            <a:schemeClr val="dk1"/>
-          </a:effectRef>
-          <a:fontRef idx="minor">
-            <a:schemeClr val="tx1"/>
-          </a:fontRef>
-        </p:style>
-        <p:txBody>
-          <a:bodyPr rtlCol="0" anchor="ctr"/>
-          <a:lstStyle/>
-          <a:p>
-            <a:pPr algn="ctr"/>
-            <a:endParaRPr lang="fr-FR"/>
-          </a:p>
-        </p:txBody>
-      </p:sp>
-      <p:sp>
-        <p:nvSpPr>
-          <p:cNvPr id="10" name="ZoneTexte 9">
-            <a:extLst>
-              <a:ext uri="{FF2B5EF4-FFF2-40B4-BE49-F238E27FC236}">
-                <a16:creationId xmlns:a16="http://schemas.microsoft.com/office/drawing/2014/main" id="{2E711D51-92AD-2261-BFB2-989927AD5D50}"/>
+              <a:rPr lang="fr-FR" sz="2400" b="1" dirty="0">
+                <a:solidFill>
+                  <a:schemeClr val="tx2">
+                    <a:lumMod val="50000"/>
+                  </a:schemeClr>
+                </a:solidFill>
+              </a:rPr>
+              <a:t>Les trois critères principaux</a:t>
+            </a:r>
+          </a:p>
+        </p:txBody>
+      </p:sp>
+      <p:sp>
+        <p:nvSpPr>
+          <p:cNvPr id="13" name="ZoneTexte 12">
+            <a:extLst>
+              <a:ext uri="{FF2B5EF4-FFF2-40B4-BE49-F238E27FC236}">
+                <a16:creationId xmlns:a16="http://schemas.microsoft.com/office/drawing/2014/main" id="{B9607D5B-F32F-C221-61D7-60FCF7619C0F}"/>
               </a:ext>
             </a:extLst>
           </p:cNvPr>
@@ -8793,8 +8666,8 @@
         </p:nvSpPr>
         <p:spPr>
           <a:xfrm>
-            <a:off x="6096000" y="4827218"/>
-            <a:ext cx="2256148" cy="923330"/>
+            <a:off x="7788895" y="4095812"/>
+            <a:ext cx="2318208" cy="369332"/>
           </a:xfrm>
           <a:prstGeom prst="rect">
             <a:avLst/>
@@ -8809,20 +8682,256 @@
           <a:p>
             <a:pPr algn="ctr"/>
             <a:r>
-              <a:rPr lang="fr-FR" noProof="1"/>
-              <a:t>Top-Level</a:t>
-            </a:r>
-            <a:r>
               <a:rPr lang="fr-FR" dirty="0"/>
-              <a:t> Domain avec géolocalisation du pays du site</a:t>
-            </a:r>
+              <a:t>Sécurité</a:t>
+            </a:r>
+          </a:p>
+        </p:txBody>
+      </p:sp>
+      <p:sp>
+        <p:nvSpPr>
+          <p:cNvPr id="14" name="ZoneTexte 13">
+            <a:extLst>
+              <a:ext uri="{FF2B5EF4-FFF2-40B4-BE49-F238E27FC236}">
+                <a16:creationId xmlns:a16="http://schemas.microsoft.com/office/drawing/2014/main" id="{2F2A2D41-B0E8-BB13-8E62-A45D9159681B}"/>
+              </a:ext>
+            </a:extLst>
+          </p:cNvPr>
+          <p:cNvSpPr txBox="1"/>
+          <p:nvPr/>
+        </p:nvSpPr>
+        <p:spPr>
+          <a:xfrm>
+            <a:off x="4712613" y="4095812"/>
+            <a:ext cx="2318208" cy="369332"/>
+          </a:xfrm>
+          <a:prstGeom prst="rect">
+            <a:avLst/>
+          </a:prstGeom>
+          <a:noFill/>
+        </p:spPr>
+        <p:txBody>
+          <a:bodyPr wrap="square" rtlCol="0">
+            <a:spAutoFit/>
+          </a:bodyPr>
+          <a:lstStyle/>
+          <a:p>
+            <a:pPr algn="ctr"/>
+            <a:r>
+              <a:rPr lang="fr-FR" dirty="0"/>
+              <a:t>Prix</a:t>
+            </a:r>
+          </a:p>
+        </p:txBody>
+      </p:sp>
+      <p:sp>
+        <p:nvSpPr>
+          <p:cNvPr id="15" name="ZoneTexte 14">
+            <a:extLst>
+              <a:ext uri="{FF2B5EF4-FFF2-40B4-BE49-F238E27FC236}">
+                <a16:creationId xmlns:a16="http://schemas.microsoft.com/office/drawing/2014/main" id="{CCC5B327-D07A-A000-C2DC-B9731F3F6005}"/>
+              </a:ext>
+            </a:extLst>
+          </p:cNvPr>
+          <p:cNvSpPr txBox="1"/>
+          <p:nvPr/>
+        </p:nvSpPr>
+        <p:spPr>
+          <a:xfrm>
+            <a:off x="1558958" y="3945224"/>
+            <a:ext cx="2318208" cy="369332"/>
+          </a:xfrm>
+          <a:prstGeom prst="rect">
+            <a:avLst/>
+          </a:prstGeom>
+          <a:noFill/>
+        </p:spPr>
+        <p:txBody>
+          <a:bodyPr wrap="square" rtlCol="0">
+            <a:spAutoFit/>
+          </a:bodyPr>
+          <a:lstStyle/>
+          <a:p>
+            <a:pPr algn="ctr"/>
+            <a:r>
+              <a:rPr lang="fr-FR" dirty="0"/>
+              <a:t>Type de site</a:t>
+            </a:r>
+          </a:p>
+        </p:txBody>
+      </p:sp>
+      <p:sp>
+        <p:nvSpPr>
+          <p:cNvPr id="16" name="Flèche : bas 15">
+            <a:extLst>
+              <a:ext uri="{FF2B5EF4-FFF2-40B4-BE49-F238E27FC236}">
+                <a16:creationId xmlns:a16="http://schemas.microsoft.com/office/drawing/2014/main" id="{FCA815D3-9919-3FCC-4C2F-931A1FB525C9}"/>
+              </a:ext>
+            </a:extLst>
+          </p:cNvPr>
+          <p:cNvSpPr/>
+          <p:nvPr/>
+        </p:nvSpPr>
+        <p:spPr>
+          <a:xfrm rot="2406966">
+            <a:off x="3568065" y="2936509"/>
+            <a:ext cx="339365" cy="829559"/>
+          </a:xfrm>
+          <a:prstGeom prst="downArrow">
+            <a:avLst/>
+          </a:prstGeom>
+          <a:solidFill>
+            <a:schemeClr val="accent6">
+              <a:lumMod val="75000"/>
+            </a:schemeClr>
+          </a:solidFill>
+          <a:ln>
+            <a:solidFill>
+              <a:srgbClr val="00823B"/>
+            </a:solidFill>
+          </a:ln>
+        </p:spPr>
+        <p:style>
+          <a:lnRef idx="2">
+            <a:schemeClr val="accent1">
+              <a:shade val="50000"/>
+            </a:schemeClr>
+          </a:lnRef>
+          <a:fillRef idx="1">
+            <a:schemeClr val="accent1"/>
+          </a:fillRef>
+          <a:effectRef idx="0">
+            <a:schemeClr val="accent1"/>
+          </a:effectRef>
+          <a:fontRef idx="minor">
+            <a:schemeClr val="lt1"/>
+          </a:fontRef>
+        </p:style>
+        <p:txBody>
+          <a:bodyPr rtlCol="0" anchor="ctr"/>
+          <a:lstStyle/>
+          <a:p>
+            <a:pPr algn="ctr"/>
+            <a:endParaRPr lang="fr-FR" dirty="0"/>
+          </a:p>
+        </p:txBody>
+      </p:sp>
+      <p:sp>
+        <p:nvSpPr>
+          <p:cNvPr id="17" name="Flèche : bas 16">
+            <a:extLst>
+              <a:ext uri="{FF2B5EF4-FFF2-40B4-BE49-F238E27FC236}">
+                <a16:creationId xmlns:a16="http://schemas.microsoft.com/office/drawing/2014/main" id="{E68608B8-9016-BCC0-FE7B-0471E8013303}"/>
+              </a:ext>
+            </a:extLst>
+          </p:cNvPr>
+          <p:cNvSpPr/>
+          <p:nvPr/>
+        </p:nvSpPr>
+        <p:spPr>
+          <a:xfrm rot="19029200">
+            <a:off x="7887550" y="2929474"/>
+            <a:ext cx="339365" cy="829559"/>
+          </a:xfrm>
+          <a:prstGeom prst="downArrow">
+            <a:avLst/>
+          </a:prstGeom>
+          <a:solidFill>
+            <a:schemeClr val="accent6">
+              <a:lumMod val="75000"/>
+            </a:schemeClr>
+          </a:solidFill>
+          <a:ln>
+            <a:solidFill>
+              <a:srgbClr val="00823B"/>
+            </a:solidFill>
+          </a:ln>
+        </p:spPr>
+        <p:style>
+          <a:lnRef idx="2">
+            <a:schemeClr val="accent1">
+              <a:shade val="50000"/>
+            </a:schemeClr>
+          </a:lnRef>
+          <a:fillRef idx="1">
+            <a:schemeClr val="accent1"/>
+          </a:fillRef>
+          <a:effectRef idx="0">
+            <a:schemeClr val="accent1"/>
+          </a:effectRef>
+          <a:fontRef idx="minor">
+            <a:schemeClr val="lt1"/>
+          </a:fontRef>
+        </p:style>
+        <p:txBody>
+          <a:bodyPr rtlCol="0" anchor="ctr"/>
+          <a:lstStyle/>
+          <a:p>
+            <a:pPr algn="ctr"/>
+            <a:endParaRPr lang="fr-FR" dirty="0"/>
+          </a:p>
+        </p:txBody>
+      </p:sp>
+      <p:sp>
+        <p:nvSpPr>
+          <p:cNvPr id="18" name="Flèche : bas 17">
+            <a:extLst>
+              <a:ext uri="{FF2B5EF4-FFF2-40B4-BE49-F238E27FC236}">
+                <a16:creationId xmlns:a16="http://schemas.microsoft.com/office/drawing/2014/main" id="{5B557B7D-1651-BBA8-1375-76C7914CC501}"/>
+              </a:ext>
+            </a:extLst>
+          </p:cNvPr>
+          <p:cNvSpPr/>
+          <p:nvPr/>
+        </p:nvSpPr>
+        <p:spPr>
+          <a:xfrm>
+            <a:off x="5702035" y="3014220"/>
+            <a:ext cx="339365" cy="829559"/>
+          </a:xfrm>
+          <a:prstGeom prst="downArrow">
+            <a:avLst/>
+          </a:prstGeom>
+          <a:solidFill>
+            <a:schemeClr val="accent6">
+              <a:lumMod val="75000"/>
+            </a:schemeClr>
+          </a:solidFill>
+          <a:ln>
+            <a:solidFill>
+              <a:srgbClr val="00823B"/>
+            </a:solidFill>
+          </a:ln>
+        </p:spPr>
+        <p:style>
+          <a:lnRef idx="2">
+            <a:schemeClr val="accent1">
+              <a:shade val="50000"/>
+            </a:schemeClr>
+          </a:lnRef>
+          <a:fillRef idx="1">
+            <a:schemeClr val="accent1"/>
+          </a:fillRef>
+          <a:effectRef idx="0">
+            <a:schemeClr val="accent1"/>
+          </a:effectRef>
+          <a:fontRef idx="minor">
+            <a:schemeClr val="lt1"/>
+          </a:fontRef>
+        </p:style>
+        <p:txBody>
+          <a:bodyPr rtlCol="0" anchor="ctr"/>
+          <a:lstStyle/>
+          <a:p>
+            <a:pPr algn="ctr"/>
+            <a:endParaRPr lang="fr-FR" dirty="0"/>
           </a:p>
         </p:txBody>
       </p:sp>
     </p:spTree>
     <p:extLst>
       <p:ext uri="{BB962C8B-B14F-4D97-AF65-F5344CB8AC3E}">
-        <p14:creationId xmlns:p14="http://schemas.microsoft.com/office/powerpoint/2010/main" val="954507409"/>
+        <p14:creationId xmlns:p14="http://schemas.microsoft.com/office/powerpoint/2010/main" val="1766438128"/>
       </p:ext>
     </p:extLst>
   </p:cSld>
@@ -8841,6 +8950,252 @@
       </p:transition>
     </mc:Fallback>
   </mc:AlternateContent>
+  <p:timing>
+    <p:tnLst>
+      <p:par>
+        <p:cTn id="1" dur="indefinite" restart="never" nodeType="tmRoot">
+          <p:childTnLst>
+            <p:seq concurrent="1" nextAc="seek">
+              <p:cTn id="2" dur="indefinite" nodeType="mainSeq">
+                <p:childTnLst>
+                  <p:par>
+                    <p:cTn id="3" fill="hold">
+                      <p:stCondLst>
+                        <p:cond delay="indefinite"/>
+                      </p:stCondLst>
+                      <p:childTnLst>
+                        <p:par>
+                          <p:cTn id="4" fill="hold">
+                            <p:stCondLst>
+                              <p:cond delay="0"/>
+                            </p:stCondLst>
+                            <p:childTnLst>
+                              <p:par>
+                                <p:cTn id="5" presetID="1" presetClass="exit" presetSubtype="0" fill="hold" grpId="0" nodeType="clickEffect">
+                                  <p:stCondLst>
+                                    <p:cond delay="0"/>
+                                  </p:stCondLst>
+                                  <p:childTnLst>
+                                    <p:set>
+                                      <p:cBhvr>
+                                        <p:cTn id="6" dur="1" fill="hold">
+                                          <p:stCondLst>
+                                            <p:cond delay="0"/>
+                                          </p:stCondLst>
+                                        </p:cTn>
+                                        <p:tgtEl>
+                                          <p:spTgt spid="11"/>
+                                        </p:tgtEl>
+                                        <p:attrNameLst>
+                                          <p:attrName>style.visibility</p:attrName>
+                                        </p:attrNameLst>
+                                      </p:cBhvr>
+                                      <p:to>
+                                        <p:strVal val="hidden"/>
+                                      </p:to>
+                                    </p:set>
+                                  </p:childTnLst>
+                                </p:cTn>
+                              </p:par>
+                              <p:par>
+                                <p:cTn id="7" presetID="1" presetClass="exit" presetSubtype="0" fill="hold" grpId="0" nodeType="withEffect">
+                                  <p:stCondLst>
+                                    <p:cond delay="0"/>
+                                  </p:stCondLst>
+                                  <p:childTnLst>
+                                    <p:set>
+                                      <p:cBhvr>
+                                        <p:cTn id="8" dur="1" fill="hold">
+                                          <p:stCondLst>
+                                            <p:cond delay="0"/>
+                                          </p:stCondLst>
+                                        </p:cTn>
+                                        <p:tgtEl>
+                                          <p:spTgt spid="17"/>
+                                        </p:tgtEl>
+                                        <p:attrNameLst>
+                                          <p:attrName>style.visibility</p:attrName>
+                                        </p:attrNameLst>
+                                      </p:cBhvr>
+                                      <p:to>
+                                        <p:strVal val="hidden"/>
+                                      </p:to>
+                                    </p:set>
+                                  </p:childTnLst>
+                                </p:cTn>
+                              </p:par>
+                              <p:par>
+                                <p:cTn id="9" presetID="1" presetClass="exit" presetSubtype="0" fill="hold" grpId="0" nodeType="withEffect">
+                                  <p:stCondLst>
+                                    <p:cond delay="0"/>
+                                  </p:stCondLst>
+                                  <p:childTnLst>
+                                    <p:set>
+                                      <p:cBhvr>
+                                        <p:cTn id="10" dur="1" fill="hold">
+                                          <p:stCondLst>
+                                            <p:cond delay="0"/>
+                                          </p:stCondLst>
+                                        </p:cTn>
+                                        <p:tgtEl>
+                                          <p:spTgt spid="18"/>
+                                        </p:tgtEl>
+                                        <p:attrNameLst>
+                                          <p:attrName>style.visibility</p:attrName>
+                                        </p:attrNameLst>
+                                      </p:cBhvr>
+                                      <p:to>
+                                        <p:strVal val="hidden"/>
+                                      </p:to>
+                                    </p:set>
+                                  </p:childTnLst>
+                                </p:cTn>
+                              </p:par>
+                              <p:par>
+                                <p:cTn id="11" presetID="1" presetClass="exit" presetSubtype="0" fill="hold" grpId="0" nodeType="withEffect">
+                                  <p:stCondLst>
+                                    <p:cond delay="0"/>
+                                  </p:stCondLst>
+                                  <p:childTnLst>
+                                    <p:set>
+                                      <p:cBhvr>
+                                        <p:cTn id="12" dur="1" fill="hold">
+                                          <p:stCondLst>
+                                            <p:cond delay="0"/>
+                                          </p:stCondLst>
+                                        </p:cTn>
+                                        <p:tgtEl>
+                                          <p:spTgt spid="16"/>
+                                        </p:tgtEl>
+                                        <p:attrNameLst>
+                                          <p:attrName>style.visibility</p:attrName>
+                                        </p:attrNameLst>
+                                      </p:cBhvr>
+                                      <p:to>
+                                        <p:strVal val="hidden"/>
+                                      </p:to>
+                                    </p:set>
+                                  </p:childTnLst>
+                                </p:cTn>
+                              </p:par>
+                              <p:par>
+                                <p:cTn id="13" presetID="1" presetClass="exit" presetSubtype="0" fill="hold" grpId="0" nodeType="withEffect">
+                                  <p:stCondLst>
+                                    <p:cond delay="0"/>
+                                  </p:stCondLst>
+                                  <p:childTnLst>
+                                    <p:set>
+                                      <p:cBhvr>
+                                        <p:cTn id="14" dur="1" fill="hold">
+                                          <p:stCondLst>
+                                            <p:cond delay="0"/>
+                                          </p:stCondLst>
+                                        </p:cTn>
+                                        <p:tgtEl>
+                                          <p:spTgt spid="15"/>
+                                        </p:tgtEl>
+                                        <p:attrNameLst>
+                                          <p:attrName>style.visibility</p:attrName>
+                                        </p:attrNameLst>
+                                      </p:cBhvr>
+                                      <p:to>
+                                        <p:strVal val="hidden"/>
+                                      </p:to>
+                                    </p:set>
+                                  </p:childTnLst>
+                                </p:cTn>
+                              </p:par>
+                              <p:par>
+                                <p:cTn id="15" presetID="1" presetClass="exit" presetSubtype="0" fill="hold" grpId="0" nodeType="withEffect">
+                                  <p:stCondLst>
+                                    <p:cond delay="0"/>
+                                  </p:stCondLst>
+                                  <p:childTnLst>
+                                    <p:set>
+                                      <p:cBhvr>
+                                        <p:cTn id="16" dur="1" fill="hold">
+                                          <p:stCondLst>
+                                            <p:cond delay="0"/>
+                                          </p:stCondLst>
+                                        </p:cTn>
+                                        <p:tgtEl>
+                                          <p:spTgt spid="14"/>
+                                        </p:tgtEl>
+                                        <p:attrNameLst>
+                                          <p:attrName>style.visibility</p:attrName>
+                                        </p:attrNameLst>
+                                      </p:cBhvr>
+                                      <p:to>
+                                        <p:strVal val="hidden"/>
+                                      </p:to>
+                                    </p:set>
+                                  </p:childTnLst>
+                                </p:cTn>
+                              </p:par>
+                              <p:par>
+                                <p:cTn id="17" presetID="1" presetClass="exit" presetSubtype="0" fill="hold" grpId="0" nodeType="withEffect">
+                                  <p:stCondLst>
+                                    <p:cond delay="0"/>
+                                  </p:stCondLst>
+                                  <p:childTnLst>
+                                    <p:set>
+                                      <p:cBhvr>
+                                        <p:cTn id="18" dur="1" fill="hold">
+                                          <p:stCondLst>
+                                            <p:cond delay="0"/>
+                                          </p:stCondLst>
+                                        </p:cTn>
+                                        <p:tgtEl>
+                                          <p:spTgt spid="13"/>
+                                        </p:tgtEl>
+                                        <p:attrNameLst>
+                                          <p:attrName>style.visibility</p:attrName>
+                                        </p:attrNameLst>
+                                      </p:cBhvr>
+                                      <p:to>
+                                        <p:strVal val="hidden"/>
+                                      </p:to>
+                                    </p:set>
+                                  </p:childTnLst>
+                                </p:cTn>
+                              </p:par>
+                            </p:childTnLst>
+                          </p:cTn>
+                        </p:par>
+                      </p:childTnLst>
+                    </p:cTn>
+                  </p:par>
+                </p:childTnLst>
+              </p:cTn>
+              <p:prevCondLst>
+                <p:cond evt="onPrev" delay="0">
+                  <p:tgtEl>
+                    <p:sldTgt/>
+                  </p:tgtEl>
+                </p:cond>
+              </p:prevCondLst>
+              <p:nextCondLst>
+                <p:cond evt="onNext" delay="0">
+                  <p:tgtEl>
+                    <p:sldTgt/>
+                  </p:tgtEl>
+                </p:cond>
+              </p:nextCondLst>
+            </p:seq>
+          </p:childTnLst>
+        </p:cTn>
+      </p:par>
+    </p:tnLst>
+    <p:bldLst>
+      <p:bldP spid="11" grpId="0"/>
+      <p:bldP spid="13" grpId="0"/>
+      <p:bldP spid="14" grpId="0"/>
+      <p:bldP spid="15" grpId="0"/>
+      <p:bldP spid="16" grpId="0" animBg="1"/>
+      <p:bldP spid="17" grpId="0" animBg="1"/>
+      <p:bldP spid="18" grpId="0" animBg="1"/>
+    </p:bldLst>
+  </p:timing>
 </p:sld>
 </file>
 

</xml_diff>